<commit_message>
Commit version 6.1. Modifications compared to 6.0 is in WinduVision.py.
</commit_message>
<xml_diff>
--- a/icons/icons.pptx
+++ b/icons/icons.pptx
@@ -1,43 +1,49 @@
 
 <file path=ppt/presentation.xml><?xml version="1.0" encoding="utf-8"?>
-<p:presentation xmlns:a="http://schemas.openxmlformats.org/drawingml/2006/main" xmlns:r="http://schemas.openxmlformats.org/officeDocument/2006/relationships" xmlns:p="http://schemas.openxmlformats.org/presentationml/2006/main" saveSubsetFonts="1">
+<p:presentation xmlns:a="http://schemas.openxmlformats.org/drawingml/2006/main" xmlns:r="http://schemas.openxmlformats.org/officeDocument/2006/relationships" xmlns:p="http://schemas.openxmlformats.org/presentationml/2006/main" saveSubsetFonts="1" autoCompressPictures="0">
   <p:sldMasterIdLst>
     <p:sldMasterId id="2147483648" r:id="rId1"/>
   </p:sldMasterIdLst>
+  <p:notesMasterIdLst>
+    <p:notesMasterId r:id="rId38"/>
+  </p:notesMasterIdLst>
   <p:sldIdLst>
     <p:sldId id="286" r:id="rId2"/>
     <p:sldId id="309" r:id="rId3"/>
     <p:sldId id="310" r:id="rId4"/>
     <p:sldId id="311" r:id="rId5"/>
-    <p:sldId id="312" r:id="rId6"/>
-    <p:sldId id="313" r:id="rId7"/>
-    <p:sldId id="314" r:id="rId8"/>
-    <p:sldId id="315" r:id="rId9"/>
-    <p:sldId id="317" r:id="rId10"/>
-    <p:sldId id="316" r:id="rId11"/>
-    <p:sldId id="318" r:id="rId12"/>
-    <p:sldId id="308" r:id="rId13"/>
-    <p:sldId id="287" r:id="rId14"/>
-    <p:sldId id="288" r:id="rId15"/>
-    <p:sldId id="289" r:id="rId16"/>
-    <p:sldId id="290" r:id="rId17"/>
-    <p:sldId id="291" r:id="rId18"/>
-    <p:sldId id="292" r:id="rId19"/>
-    <p:sldId id="293" r:id="rId20"/>
-    <p:sldId id="294" r:id="rId21"/>
-    <p:sldId id="295" r:id="rId22"/>
-    <p:sldId id="296" r:id="rId23"/>
-    <p:sldId id="297" r:id="rId24"/>
-    <p:sldId id="298" r:id="rId25"/>
-    <p:sldId id="299" r:id="rId26"/>
-    <p:sldId id="300" r:id="rId27"/>
-    <p:sldId id="301" r:id="rId28"/>
-    <p:sldId id="302" r:id="rId29"/>
-    <p:sldId id="303" r:id="rId30"/>
-    <p:sldId id="304" r:id="rId31"/>
-    <p:sldId id="305" r:id="rId32"/>
-    <p:sldId id="306" r:id="rId33"/>
-    <p:sldId id="307" r:id="rId34"/>
+    <p:sldId id="324" r:id="rId6"/>
+    <p:sldId id="323" r:id="rId7"/>
+    <p:sldId id="325" r:id="rId8"/>
+    <p:sldId id="313" r:id="rId9"/>
+    <p:sldId id="314" r:id="rId10"/>
+    <p:sldId id="315" r:id="rId11"/>
+    <p:sldId id="317" r:id="rId12"/>
+    <p:sldId id="316" r:id="rId13"/>
+    <p:sldId id="320" r:id="rId14"/>
+    <p:sldId id="321" r:id="rId15"/>
+    <p:sldId id="322" r:id="rId16"/>
+    <p:sldId id="287" r:id="rId17"/>
+    <p:sldId id="288" r:id="rId18"/>
+    <p:sldId id="289" r:id="rId19"/>
+    <p:sldId id="290" r:id="rId20"/>
+    <p:sldId id="291" r:id="rId21"/>
+    <p:sldId id="292" r:id="rId22"/>
+    <p:sldId id="293" r:id="rId23"/>
+    <p:sldId id="294" r:id="rId24"/>
+    <p:sldId id="295" r:id="rId25"/>
+    <p:sldId id="296" r:id="rId26"/>
+    <p:sldId id="297" r:id="rId27"/>
+    <p:sldId id="298" r:id="rId28"/>
+    <p:sldId id="299" r:id="rId29"/>
+    <p:sldId id="300" r:id="rId30"/>
+    <p:sldId id="301" r:id="rId31"/>
+    <p:sldId id="302" r:id="rId32"/>
+    <p:sldId id="303" r:id="rId33"/>
+    <p:sldId id="304" r:id="rId34"/>
+    <p:sldId id="305" r:id="rId35"/>
+    <p:sldId id="306" r:id="rId36"/>
+    <p:sldId id="307" r:id="rId37"/>
   </p:sldIdLst>
   <p:sldSz cx="9144000" cy="6858000" type="screen4x3"/>
   <p:notesSz cx="6858000" cy="9144000"/>
@@ -137,6 +143,440 @@
     </a:lvl9pPr>
   </p:defaultTextStyle>
 </p:presentation>
+</file>
+
+<file path=ppt/notesMasters/notesMaster1.xml><?xml version="1.0" encoding="utf-8"?>
+<p:notesMaster xmlns:a="http://schemas.openxmlformats.org/drawingml/2006/main" xmlns:r="http://schemas.openxmlformats.org/officeDocument/2006/relationships" xmlns:p="http://schemas.openxmlformats.org/presentationml/2006/main">
+  <p:cSld>
+    <p:bg>
+      <p:bgRef idx="1001">
+        <a:schemeClr val="bg1"/>
+      </p:bgRef>
+    </p:bg>
+    <p:spTree>
+      <p:nvGrpSpPr>
+        <p:cNvPr id="1" name=""/>
+        <p:cNvGrpSpPr/>
+        <p:nvPr/>
+      </p:nvGrpSpPr>
+      <p:grpSpPr>
+        <a:xfrm>
+          <a:off x="0" y="0"/>
+          <a:ext cx="0" cy="0"/>
+          <a:chOff x="0" y="0"/>
+          <a:chExt cx="0" cy="0"/>
+        </a:xfrm>
+      </p:grpSpPr>
+      <p:sp>
+        <p:nvSpPr>
+          <p:cNvPr id="2" name="Header Placeholder 1"/>
+          <p:cNvSpPr>
+            <a:spLocks noGrp="1"/>
+          </p:cNvSpPr>
+          <p:nvPr>
+            <p:ph type="hdr" sz="quarter"/>
+          </p:nvPr>
+        </p:nvSpPr>
+        <p:spPr>
+          <a:xfrm>
+            <a:off x="0" y="0"/>
+            <a:ext cx="2971800" cy="457200"/>
+          </a:xfrm>
+          <a:prstGeom prst="rect">
+            <a:avLst/>
+          </a:prstGeom>
+        </p:spPr>
+        <p:txBody>
+          <a:bodyPr vert="horz" lIns="91440" tIns="45720" rIns="91440" bIns="45720" rtlCol="0"/>
+          <a:lstStyle>
+            <a:lvl1pPr algn="l">
+              <a:defRPr sz="1200"/>
+            </a:lvl1pPr>
+          </a:lstStyle>
+          <a:p>
+            <a:endParaRPr lang="en-US"/>
+          </a:p>
+        </p:txBody>
+      </p:sp>
+      <p:sp>
+        <p:nvSpPr>
+          <p:cNvPr id="3" name="Date Placeholder 2"/>
+          <p:cNvSpPr>
+            <a:spLocks noGrp="1"/>
+          </p:cNvSpPr>
+          <p:nvPr>
+            <p:ph type="dt" idx="1"/>
+          </p:nvPr>
+        </p:nvSpPr>
+        <p:spPr>
+          <a:xfrm>
+            <a:off x="3884613" y="0"/>
+            <a:ext cx="2971800" cy="457200"/>
+          </a:xfrm>
+          <a:prstGeom prst="rect">
+            <a:avLst/>
+          </a:prstGeom>
+        </p:spPr>
+        <p:txBody>
+          <a:bodyPr vert="horz" lIns="91440" tIns="45720" rIns="91440" bIns="45720" rtlCol="0"/>
+          <a:lstStyle>
+            <a:lvl1pPr algn="r">
+              <a:defRPr sz="1200"/>
+            </a:lvl1pPr>
+          </a:lstStyle>
+          <a:p>
+            <a:fld id="{409A854A-4542-4C46-92B4-B1933D0339ED}" type="datetimeFigureOut">
+              <a:rPr lang="en-US" smtClean="0"/>
+              <a:t>2/10/2017</a:t>
+            </a:fld>
+            <a:endParaRPr lang="en-US"/>
+          </a:p>
+        </p:txBody>
+      </p:sp>
+      <p:sp>
+        <p:nvSpPr>
+          <p:cNvPr id="4" name="Slide Image Placeholder 3"/>
+          <p:cNvSpPr>
+            <a:spLocks noGrp="1" noRot="1" noChangeAspect="1"/>
+          </p:cNvSpPr>
+          <p:nvPr>
+            <p:ph type="sldImg" idx="2"/>
+          </p:nvPr>
+        </p:nvSpPr>
+        <p:spPr>
+          <a:xfrm>
+            <a:off x="1143000" y="685800"/>
+            <a:ext cx="4572000" cy="3429000"/>
+          </a:xfrm>
+          <a:prstGeom prst="rect">
+            <a:avLst/>
+          </a:prstGeom>
+          <a:noFill/>
+          <a:ln w="12700">
+            <a:solidFill>
+              <a:prstClr val="black"/>
+            </a:solidFill>
+          </a:ln>
+        </p:spPr>
+        <p:txBody>
+          <a:bodyPr vert="horz" lIns="91440" tIns="45720" rIns="91440" bIns="45720" rtlCol="0" anchor="ctr"/>
+          <a:lstStyle/>
+          <a:p>
+            <a:endParaRPr lang="en-US"/>
+          </a:p>
+        </p:txBody>
+      </p:sp>
+      <p:sp>
+        <p:nvSpPr>
+          <p:cNvPr id="5" name="Notes Placeholder 4"/>
+          <p:cNvSpPr>
+            <a:spLocks noGrp="1"/>
+          </p:cNvSpPr>
+          <p:nvPr>
+            <p:ph type="body" sz="quarter" idx="3"/>
+          </p:nvPr>
+        </p:nvSpPr>
+        <p:spPr>
+          <a:xfrm>
+            <a:off x="685800" y="4343400"/>
+            <a:ext cx="5486400" cy="4114800"/>
+          </a:xfrm>
+          <a:prstGeom prst="rect">
+            <a:avLst/>
+          </a:prstGeom>
+        </p:spPr>
+        <p:txBody>
+          <a:bodyPr vert="horz" lIns="91440" tIns="45720" rIns="91440" bIns="45720" rtlCol="0"/>
+          <a:lstStyle/>
+          <a:p>
+            <a:pPr lvl="0"/>
+            <a:r>
+              <a:rPr lang="en-US" smtClean="0"/>
+              <a:t>Click to edit Master text styles</a:t>
+            </a:r>
+          </a:p>
+          <a:p>
+            <a:pPr lvl="1"/>
+            <a:r>
+              <a:rPr lang="en-US" smtClean="0"/>
+              <a:t>Second level</a:t>
+            </a:r>
+          </a:p>
+          <a:p>
+            <a:pPr lvl="2"/>
+            <a:r>
+              <a:rPr lang="en-US" smtClean="0"/>
+              <a:t>Third level</a:t>
+            </a:r>
+          </a:p>
+          <a:p>
+            <a:pPr lvl="3"/>
+            <a:r>
+              <a:rPr lang="en-US" smtClean="0"/>
+              <a:t>Fourth level</a:t>
+            </a:r>
+          </a:p>
+          <a:p>
+            <a:pPr lvl="4"/>
+            <a:r>
+              <a:rPr lang="en-US" smtClean="0"/>
+              <a:t>Fifth level</a:t>
+            </a:r>
+            <a:endParaRPr lang="en-US"/>
+          </a:p>
+        </p:txBody>
+      </p:sp>
+      <p:sp>
+        <p:nvSpPr>
+          <p:cNvPr id="6" name="Footer Placeholder 5"/>
+          <p:cNvSpPr>
+            <a:spLocks noGrp="1"/>
+          </p:cNvSpPr>
+          <p:nvPr>
+            <p:ph type="ftr" sz="quarter" idx="4"/>
+          </p:nvPr>
+        </p:nvSpPr>
+        <p:spPr>
+          <a:xfrm>
+            <a:off x="0" y="8685213"/>
+            <a:ext cx="2971800" cy="457200"/>
+          </a:xfrm>
+          <a:prstGeom prst="rect">
+            <a:avLst/>
+          </a:prstGeom>
+        </p:spPr>
+        <p:txBody>
+          <a:bodyPr vert="horz" lIns="91440" tIns="45720" rIns="91440" bIns="45720" rtlCol="0" anchor="b"/>
+          <a:lstStyle>
+            <a:lvl1pPr algn="l">
+              <a:defRPr sz="1200"/>
+            </a:lvl1pPr>
+          </a:lstStyle>
+          <a:p>
+            <a:endParaRPr lang="en-US"/>
+          </a:p>
+        </p:txBody>
+      </p:sp>
+      <p:sp>
+        <p:nvSpPr>
+          <p:cNvPr id="7" name="Slide Number Placeholder 6"/>
+          <p:cNvSpPr>
+            <a:spLocks noGrp="1"/>
+          </p:cNvSpPr>
+          <p:nvPr>
+            <p:ph type="sldNum" sz="quarter" idx="5"/>
+          </p:nvPr>
+        </p:nvSpPr>
+        <p:spPr>
+          <a:xfrm>
+            <a:off x="3884613" y="8685213"/>
+            <a:ext cx="2971800" cy="457200"/>
+          </a:xfrm>
+          <a:prstGeom prst="rect">
+            <a:avLst/>
+          </a:prstGeom>
+        </p:spPr>
+        <p:txBody>
+          <a:bodyPr vert="horz" lIns="91440" tIns="45720" rIns="91440" bIns="45720" rtlCol="0" anchor="b"/>
+          <a:lstStyle>
+            <a:lvl1pPr algn="r">
+              <a:defRPr sz="1200"/>
+            </a:lvl1pPr>
+          </a:lstStyle>
+          <a:p>
+            <a:fld id="{23A60511-65DA-4553-975B-47BBB9AD5F84}" type="slidenum">
+              <a:rPr lang="en-US" smtClean="0"/>
+              <a:t>‹#›</a:t>
+            </a:fld>
+            <a:endParaRPr lang="en-US"/>
+          </a:p>
+        </p:txBody>
+      </p:sp>
+    </p:spTree>
+    <p:extLst>
+      <p:ext uri="{BB962C8B-B14F-4D97-AF65-F5344CB8AC3E}">
+        <p14:creationId xmlns:p14="http://schemas.microsoft.com/office/powerpoint/2010/main" val="2700494425"/>
+      </p:ext>
+    </p:extLst>
+  </p:cSld>
+  <p:clrMap bg1="lt1" tx1="dk1" bg2="lt2" tx2="dk2" accent1="accent1" accent2="accent2" accent3="accent3" accent4="accent4" accent5="accent5" accent6="accent6" hlink="hlink" folHlink="folHlink"/>
+  <p:notesStyle>
+    <a:lvl1pPr marL="0" algn="l" defTabSz="914400" rtl="0" eaLnBrk="1" latinLnBrk="0" hangingPunct="1">
+      <a:defRPr sz="1200" kern="1200">
+        <a:solidFill>
+          <a:schemeClr val="tx1"/>
+        </a:solidFill>
+        <a:latin typeface="+mn-lt"/>
+        <a:ea typeface="+mn-ea"/>
+        <a:cs typeface="+mn-cs"/>
+      </a:defRPr>
+    </a:lvl1pPr>
+    <a:lvl2pPr marL="457200" algn="l" defTabSz="914400" rtl="0" eaLnBrk="1" latinLnBrk="0" hangingPunct="1">
+      <a:defRPr sz="1200" kern="1200">
+        <a:solidFill>
+          <a:schemeClr val="tx1"/>
+        </a:solidFill>
+        <a:latin typeface="+mn-lt"/>
+        <a:ea typeface="+mn-ea"/>
+        <a:cs typeface="+mn-cs"/>
+      </a:defRPr>
+    </a:lvl2pPr>
+    <a:lvl3pPr marL="914400" algn="l" defTabSz="914400" rtl="0" eaLnBrk="1" latinLnBrk="0" hangingPunct="1">
+      <a:defRPr sz="1200" kern="1200">
+        <a:solidFill>
+          <a:schemeClr val="tx1"/>
+        </a:solidFill>
+        <a:latin typeface="+mn-lt"/>
+        <a:ea typeface="+mn-ea"/>
+        <a:cs typeface="+mn-cs"/>
+      </a:defRPr>
+    </a:lvl3pPr>
+    <a:lvl4pPr marL="1371600" algn="l" defTabSz="914400" rtl="0" eaLnBrk="1" latinLnBrk="0" hangingPunct="1">
+      <a:defRPr sz="1200" kern="1200">
+        <a:solidFill>
+          <a:schemeClr val="tx1"/>
+        </a:solidFill>
+        <a:latin typeface="+mn-lt"/>
+        <a:ea typeface="+mn-ea"/>
+        <a:cs typeface="+mn-cs"/>
+      </a:defRPr>
+    </a:lvl4pPr>
+    <a:lvl5pPr marL="1828800" algn="l" defTabSz="914400" rtl="0" eaLnBrk="1" latinLnBrk="0" hangingPunct="1">
+      <a:defRPr sz="1200" kern="1200">
+        <a:solidFill>
+          <a:schemeClr val="tx1"/>
+        </a:solidFill>
+        <a:latin typeface="+mn-lt"/>
+        <a:ea typeface="+mn-ea"/>
+        <a:cs typeface="+mn-cs"/>
+      </a:defRPr>
+    </a:lvl5pPr>
+    <a:lvl6pPr marL="2286000" algn="l" defTabSz="914400" rtl="0" eaLnBrk="1" latinLnBrk="0" hangingPunct="1">
+      <a:defRPr sz="1200" kern="1200">
+        <a:solidFill>
+          <a:schemeClr val="tx1"/>
+        </a:solidFill>
+        <a:latin typeface="+mn-lt"/>
+        <a:ea typeface="+mn-ea"/>
+        <a:cs typeface="+mn-cs"/>
+      </a:defRPr>
+    </a:lvl6pPr>
+    <a:lvl7pPr marL="2743200" algn="l" defTabSz="914400" rtl="0" eaLnBrk="1" latinLnBrk="0" hangingPunct="1">
+      <a:defRPr sz="1200" kern="1200">
+        <a:solidFill>
+          <a:schemeClr val="tx1"/>
+        </a:solidFill>
+        <a:latin typeface="+mn-lt"/>
+        <a:ea typeface="+mn-ea"/>
+        <a:cs typeface="+mn-cs"/>
+      </a:defRPr>
+    </a:lvl7pPr>
+    <a:lvl8pPr marL="3200400" algn="l" defTabSz="914400" rtl="0" eaLnBrk="1" latinLnBrk="0" hangingPunct="1">
+      <a:defRPr sz="1200" kern="1200">
+        <a:solidFill>
+          <a:schemeClr val="tx1"/>
+        </a:solidFill>
+        <a:latin typeface="+mn-lt"/>
+        <a:ea typeface="+mn-ea"/>
+        <a:cs typeface="+mn-cs"/>
+      </a:defRPr>
+    </a:lvl8pPr>
+    <a:lvl9pPr marL="3657600" algn="l" defTabSz="914400" rtl="0" eaLnBrk="1" latinLnBrk="0" hangingPunct="1">
+      <a:defRPr sz="1200" kern="1200">
+        <a:solidFill>
+          <a:schemeClr val="tx1"/>
+        </a:solidFill>
+        <a:latin typeface="+mn-lt"/>
+        <a:ea typeface="+mn-ea"/>
+        <a:cs typeface="+mn-cs"/>
+      </a:defRPr>
+    </a:lvl9pPr>
+  </p:notesStyle>
+</p:notesMaster>
+</file>
+
+<file path=ppt/notesSlides/notesSlide1.xml><?xml version="1.0" encoding="utf-8"?>
+<p:notes xmlns:a="http://schemas.openxmlformats.org/drawingml/2006/main" xmlns:r="http://schemas.openxmlformats.org/officeDocument/2006/relationships" xmlns:p="http://schemas.openxmlformats.org/presentationml/2006/main">
+  <p:cSld>
+    <p:spTree>
+      <p:nvGrpSpPr>
+        <p:cNvPr id="1" name=""/>
+        <p:cNvGrpSpPr/>
+        <p:nvPr/>
+      </p:nvGrpSpPr>
+      <p:grpSpPr>
+        <a:xfrm>
+          <a:off x="0" y="0"/>
+          <a:ext cx="0" cy="0"/>
+          <a:chOff x="0" y="0"/>
+          <a:chExt cx="0" cy="0"/>
+        </a:xfrm>
+      </p:grpSpPr>
+      <p:sp>
+        <p:nvSpPr>
+          <p:cNvPr id="2" name="Slide Image Placeholder 1"/>
+          <p:cNvSpPr>
+            <a:spLocks noGrp="1" noRot="1" noChangeAspect="1"/>
+          </p:cNvSpPr>
+          <p:nvPr>
+            <p:ph type="sldImg"/>
+          </p:nvPr>
+        </p:nvSpPr>
+        <p:spPr/>
+      </p:sp>
+      <p:sp>
+        <p:nvSpPr>
+          <p:cNvPr id="3" name="Notes Placeholder 2"/>
+          <p:cNvSpPr>
+            <a:spLocks noGrp="1"/>
+          </p:cNvSpPr>
+          <p:nvPr>
+            <p:ph type="body" idx="1"/>
+          </p:nvPr>
+        </p:nvSpPr>
+        <p:spPr/>
+        <p:txBody>
+          <a:bodyPr/>
+          <a:lstStyle/>
+          <a:p>
+            <a:endParaRPr lang="en-US" dirty="0"/>
+          </a:p>
+        </p:txBody>
+      </p:sp>
+      <p:sp>
+        <p:nvSpPr>
+          <p:cNvPr id="4" name="Slide Number Placeholder 3"/>
+          <p:cNvSpPr>
+            <a:spLocks noGrp="1"/>
+          </p:cNvSpPr>
+          <p:nvPr>
+            <p:ph type="sldNum" sz="quarter" idx="10"/>
+          </p:nvPr>
+        </p:nvSpPr>
+        <p:spPr/>
+        <p:txBody>
+          <a:bodyPr/>
+          <a:lstStyle/>
+          <a:p>
+            <a:fld id="{23A60511-65DA-4553-975B-47BBB9AD5F84}" type="slidenum">
+              <a:rPr lang="en-US" smtClean="0"/>
+              <a:t>1</a:t>
+            </a:fld>
+            <a:endParaRPr lang="en-US"/>
+          </a:p>
+        </p:txBody>
+      </p:sp>
+    </p:spTree>
+    <p:extLst>
+      <p:ext uri="{BB962C8B-B14F-4D97-AF65-F5344CB8AC3E}">
+        <p14:creationId xmlns:p14="http://schemas.microsoft.com/office/powerpoint/2010/main" val="1274298518"/>
+      </p:ext>
+    </p:extLst>
+  </p:cSld>
+  <p:clrMapOvr>
+    <a:masterClrMapping/>
+  </p:clrMapOvr>
+</p:notes>
 </file>
 
 <file path=ppt/slideLayouts/slideLayout1.xml><?xml version="1.0" encoding="utf-8"?>
@@ -320,7 +760,7 @@
           <a:p>
             <a:fld id="{B6192DF9-7B65-41DB-B5A4-F73A2B2D849B}" type="datetimeFigureOut">
               <a:rPr lang="zh-TW" altLang="en-US" smtClean="0"/>
-              <a:t>2016/8/19</a:t>
+              <a:t>2017/2/10</a:t>
             </a:fld>
             <a:endParaRPr lang="zh-TW" altLang="en-US"/>
           </a:p>
@@ -490,7 +930,7 @@
           <a:p>
             <a:fld id="{B6192DF9-7B65-41DB-B5A4-F73A2B2D849B}" type="datetimeFigureOut">
               <a:rPr lang="zh-TW" altLang="en-US" smtClean="0"/>
-              <a:t>2016/8/19</a:t>
+              <a:t>2017/2/10</a:t>
             </a:fld>
             <a:endParaRPr lang="zh-TW" altLang="en-US"/>
           </a:p>
@@ -670,7 +1110,7 @@
           <a:p>
             <a:fld id="{B6192DF9-7B65-41DB-B5A4-F73A2B2D849B}" type="datetimeFigureOut">
               <a:rPr lang="zh-TW" altLang="en-US" smtClean="0"/>
-              <a:t>2016/8/19</a:t>
+              <a:t>2017/2/10</a:t>
             </a:fld>
             <a:endParaRPr lang="zh-TW" altLang="en-US"/>
           </a:p>
@@ -840,7 +1280,7 @@
           <a:p>
             <a:fld id="{B6192DF9-7B65-41DB-B5A4-F73A2B2D849B}" type="datetimeFigureOut">
               <a:rPr lang="zh-TW" altLang="en-US" smtClean="0"/>
-              <a:t>2016/8/19</a:t>
+              <a:t>2017/2/10</a:t>
             </a:fld>
             <a:endParaRPr lang="zh-TW" altLang="en-US"/>
           </a:p>
@@ -1086,7 +1526,7 @@
           <a:p>
             <a:fld id="{B6192DF9-7B65-41DB-B5A4-F73A2B2D849B}" type="datetimeFigureOut">
               <a:rPr lang="zh-TW" altLang="en-US" smtClean="0"/>
-              <a:t>2016/8/19</a:t>
+              <a:t>2017/2/10</a:t>
             </a:fld>
             <a:endParaRPr lang="zh-TW" altLang="en-US"/>
           </a:p>
@@ -1374,7 +1814,7 @@
           <a:p>
             <a:fld id="{B6192DF9-7B65-41DB-B5A4-F73A2B2D849B}" type="datetimeFigureOut">
               <a:rPr lang="zh-TW" altLang="en-US" smtClean="0"/>
-              <a:t>2016/8/19</a:t>
+              <a:t>2017/2/10</a:t>
             </a:fld>
             <a:endParaRPr lang="zh-TW" altLang="en-US"/>
           </a:p>
@@ -1796,7 +2236,7 @@
           <a:p>
             <a:fld id="{B6192DF9-7B65-41DB-B5A4-F73A2B2D849B}" type="datetimeFigureOut">
               <a:rPr lang="zh-TW" altLang="en-US" smtClean="0"/>
-              <a:t>2016/8/19</a:t>
+              <a:t>2017/2/10</a:t>
             </a:fld>
             <a:endParaRPr lang="zh-TW" altLang="en-US"/>
           </a:p>
@@ -1914,7 +2354,7 @@
           <a:p>
             <a:fld id="{B6192DF9-7B65-41DB-B5A4-F73A2B2D849B}" type="datetimeFigureOut">
               <a:rPr lang="zh-TW" altLang="en-US" smtClean="0"/>
-              <a:t>2016/8/19</a:t>
+              <a:t>2017/2/10</a:t>
             </a:fld>
             <a:endParaRPr lang="zh-TW" altLang="en-US"/>
           </a:p>
@@ -2009,7 +2449,7 @@
           <a:p>
             <a:fld id="{B6192DF9-7B65-41DB-B5A4-F73A2B2D849B}" type="datetimeFigureOut">
               <a:rPr lang="zh-TW" altLang="en-US" smtClean="0"/>
-              <a:t>2016/8/19</a:t>
+              <a:t>2017/2/10</a:t>
             </a:fld>
             <a:endParaRPr lang="zh-TW" altLang="en-US"/>
           </a:p>
@@ -2286,7 +2726,7 @@
           <a:p>
             <a:fld id="{B6192DF9-7B65-41DB-B5A4-F73A2B2D849B}" type="datetimeFigureOut">
               <a:rPr lang="zh-TW" altLang="en-US" smtClean="0"/>
-              <a:t>2016/8/19</a:t>
+              <a:t>2017/2/10</a:t>
             </a:fld>
             <a:endParaRPr lang="zh-TW" altLang="en-US"/>
           </a:p>
@@ -2539,7 +2979,7 @@
           <a:p>
             <a:fld id="{B6192DF9-7B65-41DB-B5A4-F73A2B2D849B}" type="datetimeFigureOut">
               <a:rPr lang="zh-TW" altLang="en-US" smtClean="0"/>
-              <a:t>2016/8/19</a:t>
+              <a:t>2017/2/10</a:t>
             </a:fld>
             <a:endParaRPr lang="zh-TW" altLang="en-US"/>
           </a:p>
@@ -2752,7 +3192,7 @@
           <a:p>
             <a:fld id="{B6192DF9-7B65-41DB-B5A4-F73A2B2D849B}" type="datetimeFigureOut">
               <a:rPr lang="zh-TW" altLang="en-US" smtClean="0"/>
-              <a:t>2016/8/19</a:t>
+              <a:t>2017/2/10</a:t>
             </a:fld>
             <a:endParaRPr lang="zh-TW" altLang="en-US"/>
           </a:p>
@@ -3171,159 +3611,207 @@
           </a:p>
         </p:txBody>
       </p:sp>
-      <p:grpSp>
-        <p:nvGrpSpPr>
-          <p:cNvPr id="12" name="Group 11"/>
-          <p:cNvGrpSpPr/>
+      <p:sp>
+        <p:nvSpPr>
+          <p:cNvPr id="2" name="Rounded Rectangle 1"/>
+          <p:cNvSpPr/>
           <p:nvPr/>
-        </p:nvGrpSpPr>
-        <p:grpSpPr>
+        </p:nvSpPr>
+        <p:spPr>
           <a:xfrm>
-            <a:off x="4112902" y="3036395"/>
-            <a:ext cx="918196" cy="785210"/>
-            <a:chOff x="2157788" y="3377704"/>
-            <a:chExt cx="900000" cy="761846"/>
+            <a:off x="4112902" y="3190836"/>
+            <a:ext cx="918196" cy="630769"/>
           </a:xfrm>
-        </p:grpSpPr>
-        <p:sp>
-          <p:nvSpPr>
-            <p:cNvPr id="2" name="Rounded Rectangle 1"/>
-            <p:cNvSpPr/>
-            <p:nvPr/>
-          </p:nvSpPr>
-          <p:spPr>
-            <a:xfrm>
-              <a:off x="2157788" y="3527550"/>
-              <a:ext cx="900000" cy="612000"/>
-            </a:xfrm>
-            <a:prstGeom prst="roundRect">
-              <a:avLst/>
-            </a:prstGeom>
+          <a:prstGeom prst="roundRect">
+            <a:avLst>
+              <a:gd name="adj" fmla="val 9683"/>
+            </a:avLst>
+          </a:prstGeom>
+          <a:solidFill>
+            <a:schemeClr val="bg1">
+              <a:lumMod val="65000"/>
+            </a:schemeClr>
+          </a:solidFill>
+          <a:ln w="50800">
+            <a:solidFill>
+              <a:schemeClr val="bg1">
+                <a:lumMod val="65000"/>
+              </a:schemeClr>
+            </a:solidFill>
+          </a:ln>
+        </p:spPr>
+        <p:style>
+          <a:lnRef idx="2">
+            <a:schemeClr val="accent1">
+              <a:shade val="50000"/>
+            </a:schemeClr>
+          </a:lnRef>
+          <a:fillRef idx="1">
+            <a:schemeClr val="accent1"/>
+          </a:fillRef>
+          <a:effectRef idx="0">
+            <a:schemeClr val="accent1"/>
+          </a:effectRef>
+          <a:fontRef idx="minor">
+            <a:schemeClr val="lt1"/>
+          </a:fontRef>
+        </p:style>
+        <p:txBody>
+          <a:bodyPr rtlCol="0" anchor="ctr"/>
+          <a:lstStyle/>
+          <a:p>
+            <a:pPr algn="ctr"/>
+            <a:endParaRPr lang="zh-TW" altLang="en-US"/>
+          </a:p>
+        </p:txBody>
+      </p:sp>
+      <p:sp>
+        <p:nvSpPr>
+          <p:cNvPr id="5" name="Trapezoid 4"/>
+          <p:cNvSpPr/>
+          <p:nvPr/>
+        </p:nvSpPr>
+        <p:spPr>
+          <a:xfrm>
+            <a:off x="4355976" y="3068960"/>
+            <a:ext cx="432048" cy="154440"/>
+          </a:xfrm>
+          <a:prstGeom prst="trapezoid">
+            <a:avLst>
+              <a:gd name="adj" fmla="val 51211"/>
+            </a:avLst>
+          </a:prstGeom>
+          <a:solidFill>
+            <a:schemeClr val="bg1">
+              <a:lumMod val="65000"/>
+            </a:schemeClr>
+          </a:solidFill>
+          <a:ln w="50800">
+            <a:solidFill>
+              <a:schemeClr val="bg1">
+                <a:lumMod val="65000"/>
+              </a:schemeClr>
+            </a:solidFill>
+            <a:miter lim="800000"/>
+          </a:ln>
+        </p:spPr>
+        <p:style>
+          <a:lnRef idx="2">
+            <a:schemeClr val="accent1">
+              <a:shade val="50000"/>
+            </a:schemeClr>
+          </a:lnRef>
+          <a:fillRef idx="1">
+            <a:schemeClr val="accent1"/>
+          </a:fillRef>
+          <a:effectRef idx="0">
+            <a:schemeClr val="accent1"/>
+          </a:effectRef>
+          <a:fontRef idx="minor">
+            <a:schemeClr val="lt1"/>
+          </a:fontRef>
+        </p:style>
+        <p:txBody>
+          <a:bodyPr rtlCol="0" anchor="ctr"/>
+          <a:lstStyle/>
+          <a:p>
+            <a:pPr algn="ctr"/>
+            <a:endParaRPr lang="zh-TW" altLang="en-US"/>
+          </a:p>
+        </p:txBody>
+      </p:sp>
+      <p:sp>
+        <p:nvSpPr>
+          <p:cNvPr id="6" name="Oval 5"/>
+          <p:cNvSpPr/>
+          <p:nvPr/>
+        </p:nvSpPr>
+        <p:spPr>
+          <a:xfrm>
+            <a:off x="4392000" y="3326220"/>
+            <a:ext cx="360000" cy="360000"/>
+          </a:xfrm>
+          <a:prstGeom prst="ellipse">
+            <a:avLst/>
+          </a:prstGeom>
+          <a:solidFill>
+            <a:schemeClr val="bg1"/>
+          </a:solidFill>
+          <a:ln w="50800">
             <a:noFill/>
-            <a:ln w="50800">
-              <a:solidFill>
-                <a:schemeClr val="tx1"/>
-              </a:solidFill>
-            </a:ln>
-          </p:spPr>
-          <p:style>
-            <a:lnRef idx="2">
-              <a:schemeClr val="accent1">
-                <a:shade val="50000"/>
-              </a:schemeClr>
-            </a:lnRef>
-            <a:fillRef idx="1">
-              <a:schemeClr val="accent1"/>
-            </a:fillRef>
-            <a:effectRef idx="0">
-              <a:schemeClr val="accent1"/>
-            </a:effectRef>
-            <a:fontRef idx="minor">
-              <a:schemeClr val="lt1"/>
-            </a:fontRef>
-          </p:style>
-          <p:txBody>
-            <a:bodyPr rtlCol="0" anchor="ctr"/>
-            <a:lstStyle/>
-            <a:p>
-              <a:pPr algn="ctr"/>
-              <a:endParaRPr lang="zh-TW" altLang="en-US"/>
-            </a:p>
-          </p:txBody>
-        </p:sp>
-        <p:sp>
-          <p:nvSpPr>
-            <p:cNvPr id="5" name="Trapezoid 4"/>
-            <p:cNvSpPr/>
-            <p:nvPr/>
-          </p:nvSpPr>
-          <p:spPr>
-            <a:xfrm>
-              <a:off x="2383901" y="3377704"/>
-              <a:ext cx="352905" cy="149845"/>
-            </a:xfrm>
-            <a:prstGeom prst="trapezoid">
-              <a:avLst/>
-            </a:prstGeom>
+          </a:ln>
+        </p:spPr>
+        <p:style>
+          <a:lnRef idx="2">
+            <a:schemeClr val="accent1">
+              <a:shade val="50000"/>
+            </a:schemeClr>
+          </a:lnRef>
+          <a:fillRef idx="1">
+            <a:schemeClr val="accent1"/>
+          </a:fillRef>
+          <a:effectRef idx="0">
+            <a:schemeClr val="accent1"/>
+          </a:effectRef>
+          <a:fontRef idx="minor">
+            <a:schemeClr val="lt1"/>
+          </a:fontRef>
+        </p:style>
+        <p:txBody>
+          <a:bodyPr rtlCol="0" anchor="ctr"/>
+          <a:lstStyle/>
+          <a:p>
+            <a:pPr algn="ctr"/>
+            <a:endParaRPr lang="zh-TW" altLang="en-US"/>
+          </a:p>
+        </p:txBody>
+      </p:sp>
+      <p:sp>
+        <p:nvSpPr>
+          <p:cNvPr id="8" name="Oval 7"/>
+          <p:cNvSpPr/>
+          <p:nvPr/>
+        </p:nvSpPr>
+        <p:spPr>
+          <a:xfrm>
+            <a:off x="4939178" y="3210506"/>
+            <a:ext cx="72000" cy="72000"/>
+          </a:xfrm>
+          <a:prstGeom prst="ellipse">
+            <a:avLst/>
+          </a:prstGeom>
+          <a:solidFill>
+            <a:schemeClr val="bg1"/>
+          </a:solidFill>
+          <a:ln>
             <a:noFill/>
-            <a:ln w="50800">
-              <a:solidFill>
-                <a:schemeClr val="tx1"/>
-              </a:solidFill>
-            </a:ln>
-          </p:spPr>
-          <p:style>
-            <a:lnRef idx="2">
-              <a:schemeClr val="accent1">
-                <a:shade val="50000"/>
-              </a:schemeClr>
-            </a:lnRef>
-            <a:fillRef idx="1">
-              <a:schemeClr val="accent1"/>
-            </a:fillRef>
-            <a:effectRef idx="0">
-              <a:schemeClr val="accent1"/>
-            </a:effectRef>
-            <a:fontRef idx="minor">
-              <a:schemeClr val="lt1"/>
-            </a:fontRef>
-          </p:style>
-          <p:txBody>
-            <a:bodyPr rtlCol="0" anchor="ctr"/>
-            <a:lstStyle/>
-            <a:p>
-              <a:pPr algn="ctr"/>
-              <a:endParaRPr lang="zh-TW" altLang="en-US"/>
-            </a:p>
-          </p:txBody>
-        </p:sp>
-        <p:sp>
-          <p:nvSpPr>
-            <p:cNvPr id="6" name="Oval 5"/>
-            <p:cNvSpPr/>
-            <p:nvPr/>
-          </p:nvSpPr>
-          <p:spPr>
-            <a:xfrm>
-              <a:off x="2418780" y="3644542"/>
-              <a:ext cx="378016" cy="378016"/>
-            </a:xfrm>
-            <a:prstGeom prst="ellipse">
-              <a:avLst/>
-            </a:prstGeom>
-            <a:noFill/>
-            <a:ln w="50800">
-              <a:solidFill>
-                <a:schemeClr val="tx1"/>
-              </a:solidFill>
-            </a:ln>
-          </p:spPr>
-          <p:style>
-            <a:lnRef idx="2">
-              <a:schemeClr val="accent1">
-                <a:shade val="50000"/>
-              </a:schemeClr>
-            </a:lnRef>
-            <a:fillRef idx="1">
-              <a:schemeClr val="accent1"/>
-            </a:fillRef>
-            <a:effectRef idx="0">
-              <a:schemeClr val="accent1"/>
-            </a:effectRef>
-            <a:fontRef idx="minor">
-              <a:schemeClr val="lt1"/>
-            </a:fontRef>
-          </p:style>
-          <p:txBody>
-            <a:bodyPr rtlCol="0" anchor="ctr"/>
-            <a:lstStyle/>
-            <a:p>
-              <a:pPr algn="ctr"/>
-              <a:endParaRPr lang="zh-TW" altLang="en-US"/>
-            </a:p>
-          </p:txBody>
-        </p:sp>
-      </p:grpSp>
+          </a:ln>
+        </p:spPr>
+        <p:style>
+          <a:lnRef idx="2">
+            <a:schemeClr val="accent1">
+              <a:shade val="50000"/>
+            </a:schemeClr>
+          </a:lnRef>
+          <a:fillRef idx="1">
+            <a:schemeClr val="accent1"/>
+          </a:fillRef>
+          <a:effectRef idx="0">
+            <a:schemeClr val="accent1"/>
+          </a:effectRef>
+          <a:fontRef idx="minor">
+            <a:schemeClr val="lt1"/>
+          </a:fontRef>
+        </p:style>
+        <p:txBody>
+          <a:bodyPr rtlCol="0" anchor="ctr"/>
+          <a:lstStyle/>
+          <a:p>
+            <a:pPr algn="ctr"/>
+            <a:endParaRPr lang="en-US"/>
+          </a:p>
+        </p:txBody>
+      </p:sp>
     </p:spTree>
     <p:extLst>
       <p:ext uri="{BB962C8B-B14F-4D97-AF65-F5344CB8AC3E}">
@@ -3338,6 +3826,368 @@
 </file>
 
 <file path=ppt/slides/slide10.xml><?xml version="1.0" encoding="utf-8"?>
+<p:sld xmlns:a="http://schemas.openxmlformats.org/drawingml/2006/main" xmlns:r="http://schemas.openxmlformats.org/officeDocument/2006/relationships" xmlns:p="http://schemas.openxmlformats.org/presentationml/2006/main">
+  <p:cSld>
+    <p:spTree>
+      <p:nvGrpSpPr>
+        <p:cNvPr id="1" name=""/>
+        <p:cNvGrpSpPr/>
+        <p:nvPr/>
+      </p:nvGrpSpPr>
+      <p:grpSpPr>
+        <a:xfrm>
+          <a:off x="0" y="0"/>
+          <a:ext cx="0" cy="0"/>
+          <a:chOff x="0" y="0"/>
+          <a:chExt cx="0" cy="0"/>
+        </a:xfrm>
+      </p:grpSpPr>
+      <p:sp>
+        <p:nvSpPr>
+          <p:cNvPr id="2" name="Rectangle 1"/>
+          <p:cNvSpPr/>
+          <p:nvPr/>
+        </p:nvSpPr>
+        <p:spPr>
+          <a:xfrm>
+            <a:off x="4032000" y="2889000"/>
+            <a:ext cx="1080000" cy="1080000"/>
+          </a:xfrm>
+          <a:prstGeom prst="rect">
+            <a:avLst/>
+          </a:prstGeom>
+          <a:noFill/>
+          <a:ln w="6350">
+            <a:noFill/>
+          </a:ln>
+        </p:spPr>
+        <p:style>
+          <a:lnRef idx="2">
+            <a:schemeClr val="accent1">
+              <a:shade val="50000"/>
+            </a:schemeClr>
+          </a:lnRef>
+          <a:fillRef idx="1">
+            <a:schemeClr val="accent1"/>
+          </a:fillRef>
+          <a:effectRef idx="0">
+            <a:schemeClr val="accent1"/>
+          </a:effectRef>
+          <a:fontRef idx="minor">
+            <a:schemeClr val="lt1"/>
+          </a:fontRef>
+        </p:style>
+        <p:txBody>
+          <a:bodyPr rtlCol="0" anchor="ctr"/>
+          <a:lstStyle/>
+          <a:p>
+            <a:pPr algn="ctr"/>
+            <a:endParaRPr lang="zh-TW" altLang="en-US"/>
+          </a:p>
+        </p:txBody>
+      </p:sp>
+      <p:cxnSp>
+        <p:nvCxnSpPr>
+          <p:cNvPr id="4" name="Straight Connector 3"/>
+          <p:cNvCxnSpPr/>
+          <p:nvPr/>
+        </p:nvCxnSpPr>
+        <p:spPr>
+          <a:xfrm>
+            <a:off x="4032000" y="3429000"/>
+            <a:ext cx="1080000" cy="0"/>
+          </a:xfrm>
+          <a:prstGeom prst="line">
+            <a:avLst/>
+          </a:prstGeom>
+          <a:ln w="50800">
+            <a:solidFill>
+              <a:schemeClr val="bg1">
+                <a:lumMod val="75000"/>
+              </a:schemeClr>
+            </a:solidFill>
+          </a:ln>
+        </p:spPr>
+        <p:style>
+          <a:lnRef idx="1">
+            <a:schemeClr val="accent1"/>
+          </a:lnRef>
+          <a:fillRef idx="0">
+            <a:schemeClr val="accent1"/>
+          </a:fillRef>
+          <a:effectRef idx="0">
+            <a:schemeClr val="accent1"/>
+          </a:effectRef>
+          <a:fontRef idx="minor">
+            <a:schemeClr val="tx1"/>
+          </a:fontRef>
+        </p:style>
+      </p:cxnSp>
+      <p:cxnSp>
+        <p:nvCxnSpPr>
+          <p:cNvPr id="5" name="Straight Connector 4"/>
+          <p:cNvCxnSpPr/>
+          <p:nvPr/>
+        </p:nvCxnSpPr>
+        <p:spPr>
+          <a:xfrm flipV="1">
+            <a:off x="4572000" y="2889000"/>
+            <a:ext cx="0" cy="1080000"/>
+          </a:xfrm>
+          <a:prstGeom prst="line">
+            <a:avLst/>
+          </a:prstGeom>
+          <a:ln w="50800">
+            <a:solidFill>
+              <a:schemeClr val="bg1">
+                <a:lumMod val="75000"/>
+              </a:schemeClr>
+            </a:solidFill>
+          </a:ln>
+        </p:spPr>
+        <p:style>
+          <a:lnRef idx="1">
+            <a:schemeClr val="accent1"/>
+          </a:lnRef>
+          <a:fillRef idx="0">
+            <a:schemeClr val="accent1"/>
+          </a:fillRef>
+          <a:effectRef idx="0">
+            <a:schemeClr val="accent1"/>
+          </a:effectRef>
+          <a:fontRef idx="minor">
+            <a:schemeClr val="tx1"/>
+          </a:fontRef>
+        </p:style>
+      </p:cxnSp>
+      <p:cxnSp>
+        <p:nvCxnSpPr>
+          <p:cNvPr id="7" name="Straight Connector 6"/>
+          <p:cNvCxnSpPr/>
+          <p:nvPr/>
+        </p:nvCxnSpPr>
+        <p:spPr>
+          <a:xfrm>
+            <a:off x="4212000" y="3429000"/>
+            <a:ext cx="720000" cy="0"/>
+          </a:xfrm>
+          <a:prstGeom prst="line">
+            <a:avLst/>
+          </a:prstGeom>
+          <a:ln w="50800" cap="rnd">
+            <a:solidFill>
+              <a:schemeClr val="tx1"/>
+            </a:solidFill>
+          </a:ln>
+        </p:spPr>
+        <p:style>
+          <a:lnRef idx="1">
+            <a:schemeClr val="accent1"/>
+          </a:lnRef>
+          <a:fillRef idx="0">
+            <a:schemeClr val="accent1"/>
+          </a:fillRef>
+          <a:effectRef idx="0">
+            <a:schemeClr val="accent1"/>
+          </a:effectRef>
+          <a:fontRef idx="minor">
+            <a:schemeClr val="tx1"/>
+          </a:fontRef>
+        </p:style>
+      </p:cxnSp>
+      <p:cxnSp>
+        <p:nvCxnSpPr>
+          <p:cNvPr id="8" name="Straight Connector 7"/>
+          <p:cNvCxnSpPr/>
+          <p:nvPr/>
+        </p:nvCxnSpPr>
+        <p:spPr>
+          <a:xfrm>
+            <a:off x="4572000" y="3069000"/>
+            <a:ext cx="0" cy="720000"/>
+          </a:xfrm>
+          <a:prstGeom prst="line">
+            <a:avLst/>
+          </a:prstGeom>
+          <a:ln w="50800" cap="rnd">
+            <a:solidFill>
+              <a:schemeClr val="tx1"/>
+            </a:solidFill>
+          </a:ln>
+        </p:spPr>
+        <p:style>
+          <a:lnRef idx="1">
+            <a:schemeClr val="accent1"/>
+          </a:lnRef>
+          <a:fillRef idx="0">
+            <a:schemeClr val="accent1"/>
+          </a:fillRef>
+          <a:effectRef idx="0">
+            <a:schemeClr val="accent1"/>
+          </a:effectRef>
+          <a:fontRef idx="minor">
+            <a:schemeClr val="tx1"/>
+          </a:fontRef>
+        </p:style>
+      </p:cxnSp>
+      <p:sp>
+        <p:nvSpPr>
+          <p:cNvPr id="9" name="Oval 8"/>
+          <p:cNvSpPr/>
+          <p:nvPr/>
+        </p:nvSpPr>
+        <p:spPr>
+          <a:xfrm>
+            <a:off x="4392000" y="3249000"/>
+            <a:ext cx="360000" cy="360000"/>
+          </a:xfrm>
+          <a:prstGeom prst="ellipse">
+            <a:avLst/>
+          </a:prstGeom>
+          <a:solidFill>
+            <a:schemeClr val="bg1"/>
+          </a:solidFill>
+          <a:ln w="50800" cap="rnd">
+            <a:solidFill>
+              <a:schemeClr val="tx1"/>
+            </a:solidFill>
+          </a:ln>
+        </p:spPr>
+        <p:style>
+          <a:lnRef idx="1">
+            <a:schemeClr val="accent1"/>
+          </a:lnRef>
+          <a:fillRef idx="0">
+            <a:schemeClr val="accent1"/>
+          </a:fillRef>
+          <a:effectRef idx="0">
+            <a:schemeClr val="accent1"/>
+          </a:effectRef>
+          <a:fontRef idx="minor">
+            <a:schemeClr val="tx1"/>
+          </a:fontRef>
+        </p:style>
+        <p:txBody>
+          <a:bodyPr rtlCol="0" anchor="ctr"/>
+          <a:lstStyle/>
+          <a:p>
+            <a:pPr algn="ctr"/>
+            <a:endParaRPr lang="en-US"/>
+          </a:p>
+        </p:txBody>
+      </p:sp>
+    </p:spTree>
+    <p:extLst>
+      <p:ext uri="{BB962C8B-B14F-4D97-AF65-F5344CB8AC3E}">
+        <p14:creationId xmlns:p14="http://schemas.microsoft.com/office/powerpoint/2010/main" val="3219929443"/>
+      </p:ext>
+    </p:extLst>
+  </p:cSld>
+  <p:clrMapOvr>
+    <a:masterClrMapping/>
+  </p:clrMapOvr>
+</p:sld>
+</file>
+
+<file path=ppt/slides/slide11.xml><?xml version="1.0" encoding="utf-8"?>
+<p:sld xmlns:a="http://schemas.openxmlformats.org/drawingml/2006/main" xmlns:r="http://schemas.openxmlformats.org/officeDocument/2006/relationships" xmlns:p="http://schemas.openxmlformats.org/presentationml/2006/main">
+  <p:cSld>
+    <p:spTree>
+      <p:nvGrpSpPr>
+        <p:cNvPr id="1" name=""/>
+        <p:cNvGrpSpPr/>
+        <p:nvPr/>
+      </p:nvGrpSpPr>
+      <p:grpSpPr>
+        <a:xfrm>
+          <a:off x="0" y="0"/>
+          <a:ext cx="0" cy="0"/>
+          <a:chOff x="0" y="0"/>
+          <a:chExt cx="0" cy="0"/>
+        </a:xfrm>
+      </p:grpSpPr>
+      <p:sp>
+        <p:nvSpPr>
+          <p:cNvPr id="6" name="Rectangle 5"/>
+          <p:cNvSpPr/>
+          <p:nvPr/>
+        </p:nvSpPr>
+        <p:spPr>
+          <a:xfrm>
+            <a:off x="4032000" y="2889000"/>
+            <a:ext cx="1080000" cy="1080000"/>
+          </a:xfrm>
+          <a:prstGeom prst="rect">
+            <a:avLst/>
+          </a:prstGeom>
+          <a:gradFill>
+            <a:gsLst>
+              <a:gs pos="0">
+                <a:schemeClr val="tx1">
+                  <a:lumMod val="75000"/>
+                  <a:lumOff val="25000"/>
+                </a:schemeClr>
+              </a:gs>
+              <a:gs pos="28000">
+                <a:schemeClr val="tx1">
+                  <a:lumMod val="50000"/>
+                  <a:lumOff val="50000"/>
+                </a:schemeClr>
+              </a:gs>
+              <a:gs pos="100000">
+                <a:schemeClr val="bg1"/>
+              </a:gs>
+            </a:gsLst>
+            <a:path path="circle">
+              <a:fillToRect l="50000" t="50000" r="50000" b="50000"/>
+            </a:path>
+          </a:gradFill>
+          <a:ln w="6350">
+            <a:noFill/>
+          </a:ln>
+          <a:effectLst>
+            <a:softEdge rad="127000"/>
+          </a:effectLst>
+        </p:spPr>
+        <p:style>
+          <a:lnRef idx="2">
+            <a:schemeClr val="accent1">
+              <a:shade val="50000"/>
+            </a:schemeClr>
+          </a:lnRef>
+          <a:fillRef idx="1">
+            <a:schemeClr val="accent1"/>
+          </a:fillRef>
+          <a:effectRef idx="0">
+            <a:schemeClr val="accent1"/>
+          </a:effectRef>
+          <a:fontRef idx="minor">
+            <a:schemeClr val="lt1"/>
+          </a:fontRef>
+        </p:style>
+        <p:txBody>
+          <a:bodyPr rtlCol="0" anchor="ctr"/>
+          <a:lstStyle/>
+          <a:p>
+            <a:pPr algn="ctr"/>
+            <a:endParaRPr lang="zh-TW" altLang="en-US"/>
+          </a:p>
+        </p:txBody>
+      </p:sp>
+    </p:spTree>
+    <p:extLst>
+      <p:ext uri="{BB962C8B-B14F-4D97-AF65-F5344CB8AC3E}">
+        <p14:creationId xmlns:p14="http://schemas.microsoft.com/office/powerpoint/2010/main" val="2629146378"/>
+      </p:ext>
+    </p:extLst>
+  </p:cSld>
+  <p:clrMapOvr>
+    <a:masterClrMapping/>
+  </p:clrMapOvr>
+</p:sld>
+</file>
+
+<file path=ppt/slides/slide12.xml><?xml version="1.0" encoding="utf-8"?>
 <p:sld xmlns:a="http://schemas.openxmlformats.org/drawingml/2006/main" xmlns:r="http://schemas.openxmlformats.org/officeDocument/2006/relationships" xmlns:p="http://schemas.openxmlformats.org/presentationml/2006/main">
   <p:cSld>
     <p:spTree>
@@ -3820,7 +4670,81 @@
 </p:sld>
 </file>
 
-<file path=ppt/slides/slide11.xml><?xml version="1.0" encoding="utf-8"?>
+<file path=ppt/slides/slide13.xml><?xml version="1.0" encoding="utf-8"?>
+<p:sld xmlns:a="http://schemas.openxmlformats.org/drawingml/2006/main" xmlns:r="http://schemas.openxmlformats.org/officeDocument/2006/relationships" xmlns:p="http://schemas.openxmlformats.org/presentationml/2006/main">
+  <p:cSld>
+    <p:spTree>
+      <p:nvGrpSpPr>
+        <p:cNvPr id="1" name=""/>
+        <p:cNvGrpSpPr/>
+        <p:nvPr/>
+      </p:nvGrpSpPr>
+      <p:grpSpPr>
+        <a:xfrm>
+          <a:off x="0" y="0"/>
+          <a:ext cx="0" cy="0"/>
+          <a:chOff x="0" y="0"/>
+          <a:chExt cx="0" cy="0"/>
+        </a:xfrm>
+      </p:grpSpPr>
+    </p:spTree>
+    <p:extLst>
+      <p:ext uri="{BB962C8B-B14F-4D97-AF65-F5344CB8AC3E}">
+        <p14:creationId xmlns:p14="http://schemas.microsoft.com/office/powerpoint/2010/main" val="918718557"/>
+      </p:ext>
+    </p:extLst>
+  </p:cSld>
+  <p:clrMapOvr>
+    <a:masterClrMapping/>
+  </p:clrMapOvr>
+  <p:timing>
+    <p:tnLst>
+      <p:par>
+        <p:cTn id="1" dur="indefinite" restart="never" nodeType="tmRoot"/>
+      </p:par>
+    </p:tnLst>
+  </p:timing>
+</p:sld>
+</file>
+
+<file path=ppt/slides/slide14.xml><?xml version="1.0" encoding="utf-8"?>
+<p:sld xmlns:a="http://schemas.openxmlformats.org/drawingml/2006/main" xmlns:r="http://schemas.openxmlformats.org/officeDocument/2006/relationships" xmlns:p="http://schemas.openxmlformats.org/presentationml/2006/main">
+  <p:cSld>
+    <p:spTree>
+      <p:nvGrpSpPr>
+        <p:cNvPr id="1" name=""/>
+        <p:cNvGrpSpPr/>
+        <p:nvPr/>
+      </p:nvGrpSpPr>
+      <p:grpSpPr>
+        <a:xfrm>
+          <a:off x="0" y="0"/>
+          <a:ext cx="0" cy="0"/>
+          <a:chOff x="0" y="0"/>
+          <a:chExt cx="0" cy="0"/>
+        </a:xfrm>
+      </p:grpSpPr>
+    </p:spTree>
+    <p:extLst>
+      <p:ext uri="{BB962C8B-B14F-4D97-AF65-F5344CB8AC3E}">
+        <p14:creationId xmlns:p14="http://schemas.microsoft.com/office/powerpoint/2010/main" val="737462001"/>
+      </p:ext>
+    </p:extLst>
+  </p:cSld>
+  <p:clrMapOvr>
+    <a:masterClrMapping/>
+  </p:clrMapOvr>
+  <p:timing>
+    <p:tnLst>
+      <p:par>
+        <p:cTn id="1" dur="indefinite" restart="never" nodeType="tmRoot"/>
+      </p:par>
+    </p:tnLst>
+  </p:timing>
+</p:sld>
+</file>
+
+<file path=ppt/slides/slide15.xml><?xml version="1.0" encoding="utf-8"?>
 <p:sld xmlns:a="http://schemas.openxmlformats.org/drawingml/2006/main" xmlns:r="http://schemas.openxmlformats.org/officeDocument/2006/relationships" xmlns:p="http://schemas.openxmlformats.org/presentationml/2006/main">
   <p:cSld>
     <p:spTree>
@@ -3839,118 +4763,24 @@
       </p:grpSpPr>
       <p:sp>
         <p:nvSpPr>
-          <p:cNvPr id="4" name="Rounded Rectangle 3"/>
+          <p:cNvPr id="3" name="Smiley Face 2"/>
           <p:cNvSpPr/>
           <p:nvPr/>
         </p:nvSpPr>
         <p:spPr>
           <a:xfrm>
-            <a:off x="4491682" y="2927574"/>
-            <a:ext cx="154286" cy="612000"/>
+            <a:off x="4114800" y="2971800"/>
+            <a:ext cx="914400" cy="914400"/>
           </a:xfrm>
-          <a:prstGeom prst="roundRect">
+          <a:prstGeom prst="smileyFace">
             <a:avLst>
-              <a:gd name="adj" fmla="val 50000"/>
+              <a:gd name="adj" fmla="val 4653"/>
             </a:avLst>
-          </a:prstGeom>
-          <a:solidFill>
-            <a:schemeClr val="tx1"/>
-          </a:solidFill>
-          <a:ln w="50800">
-            <a:noFill/>
-          </a:ln>
-        </p:spPr>
-        <p:style>
-          <a:lnRef idx="2">
-            <a:schemeClr val="accent1">
-              <a:shade val="50000"/>
-            </a:schemeClr>
-          </a:lnRef>
-          <a:fillRef idx="1">
-            <a:schemeClr val="accent1"/>
-          </a:fillRef>
-          <a:effectRef idx="0">
-            <a:schemeClr val="accent1"/>
-          </a:effectRef>
-          <a:fontRef idx="minor">
-            <a:schemeClr val="lt1"/>
-          </a:fontRef>
-        </p:style>
-        <p:txBody>
-          <a:bodyPr rtlCol="0" anchor="ctr"/>
-          <a:lstStyle/>
-          <a:p>
-            <a:pPr algn="ctr"/>
-            <a:endParaRPr lang="zh-TW" altLang="en-US"/>
-          </a:p>
-        </p:txBody>
-      </p:sp>
-      <p:sp>
-        <p:nvSpPr>
-          <p:cNvPr id="3" name="Rounded Rectangle 2"/>
-          <p:cNvSpPr/>
-          <p:nvPr/>
-        </p:nvSpPr>
-        <p:spPr>
-          <a:xfrm>
-            <a:off x="4128193" y="2927572"/>
-            <a:ext cx="154286" cy="1002857"/>
-          </a:xfrm>
-          <a:prstGeom prst="roundRect">
-            <a:avLst>
-              <a:gd name="adj" fmla="val 50000"/>
-            </a:avLst>
-          </a:prstGeom>
-          <a:solidFill>
-            <a:schemeClr val="tx1"/>
-          </a:solidFill>
-          <a:ln w="50800">
-            <a:noFill/>
-          </a:ln>
-        </p:spPr>
-        <p:style>
-          <a:lnRef idx="2">
-            <a:schemeClr val="accent1">
-              <a:shade val="50000"/>
-            </a:schemeClr>
-          </a:lnRef>
-          <a:fillRef idx="1">
-            <a:schemeClr val="accent1"/>
-          </a:fillRef>
-          <a:effectRef idx="0">
-            <a:schemeClr val="accent1"/>
-          </a:effectRef>
-          <a:fontRef idx="minor">
-            <a:schemeClr val="lt1"/>
-          </a:fontRef>
-        </p:style>
-        <p:txBody>
-          <a:bodyPr rtlCol="0" anchor="ctr"/>
-          <a:lstStyle/>
-          <a:p>
-            <a:pPr algn="ctr"/>
-            <a:endParaRPr lang="zh-TW" altLang="en-US"/>
-          </a:p>
-        </p:txBody>
-      </p:sp>
-      <p:sp>
-        <p:nvSpPr>
-          <p:cNvPr id="6" name="Oval 5"/>
-          <p:cNvSpPr/>
-          <p:nvPr/>
-        </p:nvSpPr>
-        <p:spPr>
-          <a:xfrm>
-            <a:off x="4079336" y="3295262"/>
-            <a:ext cx="252000" cy="252000"/>
-          </a:xfrm>
-          <a:prstGeom prst="ellipse">
-            <a:avLst/>
           </a:prstGeom>
           <a:solidFill>
             <a:schemeClr val="bg1"/>
           </a:solidFill>
-          <a:ln w="50800">
+          <a:ln w="50800" cap="rnd">
             <a:solidFill>
               <a:schemeClr val="tx1"/>
             </a:solidFill>
@@ -3977,61 +4807,13 @@
           <a:lstStyle/>
           <a:p>
             <a:pPr algn="ctr"/>
-            <a:endParaRPr lang="zh-TW" altLang="en-US"/>
+            <a:endParaRPr lang="en-US"/>
           </a:p>
         </p:txBody>
       </p:sp>
       <p:sp>
         <p:nvSpPr>
-          <p:cNvPr id="7" name="Oval 6"/>
-          <p:cNvSpPr/>
-          <p:nvPr/>
-        </p:nvSpPr>
-        <p:spPr>
-          <a:xfrm>
-            <a:off x="4442825" y="3060494"/>
-            <a:ext cx="252000" cy="252000"/>
-          </a:xfrm>
-          <a:prstGeom prst="ellipse">
-            <a:avLst/>
-          </a:prstGeom>
-          <a:solidFill>
-            <a:schemeClr val="bg1"/>
-          </a:solidFill>
-          <a:ln w="50800">
-            <a:solidFill>
-              <a:schemeClr val="tx1"/>
-            </a:solidFill>
-          </a:ln>
-        </p:spPr>
-        <p:style>
-          <a:lnRef idx="2">
-            <a:schemeClr val="accent1">
-              <a:shade val="50000"/>
-            </a:schemeClr>
-          </a:lnRef>
-          <a:fillRef idx="1">
-            <a:schemeClr val="accent1"/>
-          </a:fillRef>
-          <a:effectRef idx="0">
-            <a:schemeClr val="accent1"/>
-          </a:effectRef>
-          <a:fontRef idx="minor">
-            <a:schemeClr val="lt1"/>
-          </a:fontRef>
-        </p:style>
-        <p:txBody>
-          <a:bodyPr rtlCol="0" anchor="ctr"/>
-          <a:lstStyle/>
-          <a:p>
-            <a:pPr algn="ctr"/>
-            <a:endParaRPr lang="zh-TW" altLang="en-US"/>
-          </a:p>
-        </p:txBody>
-      </p:sp>
-      <p:sp>
-        <p:nvSpPr>
-          <p:cNvPr id="11" name="Rectangle 10"/>
+          <p:cNvPr id="4" name="Rectangle 3"/>
           <p:cNvSpPr/>
           <p:nvPr/>
         </p:nvSpPr>
@@ -4073,343 +4855,27 @@
           </a:p>
         </p:txBody>
       </p:sp>
-      <p:sp>
-        <p:nvSpPr>
-          <p:cNvPr id="10" name="Rectangle 9"/>
-          <p:cNvSpPr/>
-          <p:nvPr/>
-        </p:nvSpPr>
-        <p:spPr>
-          <a:xfrm>
-            <a:off x="4392000" y="3537000"/>
-            <a:ext cx="720000" cy="432000"/>
-          </a:xfrm>
-          <a:prstGeom prst="rect">
-            <a:avLst/>
-          </a:prstGeom>
-          <a:noFill/>
-          <a:ln w="6350">
-            <a:noFill/>
-          </a:ln>
-        </p:spPr>
-        <p:style>
-          <a:lnRef idx="2">
-            <a:schemeClr val="accent1">
-              <a:shade val="50000"/>
-            </a:schemeClr>
-          </a:lnRef>
-          <a:fillRef idx="1">
-            <a:schemeClr val="accent1"/>
-          </a:fillRef>
-          <a:effectRef idx="0">
-            <a:schemeClr val="accent1"/>
-          </a:effectRef>
-          <a:fontRef idx="minor">
-            <a:schemeClr val="lt1"/>
-          </a:fontRef>
-        </p:style>
-        <p:txBody>
-          <a:bodyPr rtlCol="0" anchor="ctr"/>
-          <a:lstStyle/>
-          <a:p>
-            <a:pPr algn="ctr"/>
-            <a:endParaRPr lang="zh-TW" altLang="en-US"/>
-          </a:p>
-        </p:txBody>
-      </p:sp>
-      <p:grpSp>
-        <p:nvGrpSpPr>
-          <p:cNvPr id="2" name="Group 1"/>
-          <p:cNvGrpSpPr/>
-          <p:nvPr/>
-        </p:nvGrpSpPr>
-        <p:grpSpPr>
-          <a:xfrm flipV="1">
-            <a:off x="4812664" y="2927574"/>
-            <a:ext cx="252000" cy="612000"/>
-            <a:chOff x="5652120" y="2848654"/>
-            <a:chExt cx="252000" cy="612000"/>
-          </a:xfrm>
-        </p:grpSpPr>
-        <p:sp>
-          <p:nvSpPr>
-            <p:cNvPr id="12" name="Rounded Rectangle 11"/>
-            <p:cNvSpPr/>
-            <p:nvPr/>
-          </p:nvSpPr>
-          <p:spPr>
-            <a:xfrm>
-              <a:off x="5700977" y="2848654"/>
-              <a:ext cx="154286" cy="612000"/>
-            </a:xfrm>
-            <a:prstGeom prst="roundRect">
-              <a:avLst>
-                <a:gd name="adj" fmla="val 50000"/>
-              </a:avLst>
-            </a:prstGeom>
-            <a:solidFill>
-              <a:schemeClr val="tx1"/>
-            </a:solidFill>
-            <a:ln w="50800">
-              <a:noFill/>
-            </a:ln>
-          </p:spPr>
-          <p:style>
-            <a:lnRef idx="2">
-              <a:schemeClr val="accent1">
-                <a:shade val="50000"/>
-              </a:schemeClr>
-            </a:lnRef>
-            <a:fillRef idx="1">
-              <a:schemeClr val="accent1"/>
-            </a:fillRef>
-            <a:effectRef idx="0">
-              <a:schemeClr val="accent1"/>
-            </a:effectRef>
-            <a:fontRef idx="minor">
-              <a:schemeClr val="lt1"/>
-            </a:fontRef>
-          </p:style>
-          <p:txBody>
-            <a:bodyPr rtlCol="0" anchor="ctr"/>
-            <a:lstStyle/>
-            <a:p>
-              <a:pPr algn="ctr"/>
-              <a:endParaRPr lang="zh-TW" altLang="en-US"/>
-            </a:p>
-          </p:txBody>
-        </p:sp>
-        <p:sp>
-          <p:nvSpPr>
-            <p:cNvPr id="13" name="Oval 12"/>
-            <p:cNvSpPr/>
-            <p:nvPr/>
-          </p:nvSpPr>
-          <p:spPr>
-            <a:xfrm>
-              <a:off x="5652120" y="2981574"/>
-              <a:ext cx="252000" cy="252000"/>
-            </a:xfrm>
-            <a:prstGeom prst="ellipse">
-              <a:avLst/>
-            </a:prstGeom>
-            <a:solidFill>
-              <a:schemeClr val="bg1"/>
-            </a:solidFill>
-            <a:ln w="50800">
-              <a:solidFill>
-                <a:schemeClr val="tx1"/>
-              </a:solidFill>
-            </a:ln>
-          </p:spPr>
-          <p:style>
-            <a:lnRef idx="2">
-              <a:schemeClr val="accent1">
-                <a:shade val="50000"/>
-              </a:schemeClr>
-            </a:lnRef>
-            <a:fillRef idx="1">
-              <a:schemeClr val="accent1"/>
-            </a:fillRef>
-            <a:effectRef idx="0">
-              <a:schemeClr val="accent1"/>
-            </a:effectRef>
-            <a:fontRef idx="minor">
-              <a:schemeClr val="lt1"/>
-            </a:fontRef>
-          </p:style>
-          <p:txBody>
-            <a:bodyPr rtlCol="0" anchor="ctr"/>
-            <a:lstStyle/>
-            <a:p>
-              <a:pPr algn="ctr"/>
-              <a:endParaRPr lang="zh-TW" altLang="en-US"/>
-            </a:p>
-          </p:txBody>
-        </p:sp>
-      </p:grpSp>
-      <p:sp>
-        <p:nvSpPr>
-          <p:cNvPr id="15" name="Rounded Rectangle 14"/>
-          <p:cNvSpPr/>
-          <p:nvPr/>
-        </p:nvSpPr>
-        <p:spPr>
-          <a:xfrm>
-            <a:off x="4501542" y="3615230"/>
-            <a:ext cx="504740" cy="289192"/>
-          </a:xfrm>
-          <a:prstGeom prst="roundRect">
-            <a:avLst/>
-          </a:prstGeom>
-          <a:noFill/>
-          <a:ln w="44450">
-            <a:solidFill>
-              <a:schemeClr val="tx1"/>
-            </a:solidFill>
-          </a:ln>
-        </p:spPr>
-        <p:style>
-          <a:lnRef idx="2">
-            <a:schemeClr val="accent1">
-              <a:shade val="50000"/>
-            </a:schemeClr>
-          </a:lnRef>
-          <a:fillRef idx="1">
-            <a:schemeClr val="accent1"/>
-          </a:fillRef>
-          <a:effectRef idx="0">
-            <a:schemeClr val="accent1"/>
-          </a:effectRef>
-          <a:fontRef idx="minor">
-            <a:schemeClr val="lt1"/>
-          </a:fontRef>
-        </p:style>
-        <p:txBody>
-          <a:bodyPr rtlCol="0" anchor="ctr"/>
-          <a:lstStyle/>
-          <a:p>
-            <a:pPr algn="ctr"/>
-            <a:endParaRPr lang="zh-TW" altLang="en-US"/>
-          </a:p>
-        </p:txBody>
-      </p:sp>
-      <p:sp>
-        <p:nvSpPr>
-          <p:cNvPr id="16" name="Trapezoid 15"/>
-          <p:cNvSpPr/>
-          <p:nvPr/>
-        </p:nvSpPr>
-        <p:spPr>
-          <a:xfrm>
-            <a:off x="4671377" y="3544422"/>
-            <a:ext cx="165070" cy="70807"/>
-          </a:xfrm>
-          <a:prstGeom prst="trapezoid">
-            <a:avLst/>
-          </a:prstGeom>
-          <a:noFill/>
-          <a:ln w="44450">
-            <a:solidFill>
-              <a:schemeClr val="tx1"/>
-            </a:solidFill>
-          </a:ln>
-        </p:spPr>
-        <p:style>
-          <a:lnRef idx="2">
-            <a:schemeClr val="accent1">
-              <a:shade val="50000"/>
-            </a:schemeClr>
-          </a:lnRef>
-          <a:fillRef idx="1">
-            <a:schemeClr val="accent1"/>
-          </a:fillRef>
-          <a:effectRef idx="0">
-            <a:schemeClr val="accent1"/>
-          </a:effectRef>
-          <a:fontRef idx="minor">
-            <a:schemeClr val="lt1"/>
-          </a:fontRef>
-        </p:style>
-        <p:txBody>
-          <a:bodyPr rtlCol="0" anchor="ctr"/>
-          <a:lstStyle/>
-          <a:p>
-            <a:pPr algn="ctr"/>
-            <a:endParaRPr lang="zh-TW" altLang="en-US"/>
-          </a:p>
-        </p:txBody>
-      </p:sp>
-      <p:sp>
-        <p:nvSpPr>
-          <p:cNvPr id="17" name="Oval 16"/>
-          <p:cNvSpPr/>
-          <p:nvPr/>
-        </p:nvSpPr>
-        <p:spPr>
-          <a:xfrm>
-            <a:off x="4665505" y="3670513"/>
-            <a:ext cx="176815" cy="178626"/>
-          </a:xfrm>
-          <a:prstGeom prst="ellipse">
-            <a:avLst/>
-          </a:prstGeom>
-          <a:noFill/>
-          <a:ln w="44450">
-            <a:solidFill>
-              <a:schemeClr val="tx1"/>
-            </a:solidFill>
-          </a:ln>
-        </p:spPr>
-        <p:style>
-          <a:lnRef idx="2">
-            <a:schemeClr val="accent1">
-              <a:shade val="50000"/>
-            </a:schemeClr>
-          </a:lnRef>
-          <a:fillRef idx="1">
-            <a:schemeClr val="accent1"/>
-          </a:fillRef>
-          <a:effectRef idx="0">
-            <a:schemeClr val="accent1"/>
-          </a:effectRef>
-          <a:fontRef idx="minor">
-            <a:schemeClr val="lt1"/>
-          </a:fontRef>
-        </p:style>
-        <p:txBody>
-          <a:bodyPr rtlCol="0" anchor="ctr"/>
-          <a:lstStyle/>
-          <a:p>
-            <a:pPr algn="ctr"/>
-            <a:endParaRPr lang="zh-TW" altLang="en-US"/>
-          </a:p>
-        </p:txBody>
-      </p:sp>
     </p:spTree>
     <p:extLst>
       <p:ext uri="{BB962C8B-B14F-4D97-AF65-F5344CB8AC3E}">
-        <p14:creationId xmlns:p14="http://schemas.microsoft.com/office/powerpoint/2010/main" val="1045806761"/>
+        <p14:creationId xmlns:p14="http://schemas.microsoft.com/office/powerpoint/2010/main" val="1201254082"/>
       </p:ext>
     </p:extLst>
   </p:cSld>
   <p:clrMapOvr>
     <a:masterClrMapping/>
   </p:clrMapOvr>
+  <p:timing>
+    <p:tnLst>
+      <p:par>
+        <p:cTn id="1" dur="indefinite" restart="never" nodeType="tmRoot"/>
+      </p:par>
+    </p:tnLst>
+  </p:timing>
 </p:sld>
 </file>
 
-<file path=ppt/slides/slide12.xml><?xml version="1.0" encoding="utf-8"?>
-<p:sld xmlns:a="http://schemas.openxmlformats.org/drawingml/2006/main" xmlns:r="http://schemas.openxmlformats.org/officeDocument/2006/relationships" xmlns:p="http://schemas.openxmlformats.org/presentationml/2006/main">
-  <p:cSld>
-    <p:spTree>
-      <p:nvGrpSpPr>
-        <p:cNvPr id="1" name=""/>
-        <p:cNvGrpSpPr/>
-        <p:nvPr/>
-      </p:nvGrpSpPr>
-      <p:grpSpPr>
-        <a:xfrm>
-          <a:off x="0" y="0"/>
-          <a:ext cx="0" cy="0"/>
-          <a:chOff x="0" y="0"/>
-          <a:chExt cx="0" cy="0"/>
-        </a:xfrm>
-      </p:grpSpPr>
-    </p:spTree>
-    <p:extLst>
-      <p:ext uri="{BB962C8B-B14F-4D97-AF65-F5344CB8AC3E}">
-        <p14:creationId xmlns:p14="http://schemas.microsoft.com/office/powerpoint/2010/main" val="903211873"/>
-      </p:ext>
-    </p:extLst>
-  </p:cSld>
-  <p:clrMapOvr>
-    <a:masterClrMapping/>
-  </p:clrMapOvr>
-</p:sld>
-</file>
-
-<file path=ppt/slides/slide13.xml><?xml version="1.0" encoding="utf-8"?>
+<file path=ppt/slides/slide16.xml><?xml version="1.0" encoding="utf-8"?>
 <p:sld xmlns:a="http://schemas.openxmlformats.org/drawingml/2006/main" xmlns:r="http://schemas.openxmlformats.org/officeDocument/2006/relationships" xmlns:p="http://schemas.openxmlformats.org/presentationml/2006/main">
   <p:cSld>
     <p:spTree>
@@ -4480,7 +4946,7 @@
 </p:sld>
 </file>
 
-<file path=ppt/slides/slide14.xml><?xml version="1.0" encoding="utf-8"?>
+<file path=ppt/slides/slide17.xml><?xml version="1.0" encoding="utf-8"?>
 <p:sld xmlns:a="http://schemas.openxmlformats.org/drawingml/2006/main" xmlns:r="http://schemas.openxmlformats.org/officeDocument/2006/relationships" xmlns:p="http://schemas.openxmlformats.org/presentationml/2006/main">
   <p:cSld>
     <p:spTree>
@@ -4664,7 +5130,7 @@
 </p:sld>
 </file>
 
-<file path=ppt/slides/slide15.xml><?xml version="1.0" encoding="utf-8"?>
+<file path=ppt/slides/slide18.xml><?xml version="1.0" encoding="utf-8"?>
 <p:sld xmlns:a="http://schemas.openxmlformats.org/drawingml/2006/main" xmlns:r="http://schemas.openxmlformats.org/officeDocument/2006/relationships" xmlns:p="http://schemas.openxmlformats.org/presentationml/2006/main">
   <p:cSld>
     <p:spTree>
@@ -5009,7 +5475,7 @@
 </p:sld>
 </file>
 
-<file path=ppt/slides/slide16.xml><?xml version="1.0" encoding="utf-8"?>
+<file path=ppt/slides/slide19.xml><?xml version="1.0" encoding="utf-8"?>
 <p:sld xmlns:a="http://schemas.openxmlformats.org/drawingml/2006/main" xmlns:r="http://schemas.openxmlformats.org/officeDocument/2006/relationships" xmlns:p="http://schemas.openxmlformats.org/presentationml/2006/main">
   <p:cSld>
     <p:spTree>
@@ -5484,7 +5950,127 @@
 </p:sld>
 </file>
 
-<file path=ppt/slides/slide17.xml><?xml version="1.0" encoding="utf-8"?>
+<file path=ppt/slides/slide2.xml><?xml version="1.0" encoding="utf-8"?>
+<p:sld xmlns:a="http://schemas.openxmlformats.org/drawingml/2006/main" xmlns:r="http://schemas.openxmlformats.org/officeDocument/2006/relationships" xmlns:p="http://schemas.openxmlformats.org/presentationml/2006/main">
+  <p:cSld>
+    <p:spTree>
+      <p:nvGrpSpPr>
+        <p:cNvPr id="1" name=""/>
+        <p:cNvGrpSpPr/>
+        <p:nvPr/>
+      </p:nvGrpSpPr>
+      <p:grpSpPr>
+        <a:xfrm>
+          <a:off x="0" y="0"/>
+          <a:ext cx="0" cy="0"/>
+          <a:chOff x="0" y="0"/>
+          <a:chExt cx="0" cy="0"/>
+        </a:xfrm>
+      </p:grpSpPr>
+      <p:sp>
+        <p:nvSpPr>
+          <p:cNvPr id="3" name="Rectangle 2"/>
+          <p:cNvSpPr/>
+          <p:nvPr/>
+        </p:nvSpPr>
+        <p:spPr>
+          <a:xfrm>
+            <a:off x="4032000" y="2889000"/>
+            <a:ext cx="1080000" cy="1080000"/>
+          </a:xfrm>
+          <a:prstGeom prst="rect">
+            <a:avLst/>
+          </a:prstGeom>
+          <a:noFill/>
+          <a:ln w="6350">
+            <a:noFill/>
+          </a:ln>
+        </p:spPr>
+        <p:style>
+          <a:lnRef idx="2">
+            <a:schemeClr val="accent1">
+              <a:shade val="50000"/>
+            </a:schemeClr>
+          </a:lnRef>
+          <a:fillRef idx="1">
+            <a:schemeClr val="accent1"/>
+          </a:fillRef>
+          <a:effectRef idx="0">
+            <a:schemeClr val="accent1"/>
+          </a:effectRef>
+          <a:fontRef idx="minor">
+            <a:schemeClr val="lt1"/>
+          </a:fontRef>
+        </p:style>
+        <p:txBody>
+          <a:bodyPr rtlCol="0" anchor="ctr"/>
+          <a:lstStyle/>
+          <a:p>
+            <a:pPr algn="ctr"/>
+            <a:endParaRPr lang="zh-TW" altLang="en-US"/>
+          </a:p>
+        </p:txBody>
+      </p:sp>
+      <p:sp>
+        <p:nvSpPr>
+          <p:cNvPr id="4" name="Oval 3"/>
+          <p:cNvSpPr/>
+          <p:nvPr/>
+        </p:nvSpPr>
+        <p:spPr>
+          <a:xfrm>
+            <a:off x="4114800" y="2971800"/>
+            <a:ext cx="914400" cy="914400"/>
+          </a:xfrm>
+          <a:prstGeom prst="ellipse">
+            <a:avLst/>
+          </a:prstGeom>
+          <a:solidFill>
+            <a:srgbClr val="FF0000"/>
+          </a:solidFill>
+          <a:ln>
+            <a:noFill/>
+          </a:ln>
+        </p:spPr>
+        <p:style>
+          <a:lnRef idx="2">
+            <a:schemeClr val="accent1">
+              <a:shade val="50000"/>
+            </a:schemeClr>
+          </a:lnRef>
+          <a:fillRef idx="1">
+            <a:schemeClr val="accent1"/>
+          </a:fillRef>
+          <a:effectRef idx="0">
+            <a:schemeClr val="accent1"/>
+          </a:effectRef>
+          <a:fontRef idx="minor">
+            <a:schemeClr val="lt1"/>
+          </a:fontRef>
+        </p:style>
+        <p:txBody>
+          <a:bodyPr rtlCol="0" anchor="ctr"/>
+          <a:lstStyle/>
+          <a:p>
+            <a:pPr algn="ctr"/>
+            <a:endParaRPr lang="en-US"/>
+          </a:p>
+        </p:txBody>
+      </p:sp>
+    </p:spTree>
+    <p:extLst>
+      <p:ext uri="{BB962C8B-B14F-4D97-AF65-F5344CB8AC3E}">
+        <p14:creationId xmlns:p14="http://schemas.microsoft.com/office/powerpoint/2010/main" val="3834815093"/>
+      </p:ext>
+    </p:extLst>
+  </p:cSld>
+  <p:clrMapOvr>
+    <a:masterClrMapping/>
+  </p:clrMapOvr>
+</p:sld>
+</file>
+
+<file path=ppt/slides/slide20.xml><?xml version="1.0" encoding="utf-8"?>
 <p:sld xmlns:a="http://schemas.openxmlformats.org/drawingml/2006/main" xmlns:r="http://schemas.openxmlformats.org/officeDocument/2006/relationships" xmlns:p="http://schemas.openxmlformats.org/presentationml/2006/main">
   <p:cSld>
     <p:spTree>
@@ -5660,7 +6246,7 @@
 </p:sld>
 </file>
 
-<file path=ppt/slides/slide18.xml><?xml version="1.0" encoding="utf-8"?>
+<file path=ppt/slides/slide21.xml><?xml version="1.0" encoding="utf-8"?>
 <p:sld xmlns:a="http://schemas.openxmlformats.org/drawingml/2006/main" xmlns:r="http://schemas.openxmlformats.org/officeDocument/2006/relationships" xmlns:p="http://schemas.openxmlformats.org/presentationml/2006/main">
   <p:cSld>
     <p:spTree>
@@ -5736,7 +6322,7 @@
 </p:sld>
 </file>
 
-<file path=ppt/slides/slide19.xml><?xml version="1.0" encoding="utf-8"?>
+<file path=ppt/slides/slide22.xml><?xml version="1.0" encoding="utf-8"?>
 <p:sld xmlns:a="http://schemas.openxmlformats.org/drawingml/2006/main" xmlns:r="http://schemas.openxmlformats.org/officeDocument/2006/relationships" xmlns:p="http://schemas.openxmlformats.org/presentationml/2006/main">
   <p:cSld>
     <p:spTree>
@@ -5962,127 +6548,7 @@
 </p:sld>
 </file>
 
-<file path=ppt/slides/slide2.xml><?xml version="1.0" encoding="utf-8"?>
-<p:sld xmlns:a="http://schemas.openxmlformats.org/drawingml/2006/main" xmlns:r="http://schemas.openxmlformats.org/officeDocument/2006/relationships" xmlns:p="http://schemas.openxmlformats.org/presentationml/2006/main">
-  <p:cSld>
-    <p:spTree>
-      <p:nvGrpSpPr>
-        <p:cNvPr id="1" name=""/>
-        <p:cNvGrpSpPr/>
-        <p:nvPr/>
-      </p:nvGrpSpPr>
-      <p:grpSpPr>
-        <a:xfrm>
-          <a:off x="0" y="0"/>
-          <a:ext cx="0" cy="0"/>
-          <a:chOff x="0" y="0"/>
-          <a:chExt cx="0" cy="0"/>
-        </a:xfrm>
-      </p:grpSpPr>
-      <p:sp>
-        <p:nvSpPr>
-          <p:cNvPr id="3" name="Rectangle 2"/>
-          <p:cNvSpPr/>
-          <p:nvPr/>
-        </p:nvSpPr>
-        <p:spPr>
-          <a:xfrm>
-            <a:off x="4032000" y="2889000"/>
-            <a:ext cx="1080000" cy="1080000"/>
-          </a:xfrm>
-          <a:prstGeom prst="rect">
-            <a:avLst/>
-          </a:prstGeom>
-          <a:noFill/>
-          <a:ln w="6350">
-            <a:noFill/>
-          </a:ln>
-        </p:spPr>
-        <p:style>
-          <a:lnRef idx="2">
-            <a:schemeClr val="accent1">
-              <a:shade val="50000"/>
-            </a:schemeClr>
-          </a:lnRef>
-          <a:fillRef idx="1">
-            <a:schemeClr val="accent1"/>
-          </a:fillRef>
-          <a:effectRef idx="0">
-            <a:schemeClr val="accent1"/>
-          </a:effectRef>
-          <a:fontRef idx="minor">
-            <a:schemeClr val="lt1"/>
-          </a:fontRef>
-        </p:style>
-        <p:txBody>
-          <a:bodyPr rtlCol="0" anchor="ctr"/>
-          <a:lstStyle/>
-          <a:p>
-            <a:pPr algn="ctr"/>
-            <a:endParaRPr lang="zh-TW" altLang="en-US"/>
-          </a:p>
-        </p:txBody>
-      </p:sp>
-      <p:sp>
-        <p:nvSpPr>
-          <p:cNvPr id="4" name="Oval 3"/>
-          <p:cNvSpPr/>
-          <p:nvPr/>
-        </p:nvSpPr>
-        <p:spPr>
-          <a:xfrm>
-            <a:off x="4114800" y="2971800"/>
-            <a:ext cx="914400" cy="914400"/>
-          </a:xfrm>
-          <a:prstGeom prst="ellipse">
-            <a:avLst/>
-          </a:prstGeom>
-          <a:solidFill>
-            <a:srgbClr val="FF0000"/>
-          </a:solidFill>
-          <a:ln>
-            <a:noFill/>
-          </a:ln>
-        </p:spPr>
-        <p:style>
-          <a:lnRef idx="2">
-            <a:schemeClr val="accent1">
-              <a:shade val="50000"/>
-            </a:schemeClr>
-          </a:lnRef>
-          <a:fillRef idx="1">
-            <a:schemeClr val="accent1"/>
-          </a:fillRef>
-          <a:effectRef idx="0">
-            <a:schemeClr val="accent1"/>
-          </a:effectRef>
-          <a:fontRef idx="minor">
-            <a:schemeClr val="lt1"/>
-          </a:fontRef>
-        </p:style>
-        <p:txBody>
-          <a:bodyPr rtlCol="0" anchor="ctr"/>
-          <a:lstStyle/>
-          <a:p>
-            <a:pPr algn="ctr"/>
-            <a:endParaRPr lang="en-US"/>
-          </a:p>
-        </p:txBody>
-      </p:sp>
-    </p:spTree>
-    <p:extLst>
-      <p:ext uri="{BB962C8B-B14F-4D97-AF65-F5344CB8AC3E}">
-        <p14:creationId xmlns:p14="http://schemas.microsoft.com/office/powerpoint/2010/main" val="3834815093"/>
-      </p:ext>
-    </p:extLst>
-  </p:cSld>
-  <p:clrMapOvr>
-    <a:masterClrMapping/>
-  </p:clrMapOvr>
-</p:sld>
-</file>
-
-<file path=ppt/slides/slide20.xml><?xml version="1.0" encoding="utf-8"?>
+<file path=ppt/slides/slide23.xml><?xml version="1.0" encoding="utf-8"?>
 <p:sld xmlns:a="http://schemas.openxmlformats.org/drawingml/2006/main" xmlns:r="http://schemas.openxmlformats.org/officeDocument/2006/relationships" xmlns:p="http://schemas.openxmlformats.org/presentationml/2006/main">
   <p:cSld>
     <p:spTree>
@@ -6430,7 +6896,7 @@
 </p:sld>
 </file>
 
-<file path=ppt/slides/slide21.xml><?xml version="1.0" encoding="utf-8"?>
+<file path=ppt/slides/slide24.xml><?xml version="1.0" encoding="utf-8"?>
 <p:sld xmlns:a="http://schemas.openxmlformats.org/drawingml/2006/main" xmlns:r="http://schemas.openxmlformats.org/officeDocument/2006/relationships" xmlns:p="http://schemas.openxmlformats.org/presentationml/2006/main">
   <p:cSld>
     <p:spTree>
@@ -6748,7 +7214,7 @@
 </p:sld>
 </file>
 
-<file path=ppt/slides/slide22.xml><?xml version="1.0" encoding="utf-8"?>
+<file path=ppt/slides/slide25.xml><?xml version="1.0" encoding="utf-8"?>
 <p:sld xmlns:a="http://schemas.openxmlformats.org/drawingml/2006/main" xmlns:r="http://schemas.openxmlformats.org/officeDocument/2006/relationships" xmlns:p="http://schemas.openxmlformats.org/presentationml/2006/main">
   <p:cSld>
     <p:spTree>
@@ -7588,7 +8054,7 @@
 </p:sld>
 </file>
 
-<file path=ppt/slides/slide23.xml><?xml version="1.0" encoding="utf-8"?>
+<file path=ppt/slides/slide26.xml><?xml version="1.0" encoding="utf-8"?>
 <p:sld xmlns:a="http://schemas.openxmlformats.org/drawingml/2006/main" xmlns:r="http://schemas.openxmlformats.org/officeDocument/2006/relationships" xmlns:p="http://schemas.openxmlformats.org/presentationml/2006/main">
   <p:cSld>
     <p:spTree>
@@ -9267,7 +9733,7 @@
 </p:sld>
 </file>
 
-<file path=ppt/slides/slide24.xml><?xml version="1.0" encoding="utf-8"?>
+<file path=ppt/slides/slide27.xml><?xml version="1.0" encoding="utf-8"?>
 <p:sld xmlns:a="http://schemas.openxmlformats.org/drawingml/2006/main" xmlns:r="http://schemas.openxmlformats.org/officeDocument/2006/relationships" xmlns:p="http://schemas.openxmlformats.org/presentationml/2006/main">
   <p:cSld>
     <p:spTree>
@@ -9510,7 +9976,7 @@
 </p:sld>
 </file>
 
-<file path=ppt/slides/slide25.xml><?xml version="1.0" encoding="utf-8"?>
+<file path=ppt/slides/slide28.xml><?xml version="1.0" encoding="utf-8"?>
 <p:sld xmlns:a="http://schemas.openxmlformats.org/drawingml/2006/main" xmlns:r="http://schemas.openxmlformats.org/officeDocument/2006/relationships" xmlns:p="http://schemas.openxmlformats.org/presentationml/2006/main">
   <p:cSld>
     <p:spTree>
@@ -10376,7 +10842,7 @@
 </p:sld>
 </file>
 
-<file path=ppt/slides/slide26.xml><?xml version="1.0" encoding="utf-8"?>
+<file path=ppt/slides/slide29.xml><?xml version="1.0" encoding="utf-8"?>
 <p:sld xmlns:a="http://schemas.openxmlformats.org/drawingml/2006/main" xmlns:r="http://schemas.openxmlformats.org/officeDocument/2006/relationships" xmlns:p="http://schemas.openxmlformats.org/presentationml/2006/main">
   <p:cSld>
     <p:spTree>
@@ -11304,7 +11770,129 @@
 </p:sld>
 </file>
 
-<file path=ppt/slides/slide27.xml><?xml version="1.0" encoding="utf-8"?>
+<file path=ppt/slides/slide3.xml><?xml version="1.0" encoding="utf-8"?>
+<p:sld xmlns:a="http://schemas.openxmlformats.org/drawingml/2006/main" xmlns:r="http://schemas.openxmlformats.org/officeDocument/2006/relationships" xmlns:p="http://schemas.openxmlformats.org/presentationml/2006/main">
+  <p:cSld>
+    <p:spTree>
+      <p:nvGrpSpPr>
+        <p:cNvPr id="1" name=""/>
+        <p:cNvGrpSpPr/>
+        <p:nvPr/>
+      </p:nvGrpSpPr>
+      <p:grpSpPr>
+        <a:xfrm>
+          <a:off x="0" y="0"/>
+          <a:ext cx="0" cy="0"/>
+          <a:chOff x="0" y="0"/>
+          <a:chExt cx="0" cy="0"/>
+        </a:xfrm>
+      </p:grpSpPr>
+      <p:sp>
+        <p:nvSpPr>
+          <p:cNvPr id="5" name="Rounded Rectangle 4"/>
+          <p:cNvSpPr/>
+          <p:nvPr/>
+        </p:nvSpPr>
+        <p:spPr>
+          <a:xfrm>
+            <a:off x="4281016" y="3140968"/>
+            <a:ext cx="576064" cy="576064"/>
+          </a:xfrm>
+          <a:prstGeom prst="roundRect">
+            <a:avLst>
+              <a:gd name="adj" fmla="val 11111"/>
+            </a:avLst>
+          </a:prstGeom>
+          <a:solidFill>
+            <a:srgbClr val="FF0000"/>
+          </a:solidFill>
+          <a:ln>
+            <a:noFill/>
+          </a:ln>
+        </p:spPr>
+        <p:style>
+          <a:lnRef idx="2">
+            <a:schemeClr val="accent1">
+              <a:shade val="50000"/>
+            </a:schemeClr>
+          </a:lnRef>
+          <a:fillRef idx="1">
+            <a:schemeClr val="accent1"/>
+          </a:fillRef>
+          <a:effectRef idx="0">
+            <a:schemeClr val="accent1"/>
+          </a:effectRef>
+          <a:fontRef idx="minor">
+            <a:schemeClr val="lt1"/>
+          </a:fontRef>
+        </p:style>
+        <p:txBody>
+          <a:bodyPr rtlCol="0" anchor="ctr"/>
+          <a:lstStyle/>
+          <a:p>
+            <a:pPr algn="ctr"/>
+            <a:endParaRPr lang="en-US"/>
+          </a:p>
+        </p:txBody>
+      </p:sp>
+      <p:sp>
+        <p:nvSpPr>
+          <p:cNvPr id="3" name="Rectangle 2"/>
+          <p:cNvSpPr/>
+          <p:nvPr/>
+        </p:nvSpPr>
+        <p:spPr>
+          <a:xfrm>
+            <a:off x="4032000" y="2889000"/>
+            <a:ext cx="1080000" cy="1080000"/>
+          </a:xfrm>
+          <a:prstGeom prst="rect">
+            <a:avLst/>
+          </a:prstGeom>
+          <a:noFill/>
+          <a:ln w="6350">
+            <a:noFill/>
+          </a:ln>
+        </p:spPr>
+        <p:style>
+          <a:lnRef idx="2">
+            <a:schemeClr val="accent1">
+              <a:shade val="50000"/>
+            </a:schemeClr>
+          </a:lnRef>
+          <a:fillRef idx="1">
+            <a:schemeClr val="accent1"/>
+          </a:fillRef>
+          <a:effectRef idx="0">
+            <a:schemeClr val="accent1"/>
+          </a:effectRef>
+          <a:fontRef idx="minor">
+            <a:schemeClr val="lt1"/>
+          </a:fontRef>
+        </p:style>
+        <p:txBody>
+          <a:bodyPr rtlCol="0" anchor="ctr"/>
+          <a:lstStyle/>
+          <a:p>
+            <a:pPr algn="ctr"/>
+            <a:endParaRPr lang="zh-TW" altLang="en-US"/>
+          </a:p>
+        </p:txBody>
+      </p:sp>
+    </p:spTree>
+    <p:extLst>
+      <p:ext uri="{BB962C8B-B14F-4D97-AF65-F5344CB8AC3E}">
+        <p14:creationId xmlns:p14="http://schemas.microsoft.com/office/powerpoint/2010/main" val="2760861898"/>
+      </p:ext>
+    </p:extLst>
+  </p:cSld>
+  <p:clrMapOvr>
+    <a:masterClrMapping/>
+  </p:clrMapOvr>
+</p:sld>
+</file>
+
+<file path=ppt/slides/slide30.xml><?xml version="1.0" encoding="utf-8"?>
 <p:sld xmlns:a="http://schemas.openxmlformats.org/drawingml/2006/main" xmlns:r="http://schemas.openxmlformats.org/officeDocument/2006/relationships" xmlns:p="http://schemas.openxmlformats.org/presentationml/2006/main">
   <p:cSld>
     <p:spTree>
@@ -12238,7 +12826,7 @@
 </p:sld>
 </file>
 
-<file path=ppt/slides/slide28.xml><?xml version="1.0" encoding="utf-8"?>
+<file path=ppt/slides/slide31.xml><?xml version="1.0" encoding="utf-8"?>
 <p:sld xmlns:a="http://schemas.openxmlformats.org/drawingml/2006/main" xmlns:r="http://schemas.openxmlformats.org/officeDocument/2006/relationships" xmlns:p="http://schemas.openxmlformats.org/presentationml/2006/main">
   <p:cSld>
     <p:spTree>
@@ -12318,7 +12906,7 @@
 </p:sld>
 </file>
 
-<file path=ppt/slides/slide29.xml><?xml version="1.0" encoding="utf-8"?>
+<file path=ppt/slides/slide32.xml><?xml version="1.0" encoding="utf-8"?>
 <p:sld xmlns:a="http://schemas.openxmlformats.org/drawingml/2006/main" xmlns:r="http://schemas.openxmlformats.org/officeDocument/2006/relationships" xmlns:p="http://schemas.openxmlformats.org/presentationml/2006/main">
   <p:cSld>
     <p:spTree>
@@ -12461,129 +13049,7 @@
 </p:sld>
 </file>
 
-<file path=ppt/slides/slide3.xml><?xml version="1.0" encoding="utf-8"?>
-<p:sld xmlns:a="http://schemas.openxmlformats.org/drawingml/2006/main" xmlns:r="http://schemas.openxmlformats.org/officeDocument/2006/relationships" xmlns:p="http://schemas.openxmlformats.org/presentationml/2006/main">
-  <p:cSld>
-    <p:spTree>
-      <p:nvGrpSpPr>
-        <p:cNvPr id="1" name=""/>
-        <p:cNvGrpSpPr/>
-        <p:nvPr/>
-      </p:nvGrpSpPr>
-      <p:grpSpPr>
-        <a:xfrm>
-          <a:off x="0" y="0"/>
-          <a:ext cx="0" cy="0"/>
-          <a:chOff x="0" y="0"/>
-          <a:chExt cx="0" cy="0"/>
-        </a:xfrm>
-      </p:grpSpPr>
-      <p:sp>
-        <p:nvSpPr>
-          <p:cNvPr id="5" name="Rounded Rectangle 4"/>
-          <p:cNvSpPr/>
-          <p:nvPr/>
-        </p:nvSpPr>
-        <p:spPr>
-          <a:xfrm>
-            <a:off x="4281016" y="3140968"/>
-            <a:ext cx="576064" cy="576064"/>
-          </a:xfrm>
-          <a:prstGeom prst="roundRect">
-            <a:avLst>
-              <a:gd name="adj" fmla="val 11111"/>
-            </a:avLst>
-          </a:prstGeom>
-          <a:solidFill>
-            <a:srgbClr val="FF0000"/>
-          </a:solidFill>
-          <a:ln>
-            <a:noFill/>
-          </a:ln>
-        </p:spPr>
-        <p:style>
-          <a:lnRef idx="2">
-            <a:schemeClr val="accent1">
-              <a:shade val="50000"/>
-            </a:schemeClr>
-          </a:lnRef>
-          <a:fillRef idx="1">
-            <a:schemeClr val="accent1"/>
-          </a:fillRef>
-          <a:effectRef idx="0">
-            <a:schemeClr val="accent1"/>
-          </a:effectRef>
-          <a:fontRef idx="minor">
-            <a:schemeClr val="lt1"/>
-          </a:fontRef>
-        </p:style>
-        <p:txBody>
-          <a:bodyPr rtlCol="0" anchor="ctr"/>
-          <a:lstStyle/>
-          <a:p>
-            <a:pPr algn="ctr"/>
-            <a:endParaRPr lang="en-US"/>
-          </a:p>
-        </p:txBody>
-      </p:sp>
-      <p:sp>
-        <p:nvSpPr>
-          <p:cNvPr id="3" name="Rectangle 2"/>
-          <p:cNvSpPr/>
-          <p:nvPr/>
-        </p:nvSpPr>
-        <p:spPr>
-          <a:xfrm>
-            <a:off x="4032000" y="2889000"/>
-            <a:ext cx="1080000" cy="1080000"/>
-          </a:xfrm>
-          <a:prstGeom prst="rect">
-            <a:avLst/>
-          </a:prstGeom>
-          <a:noFill/>
-          <a:ln w="6350">
-            <a:noFill/>
-          </a:ln>
-        </p:spPr>
-        <p:style>
-          <a:lnRef idx="2">
-            <a:schemeClr val="accent1">
-              <a:shade val="50000"/>
-            </a:schemeClr>
-          </a:lnRef>
-          <a:fillRef idx="1">
-            <a:schemeClr val="accent1"/>
-          </a:fillRef>
-          <a:effectRef idx="0">
-            <a:schemeClr val="accent1"/>
-          </a:effectRef>
-          <a:fontRef idx="minor">
-            <a:schemeClr val="lt1"/>
-          </a:fontRef>
-        </p:style>
-        <p:txBody>
-          <a:bodyPr rtlCol="0" anchor="ctr"/>
-          <a:lstStyle/>
-          <a:p>
-            <a:pPr algn="ctr"/>
-            <a:endParaRPr lang="zh-TW" altLang="en-US"/>
-          </a:p>
-        </p:txBody>
-      </p:sp>
-    </p:spTree>
-    <p:extLst>
-      <p:ext uri="{BB962C8B-B14F-4D97-AF65-F5344CB8AC3E}">
-        <p14:creationId xmlns:p14="http://schemas.microsoft.com/office/powerpoint/2010/main" val="2760861898"/>
-      </p:ext>
-    </p:extLst>
-  </p:cSld>
-  <p:clrMapOvr>
-    <a:masterClrMapping/>
-  </p:clrMapOvr>
-</p:sld>
-</file>
-
-<file path=ppt/slides/slide30.xml><?xml version="1.0" encoding="utf-8"?>
+<file path=ppt/slides/slide33.xml><?xml version="1.0" encoding="utf-8"?>
 <p:sld xmlns:a="http://schemas.openxmlformats.org/drawingml/2006/main" xmlns:r="http://schemas.openxmlformats.org/officeDocument/2006/relationships" xmlns:p="http://schemas.openxmlformats.org/presentationml/2006/main">
   <p:cSld>
     <p:spTree>
@@ -12748,7 +13214,7 @@
 </p:sld>
 </file>
 
-<file path=ppt/slides/slide31.xml><?xml version="1.0" encoding="utf-8"?>
+<file path=ppt/slides/slide34.xml><?xml version="1.0" encoding="utf-8"?>
 <p:sld xmlns:a="http://schemas.openxmlformats.org/drawingml/2006/main" xmlns:r="http://schemas.openxmlformats.org/officeDocument/2006/relationships" xmlns:p="http://schemas.openxmlformats.org/presentationml/2006/main">
   <p:cSld>
     <p:spTree>
@@ -12948,7 +13414,7 @@
 </p:sld>
 </file>
 
-<file path=ppt/slides/slide32.xml><?xml version="1.0" encoding="utf-8"?>
+<file path=ppt/slides/slide35.xml><?xml version="1.0" encoding="utf-8"?>
 <p:sld xmlns:a="http://schemas.openxmlformats.org/drawingml/2006/main" xmlns:r="http://schemas.openxmlformats.org/officeDocument/2006/relationships" xmlns:p="http://schemas.openxmlformats.org/presentationml/2006/main">
   <p:cSld>
     <p:spTree>
@@ -13305,7 +13771,7 @@
 </p:sld>
 </file>
 
-<file path=ppt/slides/slide33.xml><?xml version="1.0" encoding="utf-8"?>
+<file path=ppt/slides/slide36.xml><?xml version="1.0" encoding="utf-8"?>
 <p:sld xmlns:a="http://schemas.openxmlformats.org/drawingml/2006/main" xmlns:r="http://schemas.openxmlformats.org/officeDocument/2006/relationships" xmlns:p="http://schemas.openxmlformats.org/presentationml/2006/main">
   <p:cSld>
     <p:spTree>
@@ -13613,57 +14079,7 @@
       </p:grpSpPr>
       <p:sp>
         <p:nvSpPr>
-          <p:cNvPr id="3" name="Smiley Face 2"/>
-          <p:cNvSpPr/>
-          <p:nvPr/>
-        </p:nvSpPr>
-        <p:spPr>
-          <a:xfrm>
-            <a:off x="4114800" y="2971800"/>
-            <a:ext cx="914400" cy="914400"/>
-          </a:xfrm>
-          <a:prstGeom prst="smileyFace">
-            <a:avLst>
-              <a:gd name="adj" fmla="val 4653"/>
-            </a:avLst>
-          </a:prstGeom>
-          <a:solidFill>
-            <a:schemeClr val="bg1"/>
-          </a:solidFill>
-          <a:ln w="50800" cap="rnd">
-            <a:solidFill>
-              <a:schemeClr val="tx1"/>
-            </a:solidFill>
-          </a:ln>
-        </p:spPr>
-        <p:style>
-          <a:lnRef idx="2">
-            <a:schemeClr val="accent1">
-              <a:shade val="50000"/>
-            </a:schemeClr>
-          </a:lnRef>
-          <a:fillRef idx="1">
-            <a:schemeClr val="accent1"/>
-          </a:fillRef>
-          <a:effectRef idx="0">
-            <a:schemeClr val="accent1"/>
-          </a:effectRef>
-          <a:fontRef idx="minor">
-            <a:schemeClr val="lt1"/>
-          </a:fontRef>
-        </p:style>
-        <p:txBody>
-          <a:bodyPr rtlCol="0" anchor="ctr"/>
-          <a:lstStyle/>
-          <a:p>
-            <a:pPr algn="ctr"/>
-            <a:endParaRPr lang="en-US"/>
-          </a:p>
-        </p:txBody>
-      </p:sp>
-      <p:sp>
-        <p:nvSpPr>
-          <p:cNvPr id="4" name="Rectangle 3"/>
+          <p:cNvPr id="3" name="Rectangle 2"/>
           <p:cNvSpPr/>
           <p:nvPr/>
         </p:nvSpPr>
@@ -13705,10 +14121,802 @@
           </a:p>
         </p:txBody>
       </p:sp>
+      <p:sp>
+        <p:nvSpPr>
+          <p:cNvPr id="5" name="Trapezoid 4"/>
+          <p:cNvSpPr/>
+          <p:nvPr/>
+        </p:nvSpPr>
+        <p:spPr>
+          <a:xfrm rot="16200000">
+            <a:off x="4759785" y="3159472"/>
+            <a:ext cx="417758" cy="154440"/>
+          </a:xfrm>
+          <a:prstGeom prst="trapezoid">
+            <a:avLst>
+              <a:gd name="adj" fmla="val 51211"/>
+            </a:avLst>
+          </a:prstGeom>
+          <a:solidFill>
+            <a:schemeClr val="bg1">
+              <a:lumMod val="65000"/>
+            </a:schemeClr>
+          </a:solidFill>
+          <a:ln w="50800">
+            <a:solidFill>
+              <a:schemeClr val="bg1">
+                <a:lumMod val="65000"/>
+              </a:schemeClr>
+            </a:solidFill>
+            <a:miter lim="800000"/>
+          </a:ln>
+        </p:spPr>
+        <p:style>
+          <a:lnRef idx="2">
+            <a:schemeClr val="accent1">
+              <a:shade val="50000"/>
+            </a:schemeClr>
+          </a:lnRef>
+          <a:fillRef idx="1">
+            <a:schemeClr val="accent1"/>
+          </a:fillRef>
+          <a:effectRef idx="0">
+            <a:schemeClr val="accent1"/>
+          </a:effectRef>
+          <a:fontRef idx="minor">
+            <a:schemeClr val="lt1"/>
+          </a:fontRef>
+        </p:style>
+        <p:txBody>
+          <a:bodyPr rtlCol="0" anchor="ctr"/>
+          <a:lstStyle/>
+          <a:p>
+            <a:pPr algn="ctr"/>
+            <a:endParaRPr lang="zh-TW" altLang="en-US"/>
+          </a:p>
+        </p:txBody>
+      </p:sp>
+      <p:sp>
+        <p:nvSpPr>
+          <p:cNvPr id="11" name="Rounded Rectangle 10"/>
+          <p:cNvSpPr/>
+          <p:nvPr/>
+        </p:nvSpPr>
+        <p:spPr>
+          <a:xfrm>
+            <a:off x="4096678" y="2960688"/>
+            <a:ext cx="763354" cy="552008"/>
+          </a:xfrm>
+          <a:prstGeom prst="roundRect">
+            <a:avLst>
+              <a:gd name="adj" fmla="val 13601"/>
+            </a:avLst>
+          </a:prstGeom>
+          <a:solidFill>
+            <a:schemeClr val="bg1">
+              <a:lumMod val="65000"/>
+            </a:schemeClr>
+          </a:solidFill>
+          <a:ln w="50800">
+            <a:solidFill>
+              <a:schemeClr val="bg1">
+                <a:lumMod val="65000"/>
+              </a:schemeClr>
+            </a:solidFill>
+          </a:ln>
+        </p:spPr>
+        <p:style>
+          <a:lnRef idx="2">
+            <a:schemeClr val="accent1">
+              <a:shade val="50000"/>
+            </a:schemeClr>
+          </a:lnRef>
+          <a:fillRef idx="1">
+            <a:schemeClr val="accent1"/>
+          </a:fillRef>
+          <a:effectRef idx="0">
+            <a:schemeClr val="accent1"/>
+          </a:effectRef>
+          <a:fontRef idx="minor">
+            <a:schemeClr val="lt1"/>
+          </a:fontRef>
+        </p:style>
+        <p:txBody>
+          <a:bodyPr rtlCol="0" anchor="ctr"/>
+          <a:lstStyle/>
+          <a:p>
+            <a:pPr algn="ctr"/>
+            <a:endParaRPr lang="zh-TW" altLang="en-US"/>
+          </a:p>
+        </p:txBody>
+      </p:sp>
+      <p:pic>
+        <p:nvPicPr>
+          <p:cNvPr id="1026" name="Picture 2" descr="Image result for cursor icon"/>
+          <p:cNvPicPr>
+            <a:picLocks noChangeAspect="1" noChangeArrowheads="1"/>
+          </p:cNvPicPr>
+          <p:nvPr/>
+        </p:nvPicPr>
+        <p:blipFill>
+          <a:blip r:embed="rId2">
+            <a:extLst>
+              <a:ext uri="{28A0092B-C50C-407E-A947-70E740481C1C}">
+                <a14:useLocalDpi xmlns:a14="http://schemas.microsoft.com/office/drawing/2010/main" val="0"/>
+              </a:ext>
+            </a:extLst>
+          </a:blip>
+          <a:srcRect/>
+          <a:stretch>
+            <a:fillRect/>
+          </a:stretch>
+        </p:blipFill>
+        <p:spPr bwMode="auto">
+          <a:xfrm>
+            <a:off x="4347376" y="3311312"/>
+            <a:ext cx="618012" cy="618012"/>
+          </a:xfrm>
+          <a:prstGeom prst="rect">
+            <a:avLst/>
+          </a:prstGeom>
+          <a:noFill/>
+          <a:effectLst/>
+          <a:extLst>
+            <a:ext uri="{909E8E84-426E-40DD-AFC4-6F175D3DCCD1}">
+              <a14:hiddenFill xmlns:a14="http://schemas.microsoft.com/office/drawing/2010/main">
+                <a:solidFill>
+                  <a:srgbClr val="FFFFFF"/>
+                </a:solidFill>
+              </a14:hiddenFill>
+            </a:ext>
+          </a:extLst>
+        </p:spPr>
+      </p:pic>
     </p:spTree>
     <p:extLst>
       <p:ext uri="{BB962C8B-B14F-4D97-AF65-F5344CB8AC3E}">
-        <p14:creationId xmlns:p14="http://schemas.microsoft.com/office/powerpoint/2010/main" val="3303877153"/>
+        <p14:creationId xmlns:p14="http://schemas.microsoft.com/office/powerpoint/2010/main" val="2486687285"/>
+      </p:ext>
+    </p:extLst>
+  </p:cSld>
+  <p:clrMapOvr>
+    <a:masterClrMapping/>
+  </p:clrMapOvr>
+  <p:timing>
+    <p:tnLst>
+      <p:par>
+        <p:cTn id="1" dur="indefinite" restart="never" nodeType="tmRoot"/>
+      </p:par>
+    </p:tnLst>
+  </p:timing>
+</p:sld>
+</file>
+
+<file path=ppt/slides/slide6.xml><?xml version="1.0" encoding="utf-8"?>
+<p:sld xmlns:a="http://schemas.openxmlformats.org/drawingml/2006/main" xmlns:r="http://schemas.openxmlformats.org/officeDocument/2006/relationships" xmlns:p="http://schemas.openxmlformats.org/presentationml/2006/main">
+  <p:cSld>
+    <p:spTree>
+      <p:nvGrpSpPr>
+        <p:cNvPr id="1" name=""/>
+        <p:cNvGrpSpPr/>
+        <p:nvPr/>
+      </p:nvGrpSpPr>
+      <p:grpSpPr>
+        <a:xfrm>
+          <a:off x="0" y="0"/>
+          <a:ext cx="0" cy="0"/>
+          <a:chOff x="0" y="0"/>
+          <a:chExt cx="0" cy="0"/>
+        </a:xfrm>
+      </p:grpSpPr>
+      <p:grpSp>
+        <p:nvGrpSpPr>
+          <p:cNvPr id="8" name="Group 7"/>
+          <p:cNvGrpSpPr/>
+          <p:nvPr/>
+        </p:nvGrpSpPr>
+        <p:grpSpPr>
+          <a:xfrm>
+            <a:off x="4557205" y="3615680"/>
+            <a:ext cx="393414" cy="295125"/>
+            <a:chOff x="4573892" y="3615680"/>
+            <a:chExt cx="360040" cy="295125"/>
+          </a:xfrm>
+        </p:grpSpPr>
+        <p:sp>
+          <p:nvSpPr>
+            <p:cNvPr id="14" name="Rounded Rectangle 13"/>
+            <p:cNvSpPr/>
+            <p:nvPr/>
+          </p:nvSpPr>
+          <p:spPr>
+            <a:xfrm>
+              <a:off x="4573892" y="3663470"/>
+              <a:ext cx="360040" cy="247335"/>
+            </a:xfrm>
+            <a:prstGeom prst="roundRect">
+              <a:avLst>
+                <a:gd name="adj" fmla="val 9683"/>
+              </a:avLst>
+            </a:prstGeom>
+            <a:solidFill>
+              <a:schemeClr val="bg1">
+                <a:lumMod val="65000"/>
+              </a:schemeClr>
+            </a:solidFill>
+            <a:ln w="50800">
+              <a:solidFill>
+                <a:schemeClr val="bg1">
+                  <a:lumMod val="65000"/>
+                </a:schemeClr>
+              </a:solidFill>
+            </a:ln>
+          </p:spPr>
+          <p:style>
+            <a:lnRef idx="2">
+              <a:schemeClr val="accent1">
+                <a:shade val="50000"/>
+              </a:schemeClr>
+            </a:lnRef>
+            <a:fillRef idx="1">
+              <a:schemeClr val="accent1"/>
+            </a:fillRef>
+            <a:effectRef idx="0">
+              <a:schemeClr val="accent1"/>
+            </a:effectRef>
+            <a:fontRef idx="minor">
+              <a:schemeClr val="lt1"/>
+            </a:fontRef>
+          </p:style>
+          <p:txBody>
+            <a:bodyPr rtlCol="0" anchor="ctr"/>
+            <a:lstStyle/>
+            <a:p>
+              <a:pPr algn="ctr"/>
+              <a:endParaRPr lang="zh-TW" altLang="en-US"/>
+            </a:p>
+          </p:txBody>
+        </p:sp>
+        <p:sp>
+          <p:nvSpPr>
+            <p:cNvPr id="18" name="Trapezoid 17"/>
+            <p:cNvSpPr/>
+            <p:nvPr/>
+          </p:nvSpPr>
+          <p:spPr>
+            <a:xfrm>
+              <a:off x="4669205" y="3615680"/>
+              <a:ext cx="169413" cy="60559"/>
+            </a:xfrm>
+            <a:prstGeom prst="trapezoid">
+              <a:avLst>
+                <a:gd name="adj" fmla="val 51211"/>
+              </a:avLst>
+            </a:prstGeom>
+            <a:solidFill>
+              <a:schemeClr val="bg1">
+                <a:lumMod val="65000"/>
+              </a:schemeClr>
+            </a:solidFill>
+            <a:ln w="50800">
+              <a:solidFill>
+                <a:schemeClr val="bg1">
+                  <a:lumMod val="65000"/>
+                </a:schemeClr>
+              </a:solidFill>
+              <a:miter lim="800000"/>
+            </a:ln>
+          </p:spPr>
+          <p:style>
+            <a:lnRef idx="2">
+              <a:schemeClr val="accent1">
+                <a:shade val="50000"/>
+              </a:schemeClr>
+            </a:lnRef>
+            <a:fillRef idx="1">
+              <a:schemeClr val="accent1"/>
+            </a:fillRef>
+            <a:effectRef idx="0">
+              <a:schemeClr val="accent1"/>
+            </a:effectRef>
+            <a:fontRef idx="minor">
+              <a:schemeClr val="lt1"/>
+            </a:fontRef>
+          </p:style>
+          <p:txBody>
+            <a:bodyPr rtlCol="0" anchor="ctr"/>
+            <a:lstStyle/>
+            <a:p>
+              <a:pPr algn="ctr"/>
+              <a:endParaRPr lang="zh-TW" altLang="en-US"/>
+            </a:p>
+          </p:txBody>
+        </p:sp>
+      </p:grpSp>
+      <p:sp>
+        <p:nvSpPr>
+          <p:cNvPr id="19" name="Oval 18"/>
+          <p:cNvSpPr/>
+          <p:nvPr/>
+        </p:nvSpPr>
+        <p:spPr>
+          <a:xfrm>
+            <a:off x="4683331" y="3716556"/>
+            <a:ext cx="141162" cy="141162"/>
+          </a:xfrm>
+          <a:prstGeom prst="ellipse">
+            <a:avLst/>
+          </a:prstGeom>
+          <a:solidFill>
+            <a:schemeClr val="bg1"/>
+          </a:solidFill>
+          <a:ln w="50800">
+            <a:noFill/>
+          </a:ln>
+        </p:spPr>
+        <p:style>
+          <a:lnRef idx="2">
+            <a:schemeClr val="accent1">
+              <a:shade val="50000"/>
+            </a:schemeClr>
+          </a:lnRef>
+          <a:fillRef idx="1">
+            <a:schemeClr val="accent1"/>
+          </a:fillRef>
+          <a:effectRef idx="0">
+            <a:schemeClr val="accent1"/>
+          </a:effectRef>
+          <a:fontRef idx="minor">
+            <a:schemeClr val="lt1"/>
+          </a:fontRef>
+        </p:style>
+        <p:txBody>
+          <a:bodyPr rtlCol="0" anchor="ctr"/>
+          <a:lstStyle/>
+          <a:p>
+            <a:pPr algn="ctr"/>
+            <a:endParaRPr lang="zh-TW" altLang="en-US"/>
+          </a:p>
+        </p:txBody>
+      </p:sp>
+      <p:sp>
+        <p:nvSpPr>
+          <p:cNvPr id="20" name="Oval 19"/>
+          <p:cNvSpPr/>
+          <p:nvPr/>
+        </p:nvSpPr>
+        <p:spPr>
+          <a:xfrm>
+            <a:off x="4897889" y="3671183"/>
+            <a:ext cx="28232" cy="28232"/>
+          </a:xfrm>
+          <a:prstGeom prst="ellipse">
+            <a:avLst/>
+          </a:prstGeom>
+          <a:solidFill>
+            <a:schemeClr val="bg1"/>
+          </a:solidFill>
+          <a:ln>
+            <a:noFill/>
+          </a:ln>
+        </p:spPr>
+        <p:style>
+          <a:lnRef idx="2">
+            <a:schemeClr val="accent1">
+              <a:shade val="50000"/>
+            </a:schemeClr>
+          </a:lnRef>
+          <a:fillRef idx="1">
+            <a:schemeClr val="accent1"/>
+          </a:fillRef>
+          <a:effectRef idx="0">
+            <a:schemeClr val="accent1"/>
+          </a:effectRef>
+          <a:fontRef idx="minor">
+            <a:schemeClr val="lt1"/>
+          </a:fontRef>
+        </p:style>
+        <p:txBody>
+          <a:bodyPr rtlCol="0" anchor="ctr"/>
+          <a:lstStyle/>
+          <a:p>
+            <a:pPr algn="ctr"/>
+            <a:endParaRPr lang="en-US"/>
+          </a:p>
+        </p:txBody>
+      </p:sp>
+      <p:sp>
+        <p:nvSpPr>
+          <p:cNvPr id="4" name="Rounded Rectangle 3"/>
+          <p:cNvSpPr/>
+          <p:nvPr/>
+        </p:nvSpPr>
+        <p:spPr>
+          <a:xfrm>
+            <a:off x="4491682" y="2925000"/>
+            <a:ext cx="154286" cy="612000"/>
+          </a:xfrm>
+          <a:prstGeom prst="roundRect">
+            <a:avLst>
+              <a:gd name="adj" fmla="val 50000"/>
+            </a:avLst>
+          </a:prstGeom>
+          <a:solidFill>
+            <a:schemeClr val="bg1">
+              <a:lumMod val="65000"/>
+            </a:schemeClr>
+          </a:solidFill>
+          <a:ln w="50800">
+            <a:noFill/>
+          </a:ln>
+        </p:spPr>
+        <p:style>
+          <a:lnRef idx="2">
+            <a:schemeClr val="accent1">
+              <a:shade val="50000"/>
+            </a:schemeClr>
+          </a:lnRef>
+          <a:fillRef idx="1">
+            <a:schemeClr val="accent1"/>
+          </a:fillRef>
+          <a:effectRef idx="0">
+            <a:schemeClr val="accent1"/>
+          </a:effectRef>
+          <a:fontRef idx="minor">
+            <a:schemeClr val="lt1"/>
+          </a:fontRef>
+        </p:style>
+        <p:txBody>
+          <a:bodyPr rtlCol="0" anchor="ctr"/>
+          <a:lstStyle/>
+          <a:p>
+            <a:pPr algn="ctr"/>
+            <a:endParaRPr lang="zh-TW" altLang="en-US"/>
+          </a:p>
+        </p:txBody>
+      </p:sp>
+      <p:sp>
+        <p:nvSpPr>
+          <p:cNvPr id="3" name="Rounded Rectangle 2"/>
+          <p:cNvSpPr/>
+          <p:nvPr/>
+        </p:nvSpPr>
+        <p:spPr>
+          <a:xfrm>
+            <a:off x="4128193" y="2924998"/>
+            <a:ext cx="154286" cy="1002857"/>
+          </a:xfrm>
+          <a:prstGeom prst="roundRect">
+            <a:avLst>
+              <a:gd name="adj" fmla="val 50000"/>
+            </a:avLst>
+          </a:prstGeom>
+          <a:solidFill>
+            <a:schemeClr val="bg1">
+              <a:lumMod val="65000"/>
+            </a:schemeClr>
+          </a:solidFill>
+          <a:ln w="50800">
+            <a:noFill/>
+          </a:ln>
+        </p:spPr>
+        <p:style>
+          <a:lnRef idx="2">
+            <a:schemeClr val="accent1">
+              <a:shade val="50000"/>
+            </a:schemeClr>
+          </a:lnRef>
+          <a:fillRef idx="1">
+            <a:schemeClr val="accent1"/>
+          </a:fillRef>
+          <a:effectRef idx="0">
+            <a:schemeClr val="accent1"/>
+          </a:effectRef>
+          <a:fontRef idx="minor">
+            <a:schemeClr val="lt1"/>
+          </a:fontRef>
+        </p:style>
+        <p:txBody>
+          <a:bodyPr rtlCol="0" anchor="ctr"/>
+          <a:lstStyle/>
+          <a:p>
+            <a:pPr algn="ctr"/>
+            <a:endParaRPr lang="zh-TW" altLang="en-US"/>
+          </a:p>
+        </p:txBody>
+      </p:sp>
+      <p:sp>
+        <p:nvSpPr>
+          <p:cNvPr id="6" name="Oval 5"/>
+          <p:cNvSpPr/>
+          <p:nvPr/>
+        </p:nvSpPr>
+        <p:spPr>
+          <a:xfrm>
+            <a:off x="4115336" y="3318426"/>
+            <a:ext cx="180000" cy="180000"/>
+          </a:xfrm>
+          <a:prstGeom prst="ellipse">
+            <a:avLst/>
+          </a:prstGeom>
+          <a:solidFill>
+            <a:schemeClr val="bg1"/>
+          </a:solidFill>
+          <a:ln w="50800">
+            <a:solidFill>
+              <a:schemeClr val="bg1">
+                <a:lumMod val="65000"/>
+              </a:schemeClr>
+            </a:solidFill>
+          </a:ln>
+        </p:spPr>
+        <p:style>
+          <a:lnRef idx="2">
+            <a:schemeClr val="accent1">
+              <a:shade val="50000"/>
+            </a:schemeClr>
+          </a:lnRef>
+          <a:fillRef idx="1">
+            <a:schemeClr val="accent1"/>
+          </a:fillRef>
+          <a:effectRef idx="0">
+            <a:schemeClr val="accent1"/>
+          </a:effectRef>
+          <a:fontRef idx="minor">
+            <a:schemeClr val="lt1"/>
+          </a:fontRef>
+        </p:style>
+        <p:txBody>
+          <a:bodyPr rtlCol="0" anchor="ctr"/>
+          <a:lstStyle/>
+          <a:p>
+            <a:pPr algn="ctr"/>
+            <a:endParaRPr lang="zh-TW" altLang="en-US"/>
+          </a:p>
+        </p:txBody>
+      </p:sp>
+      <p:sp>
+        <p:nvSpPr>
+          <p:cNvPr id="7" name="Oval 6"/>
+          <p:cNvSpPr/>
+          <p:nvPr/>
+        </p:nvSpPr>
+        <p:spPr>
+          <a:xfrm>
+            <a:off x="4478825" y="3123000"/>
+            <a:ext cx="180000" cy="180000"/>
+          </a:xfrm>
+          <a:prstGeom prst="ellipse">
+            <a:avLst/>
+          </a:prstGeom>
+          <a:solidFill>
+            <a:schemeClr val="bg1"/>
+          </a:solidFill>
+          <a:ln w="50800">
+            <a:solidFill>
+              <a:schemeClr val="bg1">
+                <a:lumMod val="65000"/>
+              </a:schemeClr>
+            </a:solidFill>
+          </a:ln>
+        </p:spPr>
+        <p:style>
+          <a:lnRef idx="2">
+            <a:schemeClr val="accent1">
+              <a:shade val="50000"/>
+            </a:schemeClr>
+          </a:lnRef>
+          <a:fillRef idx="1">
+            <a:schemeClr val="accent1"/>
+          </a:fillRef>
+          <a:effectRef idx="0">
+            <a:schemeClr val="accent1"/>
+          </a:effectRef>
+          <a:fontRef idx="minor">
+            <a:schemeClr val="lt1"/>
+          </a:fontRef>
+        </p:style>
+        <p:txBody>
+          <a:bodyPr rtlCol="0" anchor="ctr"/>
+          <a:lstStyle/>
+          <a:p>
+            <a:pPr algn="ctr"/>
+            <a:endParaRPr lang="zh-TW" altLang="en-US"/>
+          </a:p>
+        </p:txBody>
+      </p:sp>
+      <p:sp>
+        <p:nvSpPr>
+          <p:cNvPr id="11" name="Rectangle 10"/>
+          <p:cNvSpPr/>
+          <p:nvPr/>
+        </p:nvSpPr>
+        <p:spPr>
+          <a:xfrm>
+            <a:off x="4032000" y="2889000"/>
+            <a:ext cx="1080000" cy="1080000"/>
+          </a:xfrm>
+          <a:prstGeom prst="rect">
+            <a:avLst/>
+          </a:prstGeom>
+          <a:noFill/>
+          <a:ln w="6350">
+            <a:noFill/>
+          </a:ln>
+        </p:spPr>
+        <p:style>
+          <a:lnRef idx="2">
+            <a:schemeClr val="accent1">
+              <a:shade val="50000"/>
+            </a:schemeClr>
+          </a:lnRef>
+          <a:fillRef idx="1">
+            <a:schemeClr val="accent1"/>
+          </a:fillRef>
+          <a:effectRef idx="0">
+            <a:schemeClr val="accent1"/>
+          </a:effectRef>
+          <a:fontRef idx="minor">
+            <a:schemeClr val="lt1"/>
+          </a:fontRef>
+        </p:style>
+        <p:txBody>
+          <a:bodyPr rtlCol="0" anchor="ctr"/>
+          <a:lstStyle/>
+          <a:p>
+            <a:pPr algn="ctr"/>
+            <a:endParaRPr lang="zh-TW" altLang="en-US"/>
+          </a:p>
+        </p:txBody>
+      </p:sp>
+      <p:sp>
+        <p:nvSpPr>
+          <p:cNvPr id="10" name="Rectangle 9"/>
+          <p:cNvSpPr/>
+          <p:nvPr/>
+        </p:nvSpPr>
+        <p:spPr>
+          <a:xfrm>
+            <a:off x="4392000" y="3537000"/>
+            <a:ext cx="720000" cy="432000"/>
+          </a:xfrm>
+          <a:prstGeom prst="rect">
+            <a:avLst/>
+          </a:prstGeom>
+          <a:noFill/>
+          <a:ln w="6350">
+            <a:noFill/>
+          </a:ln>
+        </p:spPr>
+        <p:style>
+          <a:lnRef idx="2">
+            <a:schemeClr val="accent1">
+              <a:shade val="50000"/>
+            </a:schemeClr>
+          </a:lnRef>
+          <a:fillRef idx="1">
+            <a:schemeClr val="accent1"/>
+          </a:fillRef>
+          <a:effectRef idx="0">
+            <a:schemeClr val="accent1"/>
+          </a:effectRef>
+          <a:fontRef idx="minor">
+            <a:schemeClr val="lt1"/>
+          </a:fontRef>
+        </p:style>
+        <p:txBody>
+          <a:bodyPr rtlCol="0" anchor="ctr"/>
+          <a:lstStyle/>
+          <a:p>
+            <a:pPr algn="ctr"/>
+            <a:endParaRPr lang="zh-TW" altLang="en-US"/>
+          </a:p>
+        </p:txBody>
+      </p:sp>
+      <p:sp>
+        <p:nvSpPr>
+          <p:cNvPr id="12" name="Rounded Rectangle 11"/>
+          <p:cNvSpPr/>
+          <p:nvPr/>
+        </p:nvSpPr>
+        <p:spPr>
+          <a:xfrm flipV="1">
+            <a:off x="4861521" y="2925000"/>
+            <a:ext cx="154286" cy="612000"/>
+          </a:xfrm>
+          <a:prstGeom prst="roundRect">
+            <a:avLst>
+              <a:gd name="adj" fmla="val 50000"/>
+            </a:avLst>
+          </a:prstGeom>
+          <a:solidFill>
+            <a:schemeClr val="bg1">
+              <a:lumMod val="65000"/>
+            </a:schemeClr>
+          </a:solidFill>
+          <a:ln w="50800">
+            <a:noFill/>
+          </a:ln>
+        </p:spPr>
+        <p:style>
+          <a:lnRef idx="2">
+            <a:schemeClr val="accent1">
+              <a:shade val="50000"/>
+            </a:schemeClr>
+          </a:lnRef>
+          <a:fillRef idx="1">
+            <a:schemeClr val="accent1"/>
+          </a:fillRef>
+          <a:effectRef idx="0">
+            <a:schemeClr val="accent1"/>
+          </a:effectRef>
+          <a:fontRef idx="minor">
+            <a:schemeClr val="lt1"/>
+          </a:fontRef>
+        </p:style>
+        <p:txBody>
+          <a:bodyPr rtlCol="0" anchor="ctr"/>
+          <a:lstStyle/>
+          <a:p>
+            <a:pPr algn="ctr"/>
+            <a:endParaRPr lang="zh-TW" altLang="en-US"/>
+          </a:p>
+        </p:txBody>
+      </p:sp>
+      <p:sp>
+        <p:nvSpPr>
+          <p:cNvPr id="13" name="Oval 12"/>
+          <p:cNvSpPr/>
+          <p:nvPr/>
+        </p:nvSpPr>
+        <p:spPr>
+          <a:xfrm flipV="1">
+            <a:off x="4848755" y="3123000"/>
+            <a:ext cx="180000" cy="180000"/>
+          </a:xfrm>
+          <a:prstGeom prst="ellipse">
+            <a:avLst/>
+          </a:prstGeom>
+          <a:solidFill>
+            <a:schemeClr val="bg1"/>
+          </a:solidFill>
+          <a:ln w="50800">
+            <a:solidFill>
+              <a:schemeClr val="bg1">
+                <a:lumMod val="65000"/>
+              </a:schemeClr>
+            </a:solidFill>
+          </a:ln>
+        </p:spPr>
+        <p:style>
+          <a:lnRef idx="2">
+            <a:schemeClr val="accent1">
+              <a:shade val="50000"/>
+            </a:schemeClr>
+          </a:lnRef>
+          <a:fillRef idx="1">
+            <a:schemeClr val="accent1"/>
+          </a:fillRef>
+          <a:effectRef idx="0">
+            <a:schemeClr val="accent1"/>
+          </a:effectRef>
+          <a:fontRef idx="minor">
+            <a:schemeClr val="lt1"/>
+          </a:fontRef>
+        </p:style>
+        <p:txBody>
+          <a:bodyPr rtlCol="0" anchor="ctr"/>
+          <a:lstStyle/>
+          <a:p>
+            <a:pPr algn="ctr"/>
+            <a:endParaRPr lang="zh-TW" altLang="en-US"/>
+          </a:p>
+        </p:txBody>
+      </p:sp>
+    </p:spTree>
+    <p:extLst>
+      <p:ext uri="{BB962C8B-B14F-4D97-AF65-F5344CB8AC3E}">
+        <p14:creationId xmlns:p14="http://schemas.microsoft.com/office/powerpoint/2010/main" val="3686103758"/>
       </p:ext>
     </p:extLst>
   </p:cSld>
@@ -13718,7 +14926,564 @@
 </p:sld>
 </file>
 
-<file path=ppt/slides/slide6.xml><?xml version="1.0" encoding="utf-8"?>
+<file path=ppt/slides/slide7.xml><?xml version="1.0" encoding="utf-8"?>
+<p:sld xmlns:a="http://schemas.openxmlformats.org/drawingml/2006/main" xmlns:r="http://schemas.openxmlformats.org/officeDocument/2006/relationships" xmlns:p="http://schemas.openxmlformats.org/presentationml/2006/main">
+  <p:cSld>
+    <p:spTree>
+      <p:nvGrpSpPr>
+        <p:cNvPr id="1" name=""/>
+        <p:cNvGrpSpPr/>
+        <p:nvPr/>
+      </p:nvGrpSpPr>
+      <p:grpSpPr>
+        <a:xfrm>
+          <a:off x="0" y="0"/>
+          <a:ext cx="0" cy="0"/>
+          <a:chOff x="0" y="0"/>
+          <a:chExt cx="0" cy="0"/>
+        </a:xfrm>
+      </p:grpSpPr>
+      <p:grpSp>
+        <p:nvGrpSpPr>
+          <p:cNvPr id="19" name="Group 18"/>
+          <p:cNvGrpSpPr/>
+          <p:nvPr/>
+        </p:nvGrpSpPr>
+        <p:grpSpPr>
+          <a:xfrm>
+            <a:off x="4083296" y="2935243"/>
+            <a:ext cx="396000" cy="396000"/>
+            <a:chOff x="4087000" y="2940427"/>
+            <a:chExt cx="432000" cy="432422"/>
+          </a:xfrm>
+        </p:grpSpPr>
+        <p:cxnSp>
+          <p:nvCxnSpPr>
+            <p:cNvPr id="7" name="Straight Connector 6"/>
+            <p:cNvCxnSpPr/>
+            <p:nvPr/>
+          </p:nvCxnSpPr>
+          <p:spPr>
+            <a:xfrm>
+              <a:off x="4087000" y="2940849"/>
+              <a:ext cx="0" cy="432000"/>
+            </a:xfrm>
+            <a:prstGeom prst="line">
+              <a:avLst/>
+            </a:prstGeom>
+            <a:ln w="63500" cap="rnd">
+              <a:solidFill>
+                <a:schemeClr val="tx1">
+                  <a:lumMod val="50000"/>
+                  <a:lumOff val="50000"/>
+                </a:schemeClr>
+              </a:solidFill>
+            </a:ln>
+          </p:spPr>
+          <p:style>
+            <a:lnRef idx="1">
+              <a:schemeClr val="accent1"/>
+            </a:lnRef>
+            <a:fillRef idx="0">
+              <a:schemeClr val="accent1"/>
+            </a:fillRef>
+            <a:effectRef idx="0">
+              <a:schemeClr val="accent1"/>
+            </a:effectRef>
+            <a:fontRef idx="minor">
+              <a:schemeClr val="tx1"/>
+            </a:fontRef>
+          </p:style>
+        </p:cxnSp>
+        <p:cxnSp>
+          <p:nvCxnSpPr>
+            <p:cNvPr id="8" name="Straight Connector 7"/>
+            <p:cNvCxnSpPr/>
+            <p:nvPr/>
+          </p:nvCxnSpPr>
+          <p:spPr>
+            <a:xfrm flipH="1" flipV="1">
+              <a:off x="4087000" y="2940427"/>
+              <a:ext cx="432000" cy="48"/>
+            </a:xfrm>
+            <a:prstGeom prst="line">
+              <a:avLst/>
+            </a:prstGeom>
+            <a:ln w="63500" cap="rnd">
+              <a:solidFill>
+                <a:schemeClr val="tx1">
+                  <a:lumMod val="50000"/>
+                  <a:lumOff val="50000"/>
+                </a:schemeClr>
+              </a:solidFill>
+            </a:ln>
+          </p:spPr>
+          <p:style>
+            <a:lnRef idx="1">
+              <a:schemeClr val="accent1"/>
+            </a:lnRef>
+            <a:fillRef idx="0">
+              <a:schemeClr val="accent1"/>
+            </a:fillRef>
+            <a:effectRef idx="0">
+              <a:schemeClr val="accent1"/>
+            </a:effectRef>
+            <a:fontRef idx="minor">
+              <a:schemeClr val="tx1"/>
+            </a:fontRef>
+          </p:style>
+        </p:cxnSp>
+      </p:grpSp>
+      <p:grpSp>
+        <p:nvGrpSpPr>
+          <p:cNvPr id="12" name="Group 11"/>
+          <p:cNvGrpSpPr/>
+          <p:nvPr/>
+        </p:nvGrpSpPr>
+        <p:grpSpPr>
+          <a:xfrm rot="10800000">
+            <a:off x="4668891" y="3522870"/>
+            <a:ext cx="396000" cy="396000"/>
+            <a:chOff x="4716016" y="3573016"/>
+            <a:chExt cx="432000" cy="432422"/>
+          </a:xfrm>
+        </p:grpSpPr>
+        <p:cxnSp>
+          <p:nvCxnSpPr>
+            <p:cNvPr id="10" name="Straight Connector 9"/>
+            <p:cNvCxnSpPr/>
+            <p:nvPr/>
+          </p:nvCxnSpPr>
+          <p:spPr>
+            <a:xfrm>
+              <a:off x="4716016" y="3573438"/>
+              <a:ext cx="0" cy="432000"/>
+            </a:xfrm>
+            <a:prstGeom prst="line">
+              <a:avLst/>
+            </a:prstGeom>
+            <a:ln w="63500" cap="rnd">
+              <a:solidFill>
+                <a:schemeClr val="tx1">
+                  <a:lumMod val="50000"/>
+                  <a:lumOff val="50000"/>
+                </a:schemeClr>
+              </a:solidFill>
+            </a:ln>
+          </p:spPr>
+          <p:style>
+            <a:lnRef idx="1">
+              <a:schemeClr val="accent1"/>
+            </a:lnRef>
+            <a:fillRef idx="0">
+              <a:schemeClr val="accent1"/>
+            </a:fillRef>
+            <a:effectRef idx="0">
+              <a:schemeClr val="accent1"/>
+            </a:effectRef>
+            <a:fontRef idx="minor">
+              <a:schemeClr val="tx1"/>
+            </a:fontRef>
+          </p:style>
+        </p:cxnSp>
+        <p:cxnSp>
+          <p:nvCxnSpPr>
+            <p:cNvPr id="11" name="Straight Connector 10"/>
+            <p:cNvCxnSpPr/>
+            <p:nvPr/>
+          </p:nvCxnSpPr>
+          <p:spPr>
+            <a:xfrm flipH="1" flipV="1">
+              <a:off x="4716016" y="3573016"/>
+              <a:ext cx="432000" cy="48"/>
+            </a:xfrm>
+            <a:prstGeom prst="line">
+              <a:avLst/>
+            </a:prstGeom>
+            <a:ln w="63500" cap="rnd">
+              <a:solidFill>
+                <a:schemeClr val="tx1">
+                  <a:lumMod val="50000"/>
+                  <a:lumOff val="50000"/>
+                </a:schemeClr>
+              </a:solidFill>
+            </a:ln>
+          </p:spPr>
+          <p:style>
+            <a:lnRef idx="1">
+              <a:schemeClr val="accent1"/>
+            </a:lnRef>
+            <a:fillRef idx="0">
+              <a:schemeClr val="accent1"/>
+            </a:fillRef>
+            <a:effectRef idx="0">
+              <a:schemeClr val="accent1"/>
+            </a:effectRef>
+            <a:fontRef idx="minor">
+              <a:schemeClr val="tx1"/>
+            </a:fontRef>
+          </p:style>
+        </p:cxnSp>
+      </p:grpSp>
+      <p:grpSp>
+        <p:nvGrpSpPr>
+          <p:cNvPr id="13" name="Group 12"/>
+          <p:cNvGrpSpPr/>
+          <p:nvPr/>
+        </p:nvGrpSpPr>
+        <p:grpSpPr>
+          <a:xfrm rot="5400000">
+            <a:off x="4668888" y="2935665"/>
+            <a:ext cx="396000" cy="396000"/>
+            <a:chOff x="4716016" y="3573016"/>
+            <a:chExt cx="432000" cy="432422"/>
+          </a:xfrm>
+        </p:grpSpPr>
+        <p:cxnSp>
+          <p:nvCxnSpPr>
+            <p:cNvPr id="14" name="Straight Connector 13"/>
+            <p:cNvCxnSpPr/>
+            <p:nvPr/>
+          </p:nvCxnSpPr>
+          <p:spPr>
+            <a:xfrm>
+              <a:off x="4716016" y="3573438"/>
+              <a:ext cx="0" cy="432000"/>
+            </a:xfrm>
+            <a:prstGeom prst="line">
+              <a:avLst/>
+            </a:prstGeom>
+            <a:ln w="63500" cap="rnd">
+              <a:solidFill>
+                <a:schemeClr val="tx1">
+                  <a:lumMod val="50000"/>
+                  <a:lumOff val="50000"/>
+                </a:schemeClr>
+              </a:solidFill>
+            </a:ln>
+          </p:spPr>
+          <p:style>
+            <a:lnRef idx="1">
+              <a:schemeClr val="accent1"/>
+            </a:lnRef>
+            <a:fillRef idx="0">
+              <a:schemeClr val="accent1"/>
+            </a:fillRef>
+            <a:effectRef idx="0">
+              <a:schemeClr val="accent1"/>
+            </a:effectRef>
+            <a:fontRef idx="minor">
+              <a:schemeClr val="tx1"/>
+            </a:fontRef>
+          </p:style>
+        </p:cxnSp>
+        <p:cxnSp>
+          <p:nvCxnSpPr>
+            <p:cNvPr id="15" name="Straight Connector 14"/>
+            <p:cNvCxnSpPr/>
+            <p:nvPr/>
+          </p:nvCxnSpPr>
+          <p:spPr>
+            <a:xfrm flipH="1" flipV="1">
+              <a:off x="4716016" y="3573016"/>
+              <a:ext cx="432000" cy="48"/>
+            </a:xfrm>
+            <a:prstGeom prst="line">
+              <a:avLst/>
+            </a:prstGeom>
+            <a:ln w="63500" cap="rnd">
+              <a:solidFill>
+                <a:schemeClr val="tx1">
+                  <a:lumMod val="50000"/>
+                  <a:lumOff val="50000"/>
+                </a:schemeClr>
+              </a:solidFill>
+            </a:ln>
+          </p:spPr>
+          <p:style>
+            <a:lnRef idx="1">
+              <a:schemeClr val="accent1"/>
+            </a:lnRef>
+            <a:fillRef idx="0">
+              <a:schemeClr val="accent1"/>
+            </a:fillRef>
+            <a:effectRef idx="0">
+              <a:schemeClr val="accent1"/>
+            </a:effectRef>
+            <a:fontRef idx="minor">
+              <a:schemeClr val="tx1"/>
+            </a:fontRef>
+          </p:style>
+        </p:cxnSp>
+      </p:grpSp>
+      <p:grpSp>
+        <p:nvGrpSpPr>
+          <p:cNvPr id="16" name="Group 15"/>
+          <p:cNvGrpSpPr/>
+          <p:nvPr/>
+        </p:nvGrpSpPr>
+        <p:grpSpPr>
+          <a:xfrm rot="16200000">
+            <a:off x="4084290" y="3522870"/>
+            <a:ext cx="396000" cy="396000"/>
+            <a:chOff x="4716016" y="3573016"/>
+            <a:chExt cx="432000" cy="432422"/>
+          </a:xfrm>
+        </p:grpSpPr>
+        <p:cxnSp>
+          <p:nvCxnSpPr>
+            <p:cNvPr id="17" name="Straight Connector 16"/>
+            <p:cNvCxnSpPr/>
+            <p:nvPr/>
+          </p:nvCxnSpPr>
+          <p:spPr>
+            <a:xfrm>
+              <a:off x="4716016" y="3573438"/>
+              <a:ext cx="0" cy="432000"/>
+            </a:xfrm>
+            <a:prstGeom prst="line">
+              <a:avLst/>
+            </a:prstGeom>
+            <a:ln w="63500" cap="rnd">
+              <a:solidFill>
+                <a:schemeClr val="tx1">
+                  <a:lumMod val="50000"/>
+                  <a:lumOff val="50000"/>
+                </a:schemeClr>
+              </a:solidFill>
+            </a:ln>
+          </p:spPr>
+          <p:style>
+            <a:lnRef idx="1">
+              <a:schemeClr val="accent1"/>
+            </a:lnRef>
+            <a:fillRef idx="0">
+              <a:schemeClr val="accent1"/>
+            </a:fillRef>
+            <a:effectRef idx="0">
+              <a:schemeClr val="accent1"/>
+            </a:effectRef>
+            <a:fontRef idx="minor">
+              <a:schemeClr val="tx1"/>
+            </a:fontRef>
+          </p:style>
+        </p:cxnSp>
+        <p:cxnSp>
+          <p:nvCxnSpPr>
+            <p:cNvPr id="18" name="Straight Connector 17"/>
+            <p:cNvCxnSpPr/>
+            <p:nvPr/>
+          </p:nvCxnSpPr>
+          <p:spPr>
+            <a:xfrm flipH="1" flipV="1">
+              <a:off x="4716016" y="3573016"/>
+              <a:ext cx="432000" cy="48"/>
+            </a:xfrm>
+            <a:prstGeom prst="line">
+              <a:avLst/>
+            </a:prstGeom>
+            <a:ln w="63500" cap="rnd">
+              <a:solidFill>
+                <a:schemeClr val="tx1">
+                  <a:lumMod val="50000"/>
+                  <a:lumOff val="50000"/>
+                </a:schemeClr>
+              </a:solidFill>
+            </a:ln>
+          </p:spPr>
+          <p:style>
+            <a:lnRef idx="1">
+              <a:schemeClr val="accent1"/>
+            </a:lnRef>
+            <a:fillRef idx="0">
+              <a:schemeClr val="accent1"/>
+            </a:fillRef>
+            <a:effectRef idx="0">
+              <a:schemeClr val="accent1"/>
+            </a:effectRef>
+            <a:fontRef idx="minor">
+              <a:schemeClr val="tx1"/>
+            </a:fontRef>
+          </p:style>
+        </p:cxnSp>
+      </p:grpSp>
+      <p:cxnSp>
+        <p:nvCxnSpPr>
+          <p:cNvPr id="20" name="Straight Connector 19"/>
+          <p:cNvCxnSpPr/>
+          <p:nvPr/>
+        </p:nvCxnSpPr>
+        <p:spPr>
+          <a:xfrm flipV="1">
+            <a:off x="4860024" y="3031707"/>
+            <a:ext cx="108000" cy="108000"/>
+          </a:xfrm>
+          <a:prstGeom prst="line">
+            <a:avLst/>
+          </a:prstGeom>
+          <a:ln w="63500" cap="flat">
+            <a:solidFill>
+              <a:schemeClr val="tx1">
+                <a:lumMod val="50000"/>
+                <a:lumOff val="50000"/>
+              </a:schemeClr>
+            </a:solidFill>
+            <a:tailEnd type="stealth" w="lg" len="lg"/>
+          </a:ln>
+        </p:spPr>
+        <p:style>
+          <a:lnRef idx="1">
+            <a:schemeClr val="accent1"/>
+          </a:lnRef>
+          <a:fillRef idx="0">
+            <a:schemeClr val="accent1"/>
+          </a:fillRef>
+          <a:effectRef idx="0">
+            <a:schemeClr val="accent1"/>
+          </a:effectRef>
+          <a:fontRef idx="minor">
+            <a:schemeClr val="tx1"/>
+          </a:fontRef>
+        </p:style>
+      </p:cxnSp>
+      <p:cxnSp>
+        <p:nvCxnSpPr>
+          <p:cNvPr id="21" name="Straight Connector 20"/>
+          <p:cNvCxnSpPr/>
+          <p:nvPr/>
+        </p:nvCxnSpPr>
+        <p:spPr>
+          <a:xfrm flipH="1">
+            <a:off x="4175976" y="3720629"/>
+            <a:ext cx="108000" cy="108000"/>
+          </a:xfrm>
+          <a:prstGeom prst="line">
+            <a:avLst/>
+          </a:prstGeom>
+          <a:ln w="63500" cap="flat">
+            <a:solidFill>
+              <a:schemeClr val="tx1">
+                <a:lumMod val="50000"/>
+                <a:lumOff val="50000"/>
+              </a:schemeClr>
+            </a:solidFill>
+            <a:tailEnd type="stealth" w="lg" len="lg"/>
+          </a:ln>
+        </p:spPr>
+        <p:style>
+          <a:lnRef idx="1">
+            <a:schemeClr val="accent1"/>
+          </a:lnRef>
+          <a:fillRef idx="0">
+            <a:schemeClr val="accent1"/>
+          </a:fillRef>
+          <a:effectRef idx="0">
+            <a:schemeClr val="accent1"/>
+          </a:effectRef>
+          <a:fontRef idx="minor">
+            <a:schemeClr val="tx1"/>
+          </a:fontRef>
+        </p:style>
+      </p:cxnSp>
+      <p:cxnSp>
+        <p:nvCxnSpPr>
+          <p:cNvPr id="22" name="Straight Connector 21"/>
+          <p:cNvCxnSpPr/>
+          <p:nvPr/>
+        </p:nvCxnSpPr>
+        <p:spPr>
+          <a:xfrm flipH="1" flipV="1">
+            <a:off x="4175976" y="3031707"/>
+            <a:ext cx="108000" cy="108000"/>
+          </a:xfrm>
+          <a:prstGeom prst="line">
+            <a:avLst/>
+          </a:prstGeom>
+          <a:ln w="63500" cap="flat">
+            <a:solidFill>
+              <a:schemeClr val="tx1">
+                <a:lumMod val="50000"/>
+                <a:lumOff val="50000"/>
+              </a:schemeClr>
+            </a:solidFill>
+            <a:tailEnd type="stealth" w="lg" len="lg"/>
+          </a:ln>
+        </p:spPr>
+        <p:style>
+          <a:lnRef idx="1">
+            <a:schemeClr val="accent1"/>
+          </a:lnRef>
+          <a:fillRef idx="0">
+            <a:schemeClr val="accent1"/>
+          </a:fillRef>
+          <a:effectRef idx="0">
+            <a:schemeClr val="accent1"/>
+          </a:effectRef>
+          <a:fontRef idx="minor">
+            <a:schemeClr val="tx1"/>
+          </a:fontRef>
+        </p:style>
+      </p:cxnSp>
+      <p:cxnSp>
+        <p:nvCxnSpPr>
+          <p:cNvPr id="23" name="Straight Connector 22"/>
+          <p:cNvCxnSpPr/>
+          <p:nvPr/>
+        </p:nvCxnSpPr>
+        <p:spPr>
+          <a:xfrm>
+            <a:off x="4860024" y="3720629"/>
+            <a:ext cx="108000" cy="108000"/>
+          </a:xfrm>
+          <a:prstGeom prst="line">
+            <a:avLst/>
+          </a:prstGeom>
+          <a:ln w="63500" cap="flat">
+            <a:solidFill>
+              <a:schemeClr val="tx1">
+                <a:lumMod val="50000"/>
+                <a:lumOff val="50000"/>
+              </a:schemeClr>
+            </a:solidFill>
+            <a:tailEnd type="stealth" w="lg" len="lg"/>
+          </a:ln>
+        </p:spPr>
+        <p:style>
+          <a:lnRef idx="1">
+            <a:schemeClr val="accent1"/>
+          </a:lnRef>
+          <a:fillRef idx="0">
+            <a:schemeClr val="accent1"/>
+          </a:fillRef>
+          <a:effectRef idx="0">
+            <a:schemeClr val="accent1"/>
+          </a:effectRef>
+          <a:fontRef idx="minor">
+            <a:schemeClr val="tx1"/>
+          </a:fontRef>
+        </p:style>
+      </p:cxnSp>
+    </p:spTree>
+    <p:extLst>
+      <p:ext uri="{BB962C8B-B14F-4D97-AF65-F5344CB8AC3E}">
+        <p14:creationId xmlns:p14="http://schemas.microsoft.com/office/powerpoint/2010/main" val="873044300"/>
+      </p:ext>
+    </p:extLst>
+  </p:cSld>
+  <p:clrMapOvr>
+    <a:masterClrMapping/>
+  </p:clrMapOvr>
+  <p:timing>
+    <p:tnLst>
+      <p:par>
+        <p:cTn id="1" dur="indefinite" restart="never" nodeType="tmRoot"/>
+      </p:par>
+    </p:tnLst>
+  </p:timing>
+</p:sld>
+</file>
+
+<file path=ppt/slides/slide8.xml><?xml version="1.0" encoding="utf-8"?>
 <p:sld xmlns:a="http://schemas.openxmlformats.org/drawingml/2006/main" xmlns:r="http://schemas.openxmlformats.org/officeDocument/2006/relationships" xmlns:p="http://schemas.openxmlformats.org/presentationml/2006/main">
   <p:cSld>
     <p:spTree>
@@ -13904,7 +15669,7 @@
 </p:sld>
 </file>
 
-<file path=ppt/slides/slide7.xml><?xml version="1.0" encoding="utf-8"?>
+<file path=ppt/slides/slide9.xml><?xml version="1.0" encoding="utf-8"?>
 <p:sld xmlns:a="http://schemas.openxmlformats.org/drawingml/2006/main" xmlns:r="http://schemas.openxmlformats.org/officeDocument/2006/relationships" xmlns:p="http://schemas.openxmlformats.org/presentationml/2006/main">
   <p:cSld>
     <p:spTree>
@@ -14069,368 +15834,6 @@
     <p:extLst>
       <p:ext uri="{BB962C8B-B14F-4D97-AF65-F5344CB8AC3E}">
         <p14:creationId xmlns:p14="http://schemas.microsoft.com/office/powerpoint/2010/main" val="3442899508"/>
-      </p:ext>
-    </p:extLst>
-  </p:cSld>
-  <p:clrMapOvr>
-    <a:masterClrMapping/>
-  </p:clrMapOvr>
-</p:sld>
-</file>
-
-<file path=ppt/slides/slide8.xml><?xml version="1.0" encoding="utf-8"?>
-<p:sld xmlns:a="http://schemas.openxmlformats.org/drawingml/2006/main" xmlns:r="http://schemas.openxmlformats.org/officeDocument/2006/relationships" xmlns:p="http://schemas.openxmlformats.org/presentationml/2006/main">
-  <p:cSld>
-    <p:spTree>
-      <p:nvGrpSpPr>
-        <p:cNvPr id="1" name=""/>
-        <p:cNvGrpSpPr/>
-        <p:nvPr/>
-      </p:nvGrpSpPr>
-      <p:grpSpPr>
-        <a:xfrm>
-          <a:off x="0" y="0"/>
-          <a:ext cx="0" cy="0"/>
-          <a:chOff x="0" y="0"/>
-          <a:chExt cx="0" cy="0"/>
-        </a:xfrm>
-      </p:grpSpPr>
-      <p:sp>
-        <p:nvSpPr>
-          <p:cNvPr id="2" name="Rectangle 1"/>
-          <p:cNvSpPr/>
-          <p:nvPr/>
-        </p:nvSpPr>
-        <p:spPr>
-          <a:xfrm>
-            <a:off x="4032000" y="2889000"/>
-            <a:ext cx="1080000" cy="1080000"/>
-          </a:xfrm>
-          <a:prstGeom prst="rect">
-            <a:avLst/>
-          </a:prstGeom>
-          <a:noFill/>
-          <a:ln w="6350">
-            <a:noFill/>
-          </a:ln>
-        </p:spPr>
-        <p:style>
-          <a:lnRef idx="2">
-            <a:schemeClr val="accent1">
-              <a:shade val="50000"/>
-            </a:schemeClr>
-          </a:lnRef>
-          <a:fillRef idx="1">
-            <a:schemeClr val="accent1"/>
-          </a:fillRef>
-          <a:effectRef idx="0">
-            <a:schemeClr val="accent1"/>
-          </a:effectRef>
-          <a:fontRef idx="minor">
-            <a:schemeClr val="lt1"/>
-          </a:fontRef>
-        </p:style>
-        <p:txBody>
-          <a:bodyPr rtlCol="0" anchor="ctr"/>
-          <a:lstStyle/>
-          <a:p>
-            <a:pPr algn="ctr"/>
-            <a:endParaRPr lang="zh-TW" altLang="en-US"/>
-          </a:p>
-        </p:txBody>
-      </p:sp>
-      <p:cxnSp>
-        <p:nvCxnSpPr>
-          <p:cNvPr id="4" name="Straight Connector 3"/>
-          <p:cNvCxnSpPr/>
-          <p:nvPr/>
-        </p:nvCxnSpPr>
-        <p:spPr>
-          <a:xfrm>
-            <a:off x="4032000" y="3429000"/>
-            <a:ext cx="1080000" cy="0"/>
-          </a:xfrm>
-          <a:prstGeom prst="line">
-            <a:avLst/>
-          </a:prstGeom>
-          <a:ln w="50800">
-            <a:solidFill>
-              <a:schemeClr val="bg1">
-                <a:lumMod val="75000"/>
-              </a:schemeClr>
-            </a:solidFill>
-          </a:ln>
-        </p:spPr>
-        <p:style>
-          <a:lnRef idx="1">
-            <a:schemeClr val="accent1"/>
-          </a:lnRef>
-          <a:fillRef idx="0">
-            <a:schemeClr val="accent1"/>
-          </a:fillRef>
-          <a:effectRef idx="0">
-            <a:schemeClr val="accent1"/>
-          </a:effectRef>
-          <a:fontRef idx="minor">
-            <a:schemeClr val="tx1"/>
-          </a:fontRef>
-        </p:style>
-      </p:cxnSp>
-      <p:cxnSp>
-        <p:nvCxnSpPr>
-          <p:cNvPr id="5" name="Straight Connector 4"/>
-          <p:cNvCxnSpPr/>
-          <p:nvPr/>
-        </p:nvCxnSpPr>
-        <p:spPr>
-          <a:xfrm flipV="1">
-            <a:off x="4572000" y="2889000"/>
-            <a:ext cx="0" cy="1080000"/>
-          </a:xfrm>
-          <a:prstGeom prst="line">
-            <a:avLst/>
-          </a:prstGeom>
-          <a:ln w="50800">
-            <a:solidFill>
-              <a:schemeClr val="bg1">
-                <a:lumMod val="75000"/>
-              </a:schemeClr>
-            </a:solidFill>
-          </a:ln>
-        </p:spPr>
-        <p:style>
-          <a:lnRef idx="1">
-            <a:schemeClr val="accent1"/>
-          </a:lnRef>
-          <a:fillRef idx="0">
-            <a:schemeClr val="accent1"/>
-          </a:fillRef>
-          <a:effectRef idx="0">
-            <a:schemeClr val="accent1"/>
-          </a:effectRef>
-          <a:fontRef idx="minor">
-            <a:schemeClr val="tx1"/>
-          </a:fontRef>
-        </p:style>
-      </p:cxnSp>
-      <p:cxnSp>
-        <p:nvCxnSpPr>
-          <p:cNvPr id="7" name="Straight Connector 6"/>
-          <p:cNvCxnSpPr/>
-          <p:nvPr/>
-        </p:nvCxnSpPr>
-        <p:spPr>
-          <a:xfrm>
-            <a:off x="4212000" y="3429000"/>
-            <a:ext cx="720000" cy="0"/>
-          </a:xfrm>
-          <a:prstGeom prst="line">
-            <a:avLst/>
-          </a:prstGeom>
-          <a:ln w="50800" cap="rnd">
-            <a:solidFill>
-              <a:schemeClr val="tx1"/>
-            </a:solidFill>
-          </a:ln>
-        </p:spPr>
-        <p:style>
-          <a:lnRef idx="1">
-            <a:schemeClr val="accent1"/>
-          </a:lnRef>
-          <a:fillRef idx="0">
-            <a:schemeClr val="accent1"/>
-          </a:fillRef>
-          <a:effectRef idx="0">
-            <a:schemeClr val="accent1"/>
-          </a:effectRef>
-          <a:fontRef idx="minor">
-            <a:schemeClr val="tx1"/>
-          </a:fontRef>
-        </p:style>
-      </p:cxnSp>
-      <p:cxnSp>
-        <p:nvCxnSpPr>
-          <p:cNvPr id="8" name="Straight Connector 7"/>
-          <p:cNvCxnSpPr/>
-          <p:nvPr/>
-        </p:nvCxnSpPr>
-        <p:spPr>
-          <a:xfrm>
-            <a:off x="4572000" y="3069000"/>
-            <a:ext cx="0" cy="720000"/>
-          </a:xfrm>
-          <a:prstGeom prst="line">
-            <a:avLst/>
-          </a:prstGeom>
-          <a:ln w="50800" cap="rnd">
-            <a:solidFill>
-              <a:schemeClr val="tx1"/>
-            </a:solidFill>
-          </a:ln>
-        </p:spPr>
-        <p:style>
-          <a:lnRef idx="1">
-            <a:schemeClr val="accent1"/>
-          </a:lnRef>
-          <a:fillRef idx="0">
-            <a:schemeClr val="accent1"/>
-          </a:fillRef>
-          <a:effectRef idx="0">
-            <a:schemeClr val="accent1"/>
-          </a:effectRef>
-          <a:fontRef idx="minor">
-            <a:schemeClr val="tx1"/>
-          </a:fontRef>
-        </p:style>
-      </p:cxnSp>
-      <p:sp>
-        <p:nvSpPr>
-          <p:cNvPr id="9" name="Oval 8"/>
-          <p:cNvSpPr/>
-          <p:nvPr/>
-        </p:nvSpPr>
-        <p:spPr>
-          <a:xfrm>
-            <a:off x="4392000" y="3249000"/>
-            <a:ext cx="360000" cy="360000"/>
-          </a:xfrm>
-          <a:prstGeom prst="ellipse">
-            <a:avLst/>
-          </a:prstGeom>
-          <a:solidFill>
-            <a:schemeClr val="bg1"/>
-          </a:solidFill>
-          <a:ln w="50800" cap="rnd">
-            <a:solidFill>
-              <a:schemeClr val="tx1"/>
-            </a:solidFill>
-          </a:ln>
-        </p:spPr>
-        <p:style>
-          <a:lnRef idx="1">
-            <a:schemeClr val="accent1"/>
-          </a:lnRef>
-          <a:fillRef idx="0">
-            <a:schemeClr val="accent1"/>
-          </a:fillRef>
-          <a:effectRef idx="0">
-            <a:schemeClr val="accent1"/>
-          </a:effectRef>
-          <a:fontRef idx="minor">
-            <a:schemeClr val="tx1"/>
-          </a:fontRef>
-        </p:style>
-        <p:txBody>
-          <a:bodyPr rtlCol="0" anchor="ctr"/>
-          <a:lstStyle/>
-          <a:p>
-            <a:pPr algn="ctr"/>
-            <a:endParaRPr lang="en-US"/>
-          </a:p>
-        </p:txBody>
-      </p:sp>
-    </p:spTree>
-    <p:extLst>
-      <p:ext uri="{BB962C8B-B14F-4D97-AF65-F5344CB8AC3E}">
-        <p14:creationId xmlns:p14="http://schemas.microsoft.com/office/powerpoint/2010/main" val="3219929443"/>
-      </p:ext>
-    </p:extLst>
-  </p:cSld>
-  <p:clrMapOvr>
-    <a:masterClrMapping/>
-  </p:clrMapOvr>
-</p:sld>
-</file>
-
-<file path=ppt/slides/slide9.xml><?xml version="1.0" encoding="utf-8"?>
-<p:sld xmlns:a="http://schemas.openxmlformats.org/drawingml/2006/main" xmlns:r="http://schemas.openxmlformats.org/officeDocument/2006/relationships" xmlns:p="http://schemas.openxmlformats.org/presentationml/2006/main">
-  <p:cSld>
-    <p:spTree>
-      <p:nvGrpSpPr>
-        <p:cNvPr id="1" name=""/>
-        <p:cNvGrpSpPr/>
-        <p:nvPr/>
-      </p:nvGrpSpPr>
-      <p:grpSpPr>
-        <a:xfrm>
-          <a:off x="0" y="0"/>
-          <a:ext cx="0" cy="0"/>
-          <a:chOff x="0" y="0"/>
-          <a:chExt cx="0" cy="0"/>
-        </a:xfrm>
-      </p:grpSpPr>
-      <p:sp>
-        <p:nvSpPr>
-          <p:cNvPr id="6" name="Rectangle 5"/>
-          <p:cNvSpPr/>
-          <p:nvPr/>
-        </p:nvSpPr>
-        <p:spPr>
-          <a:xfrm>
-            <a:off x="4032000" y="2889000"/>
-            <a:ext cx="1080000" cy="1080000"/>
-          </a:xfrm>
-          <a:prstGeom prst="rect">
-            <a:avLst/>
-          </a:prstGeom>
-          <a:gradFill>
-            <a:gsLst>
-              <a:gs pos="0">
-                <a:schemeClr val="tx1">
-                  <a:lumMod val="75000"/>
-                  <a:lumOff val="25000"/>
-                </a:schemeClr>
-              </a:gs>
-              <a:gs pos="28000">
-                <a:schemeClr val="tx1">
-                  <a:lumMod val="50000"/>
-                  <a:lumOff val="50000"/>
-                </a:schemeClr>
-              </a:gs>
-              <a:gs pos="100000">
-                <a:schemeClr val="bg1"/>
-              </a:gs>
-            </a:gsLst>
-            <a:path path="circle">
-              <a:fillToRect l="50000" t="50000" r="50000" b="50000"/>
-            </a:path>
-          </a:gradFill>
-          <a:ln w="6350">
-            <a:noFill/>
-          </a:ln>
-          <a:effectLst>
-            <a:softEdge rad="127000"/>
-          </a:effectLst>
-        </p:spPr>
-        <p:style>
-          <a:lnRef idx="2">
-            <a:schemeClr val="accent1">
-              <a:shade val="50000"/>
-            </a:schemeClr>
-          </a:lnRef>
-          <a:fillRef idx="1">
-            <a:schemeClr val="accent1"/>
-          </a:fillRef>
-          <a:effectRef idx="0">
-            <a:schemeClr val="accent1"/>
-          </a:effectRef>
-          <a:fontRef idx="minor">
-            <a:schemeClr val="lt1"/>
-          </a:fontRef>
-        </p:style>
-        <p:txBody>
-          <a:bodyPr rtlCol="0" anchor="ctr"/>
-          <a:lstStyle/>
-          <a:p>
-            <a:pPr algn="ctr"/>
-            <a:endParaRPr lang="zh-TW" altLang="en-US"/>
-          </a:p>
-        </p:txBody>
-      </p:sp>
-    </p:spTree>
-    <p:extLst>
-      <p:ext uri="{BB962C8B-B14F-4D97-AF65-F5344CB8AC3E}">
-        <p14:creationId xmlns:p14="http://schemas.microsoft.com/office/powerpoint/2010/main" val="2629146378"/>
       </p:ext>
     </p:extLst>
   </p:cSld>
@@ -14723,4 +16126,289 @@
   <a:objectDefaults/>
   <a:extraClrSchemeLst/>
 </a:theme>
+</file>
+
+<file path=ppt/theme/theme2.xml><?xml version="1.0" encoding="utf-8"?>
+<a:theme xmlns:a="http://schemas.openxmlformats.org/drawingml/2006/main" name="Office Theme">
+  <a:themeElements>
+    <a:clrScheme name="Office">
+      <a:dk1>
+        <a:sysClr val="windowText" lastClr="000000"/>
+      </a:dk1>
+      <a:lt1>
+        <a:sysClr val="window" lastClr="FFFFFF"/>
+      </a:lt1>
+      <a:dk2>
+        <a:srgbClr val="1F497D"/>
+      </a:dk2>
+      <a:lt2>
+        <a:srgbClr val="EEECE1"/>
+      </a:lt2>
+      <a:accent1>
+        <a:srgbClr val="4F81BD"/>
+      </a:accent1>
+      <a:accent2>
+        <a:srgbClr val="C0504D"/>
+      </a:accent2>
+      <a:accent3>
+        <a:srgbClr val="9BBB59"/>
+      </a:accent3>
+      <a:accent4>
+        <a:srgbClr val="8064A2"/>
+      </a:accent4>
+      <a:accent5>
+        <a:srgbClr val="4BACC6"/>
+      </a:accent5>
+      <a:accent6>
+        <a:srgbClr val="F79646"/>
+      </a:accent6>
+      <a:hlink>
+        <a:srgbClr val="0000FF"/>
+      </a:hlink>
+      <a:folHlink>
+        <a:srgbClr val="800080"/>
+      </a:folHlink>
+    </a:clrScheme>
+    <a:fontScheme name="Office">
+      <a:majorFont>
+        <a:latin typeface="Calibri"/>
+        <a:ea typeface=""/>
+        <a:cs typeface=""/>
+        <a:font script="Jpan" typeface="ＭＳ Ｐゴシック"/>
+        <a:font script="Hang" typeface="맑은 고딕"/>
+        <a:font script="Hans" typeface="宋体"/>
+        <a:font script="Hant" typeface="新細明體"/>
+        <a:font script="Arab" typeface="Times New Roman"/>
+        <a:font script="Hebr" typeface="Times New Roman"/>
+        <a:font script="Thai" typeface="Angsana New"/>
+        <a:font script="Ethi" typeface="Nyala"/>
+        <a:font script="Beng" typeface="Vrinda"/>
+        <a:font script="Gujr" typeface="Shruti"/>
+        <a:font script="Khmr" typeface="MoolBoran"/>
+        <a:font script="Knda" typeface="Tunga"/>
+        <a:font script="Guru" typeface="Raavi"/>
+        <a:font script="Cans" typeface="Euphemia"/>
+        <a:font script="Cher" typeface="Plantagenet Cherokee"/>
+        <a:font script="Yiii" typeface="Microsoft Yi Baiti"/>
+        <a:font script="Tibt" typeface="Microsoft Himalaya"/>
+        <a:font script="Thaa" typeface="MV Boli"/>
+        <a:font script="Deva" typeface="Mangal"/>
+        <a:font script="Telu" typeface="Gautami"/>
+        <a:font script="Taml" typeface="Latha"/>
+        <a:font script="Syrc" typeface="Estrangelo Edessa"/>
+        <a:font script="Orya" typeface="Kalinga"/>
+        <a:font script="Mlym" typeface="Kartika"/>
+        <a:font script="Laoo" typeface="DokChampa"/>
+        <a:font script="Sinh" typeface="Iskoola Pota"/>
+        <a:font script="Mong" typeface="Mongolian Baiti"/>
+        <a:font script="Viet" typeface="Times New Roman"/>
+        <a:font script="Uigh" typeface="Microsoft Uighur"/>
+        <a:font script="Geor" typeface="Sylfaen"/>
+      </a:majorFont>
+      <a:minorFont>
+        <a:latin typeface="Calibri"/>
+        <a:ea typeface=""/>
+        <a:cs typeface=""/>
+        <a:font script="Jpan" typeface="ＭＳ Ｐゴシック"/>
+        <a:font script="Hang" typeface="맑은 고딕"/>
+        <a:font script="Hans" typeface="宋体"/>
+        <a:font script="Hant" typeface="新細明體"/>
+        <a:font script="Arab" typeface="Arial"/>
+        <a:font script="Hebr" typeface="Arial"/>
+        <a:font script="Thai" typeface="Cordia New"/>
+        <a:font script="Ethi" typeface="Nyala"/>
+        <a:font script="Beng" typeface="Vrinda"/>
+        <a:font script="Gujr" typeface="Shruti"/>
+        <a:font script="Khmr" typeface="DaunPenh"/>
+        <a:font script="Knda" typeface="Tunga"/>
+        <a:font script="Guru" typeface="Raavi"/>
+        <a:font script="Cans" typeface="Euphemia"/>
+        <a:font script="Cher" typeface="Plantagenet Cherokee"/>
+        <a:font script="Yiii" typeface="Microsoft Yi Baiti"/>
+        <a:font script="Tibt" typeface="Microsoft Himalaya"/>
+        <a:font script="Thaa" typeface="MV Boli"/>
+        <a:font script="Deva" typeface="Mangal"/>
+        <a:font script="Telu" typeface="Gautami"/>
+        <a:font script="Taml" typeface="Latha"/>
+        <a:font script="Syrc" typeface="Estrangelo Edessa"/>
+        <a:font script="Orya" typeface="Kalinga"/>
+        <a:font script="Mlym" typeface="Kartika"/>
+        <a:font script="Laoo" typeface="DokChampa"/>
+        <a:font script="Sinh" typeface="Iskoola Pota"/>
+        <a:font script="Mong" typeface="Mongolian Baiti"/>
+        <a:font script="Viet" typeface="Arial"/>
+        <a:font script="Uigh" typeface="Microsoft Uighur"/>
+        <a:font script="Geor" typeface="Sylfaen"/>
+      </a:minorFont>
+    </a:fontScheme>
+    <a:fmtScheme name="Office">
+      <a:fillStyleLst>
+        <a:solidFill>
+          <a:schemeClr val="phClr"/>
+        </a:solidFill>
+        <a:gradFill rotWithShape="1">
+          <a:gsLst>
+            <a:gs pos="0">
+              <a:schemeClr val="phClr">
+                <a:tint val="50000"/>
+                <a:satMod val="300000"/>
+              </a:schemeClr>
+            </a:gs>
+            <a:gs pos="35000">
+              <a:schemeClr val="phClr">
+                <a:tint val="37000"/>
+                <a:satMod val="300000"/>
+              </a:schemeClr>
+            </a:gs>
+            <a:gs pos="100000">
+              <a:schemeClr val="phClr">
+                <a:tint val="15000"/>
+                <a:satMod val="350000"/>
+              </a:schemeClr>
+            </a:gs>
+          </a:gsLst>
+          <a:lin ang="16200000" scaled="1"/>
+        </a:gradFill>
+        <a:gradFill rotWithShape="1">
+          <a:gsLst>
+            <a:gs pos="0">
+              <a:schemeClr val="phClr">
+                <a:shade val="51000"/>
+                <a:satMod val="130000"/>
+              </a:schemeClr>
+            </a:gs>
+            <a:gs pos="80000">
+              <a:schemeClr val="phClr">
+                <a:shade val="93000"/>
+                <a:satMod val="130000"/>
+              </a:schemeClr>
+            </a:gs>
+            <a:gs pos="100000">
+              <a:schemeClr val="phClr">
+                <a:shade val="94000"/>
+                <a:satMod val="135000"/>
+              </a:schemeClr>
+            </a:gs>
+          </a:gsLst>
+          <a:lin ang="16200000" scaled="0"/>
+        </a:gradFill>
+      </a:fillStyleLst>
+      <a:lnStyleLst>
+        <a:ln w="9525" cap="flat" cmpd="sng" algn="ctr">
+          <a:solidFill>
+            <a:schemeClr val="phClr">
+              <a:shade val="95000"/>
+              <a:satMod val="105000"/>
+            </a:schemeClr>
+          </a:solidFill>
+          <a:prstDash val="solid"/>
+        </a:ln>
+        <a:ln w="25400" cap="flat" cmpd="sng" algn="ctr">
+          <a:solidFill>
+            <a:schemeClr val="phClr"/>
+          </a:solidFill>
+          <a:prstDash val="solid"/>
+        </a:ln>
+        <a:ln w="38100" cap="flat" cmpd="sng" algn="ctr">
+          <a:solidFill>
+            <a:schemeClr val="phClr"/>
+          </a:solidFill>
+          <a:prstDash val="solid"/>
+        </a:ln>
+      </a:lnStyleLst>
+      <a:effectStyleLst>
+        <a:effectStyle>
+          <a:effectLst>
+            <a:outerShdw blurRad="40000" dist="20000" dir="5400000" rotWithShape="0">
+              <a:srgbClr val="000000">
+                <a:alpha val="38000"/>
+              </a:srgbClr>
+            </a:outerShdw>
+          </a:effectLst>
+        </a:effectStyle>
+        <a:effectStyle>
+          <a:effectLst>
+            <a:outerShdw blurRad="40000" dist="23000" dir="5400000" rotWithShape="0">
+              <a:srgbClr val="000000">
+                <a:alpha val="35000"/>
+              </a:srgbClr>
+            </a:outerShdw>
+          </a:effectLst>
+        </a:effectStyle>
+        <a:effectStyle>
+          <a:effectLst>
+            <a:outerShdw blurRad="40000" dist="23000" dir="5400000" rotWithShape="0">
+              <a:srgbClr val="000000">
+                <a:alpha val="35000"/>
+              </a:srgbClr>
+            </a:outerShdw>
+          </a:effectLst>
+          <a:scene3d>
+            <a:camera prst="orthographicFront">
+              <a:rot lat="0" lon="0" rev="0"/>
+            </a:camera>
+            <a:lightRig rig="threePt" dir="t">
+              <a:rot lat="0" lon="0" rev="1200000"/>
+            </a:lightRig>
+          </a:scene3d>
+          <a:sp3d>
+            <a:bevelT w="63500" h="25400"/>
+          </a:sp3d>
+        </a:effectStyle>
+      </a:effectStyleLst>
+      <a:bgFillStyleLst>
+        <a:solidFill>
+          <a:schemeClr val="phClr"/>
+        </a:solidFill>
+        <a:gradFill rotWithShape="1">
+          <a:gsLst>
+            <a:gs pos="0">
+              <a:schemeClr val="phClr">
+                <a:tint val="40000"/>
+                <a:satMod val="350000"/>
+              </a:schemeClr>
+            </a:gs>
+            <a:gs pos="40000">
+              <a:schemeClr val="phClr">
+                <a:tint val="45000"/>
+                <a:shade val="99000"/>
+                <a:satMod val="350000"/>
+              </a:schemeClr>
+            </a:gs>
+            <a:gs pos="100000">
+              <a:schemeClr val="phClr">
+                <a:shade val="20000"/>
+                <a:satMod val="255000"/>
+              </a:schemeClr>
+            </a:gs>
+          </a:gsLst>
+          <a:path path="circle">
+            <a:fillToRect l="50000" t="-80000" r="50000" b="180000"/>
+          </a:path>
+        </a:gradFill>
+        <a:gradFill rotWithShape="1">
+          <a:gsLst>
+            <a:gs pos="0">
+              <a:schemeClr val="phClr">
+                <a:tint val="80000"/>
+                <a:satMod val="300000"/>
+              </a:schemeClr>
+            </a:gs>
+            <a:gs pos="100000">
+              <a:schemeClr val="phClr">
+                <a:shade val="30000"/>
+                <a:satMod val="200000"/>
+              </a:schemeClr>
+            </a:gs>
+          </a:gsLst>
+          <a:path path="circle">
+            <a:fillToRect l="50000" t="50000" r="50000" b="50000"/>
+          </a:path>
+        </a:gradFill>
+      </a:bgFillStyleLst>
+    </a:fmtScheme>
+  </a:themeElements>
+  <a:objectDefaults/>
+  <a:extraClrSchemeLst/>
+</a:theme>
 </file>
</xml_diff>

<commit_message>
Version 9.0. Major structural changes.
</commit_message>
<xml_diff>
--- a/icons/icons.pptx
+++ b/icons/icons.pptx
@@ -5,7 +5,7 @@
     <p:sldMasterId id="2147483648" r:id="rId1"/>
   </p:sldMasterIdLst>
   <p:notesMasterIdLst>
-    <p:notesMasterId r:id="rId40"/>
+    <p:notesMasterId r:id="rId41"/>
   </p:notesMasterIdLst>
   <p:sldIdLst>
     <p:sldId id="286" r:id="rId2"/>
@@ -17,35 +17,36 @@
     <p:sldId id="323" r:id="rId8"/>
     <p:sldId id="325" r:id="rId9"/>
     <p:sldId id="327" r:id="rId10"/>
-    <p:sldId id="313" r:id="rId11"/>
-    <p:sldId id="314" r:id="rId12"/>
-    <p:sldId id="315" r:id="rId13"/>
-    <p:sldId id="317" r:id="rId14"/>
-    <p:sldId id="316" r:id="rId15"/>
-    <p:sldId id="320" r:id="rId16"/>
-    <p:sldId id="321" r:id="rId17"/>
-    <p:sldId id="322" r:id="rId18"/>
-    <p:sldId id="287" r:id="rId19"/>
-    <p:sldId id="288" r:id="rId20"/>
-    <p:sldId id="289" r:id="rId21"/>
-    <p:sldId id="290" r:id="rId22"/>
-    <p:sldId id="291" r:id="rId23"/>
-    <p:sldId id="292" r:id="rId24"/>
-    <p:sldId id="293" r:id="rId25"/>
-    <p:sldId id="294" r:id="rId26"/>
-    <p:sldId id="295" r:id="rId27"/>
-    <p:sldId id="296" r:id="rId28"/>
-    <p:sldId id="297" r:id="rId29"/>
-    <p:sldId id="298" r:id="rId30"/>
-    <p:sldId id="299" r:id="rId31"/>
-    <p:sldId id="300" r:id="rId32"/>
-    <p:sldId id="301" r:id="rId33"/>
-    <p:sldId id="302" r:id="rId34"/>
-    <p:sldId id="303" r:id="rId35"/>
-    <p:sldId id="304" r:id="rId36"/>
-    <p:sldId id="305" r:id="rId37"/>
-    <p:sldId id="306" r:id="rId38"/>
-    <p:sldId id="307" r:id="rId39"/>
+    <p:sldId id="328" r:id="rId11"/>
+    <p:sldId id="313" r:id="rId12"/>
+    <p:sldId id="314" r:id="rId13"/>
+    <p:sldId id="315" r:id="rId14"/>
+    <p:sldId id="317" r:id="rId15"/>
+    <p:sldId id="316" r:id="rId16"/>
+    <p:sldId id="320" r:id="rId17"/>
+    <p:sldId id="321" r:id="rId18"/>
+    <p:sldId id="322" r:id="rId19"/>
+    <p:sldId id="287" r:id="rId20"/>
+    <p:sldId id="288" r:id="rId21"/>
+    <p:sldId id="289" r:id="rId22"/>
+    <p:sldId id="290" r:id="rId23"/>
+    <p:sldId id="291" r:id="rId24"/>
+    <p:sldId id="292" r:id="rId25"/>
+    <p:sldId id="293" r:id="rId26"/>
+    <p:sldId id="294" r:id="rId27"/>
+    <p:sldId id="295" r:id="rId28"/>
+    <p:sldId id="296" r:id="rId29"/>
+    <p:sldId id="297" r:id="rId30"/>
+    <p:sldId id="298" r:id="rId31"/>
+    <p:sldId id="299" r:id="rId32"/>
+    <p:sldId id="300" r:id="rId33"/>
+    <p:sldId id="301" r:id="rId34"/>
+    <p:sldId id="302" r:id="rId35"/>
+    <p:sldId id="303" r:id="rId36"/>
+    <p:sldId id="304" r:id="rId37"/>
+    <p:sldId id="305" r:id="rId38"/>
+    <p:sldId id="306" r:id="rId39"/>
+    <p:sldId id="307" r:id="rId40"/>
   </p:sldIdLst>
   <p:sldSz cx="9144000" cy="6858000" type="screen4x3"/>
   <p:notesSz cx="6858000" cy="9144000"/>
@@ -229,7 +230,7 @@
           <a:p>
             <a:fld id="{409A854A-4542-4C46-92B4-B1933D0339ED}" type="datetimeFigureOut">
               <a:rPr lang="en-US" smtClean="0"/>
-              <a:t>3/7/2017</a:t>
+              <a:t>3/28/2017</a:t>
             </a:fld>
             <a:endParaRPr lang="en-US"/>
           </a:p>
@@ -762,7 +763,7 @@
           <a:p>
             <a:fld id="{B6192DF9-7B65-41DB-B5A4-F73A2B2D849B}" type="datetimeFigureOut">
               <a:rPr lang="zh-TW" altLang="en-US" smtClean="0"/>
-              <a:t>2017/3/7</a:t>
+              <a:t>2017/3/28</a:t>
             </a:fld>
             <a:endParaRPr lang="zh-TW" altLang="en-US"/>
           </a:p>
@@ -932,7 +933,7 @@
           <a:p>
             <a:fld id="{B6192DF9-7B65-41DB-B5A4-F73A2B2D849B}" type="datetimeFigureOut">
               <a:rPr lang="zh-TW" altLang="en-US" smtClean="0"/>
-              <a:t>2017/3/7</a:t>
+              <a:t>2017/3/28</a:t>
             </a:fld>
             <a:endParaRPr lang="zh-TW" altLang="en-US"/>
           </a:p>
@@ -1112,7 +1113,7 @@
           <a:p>
             <a:fld id="{B6192DF9-7B65-41DB-B5A4-F73A2B2D849B}" type="datetimeFigureOut">
               <a:rPr lang="zh-TW" altLang="en-US" smtClean="0"/>
-              <a:t>2017/3/7</a:t>
+              <a:t>2017/3/28</a:t>
             </a:fld>
             <a:endParaRPr lang="zh-TW" altLang="en-US"/>
           </a:p>
@@ -1282,7 +1283,7 @@
           <a:p>
             <a:fld id="{B6192DF9-7B65-41DB-B5A4-F73A2B2D849B}" type="datetimeFigureOut">
               <a:rPr lang="zh-TW" altLang="en-US" smtClean="0"/>
-              <a:t>2017/3/7</a:t>
+              <a:t>2017/3/28</a:t>
             </a:fld>
             <a:endParaRPr lang="zh-TW" altLang="en-US"/>
           </a:p>
@@ -1528,7 +1529,7 @@
           <a:p>
             <a:fld id="{B6192DF9-7B65-41DB-B5A4-F73A2B2D849B}" type="datetimeFigureOut">
               <a:rPr lang="zh-TW" altLang="en-US" smtClean="0"/>
-              <a:t>2017/3/7</a:t>
+              <a:t>2017/3/28</a:t>
             </a:fld>
             <a:endParaRPr lang="zh-TW" altLang="en-US"/>
           </a:p>
@@ -1816,7 +1817,7 @@
           <a:p>
             <a:fld id="{B6192DF9-7B65-41DB-B5A4-F73A2B2D849B}" type="datetimeFigureOut">
               <a:rPr lang="zh-TW" altLang="en-US" smtClean="0"/>
-              <a:t>2017/3/7</a:t>
+              <a:t>2017/3/28</a:t>
             </a:fld>
             <a:endParaRPr lang="zh-TW" altLang="en-US"/>
           </a:p>
@@ -2238,7 +2239,7 @@
           <a:p>
             <a:fld id="{B6192DF9-7B65-41DB-B5A4-F73A2B2D849B}" type="datetimeFigureOut">
               <a:rPr lang="zh-TW" altLang="en-US" smtClean="0"/>
-              <a:t>2017/3/7</a:t>
+              <a:t>2017/3/28</a:t>
             </a:fld>
             <a:endParaRPr lang="zh-TW" altLang="en-US"/>
           </a:p>
@@ -2356,7 +2357,7 @@
           <a:p>
             <a:fld id="{B6192DF9-7B65-41DB-B5A4-F73A2B2D849B}" type="datetimeFigureOut">
               <a:rPr lang="zh-TW" altLang="en-US" smtClean="0"/>
-              <a:t>2017/3/7</a:t>
+              <a:t>2017/3/28</a:t>
             </a:fld>
             <a:endParaRPr lang="zh-TW" altLang="en-US"/>
           </a:p>
@@ -2451,7 +2452,7 @@
           <a:p>
             <a:fld id="{B6192DF9-7B65-41DB-B5A4-F73A2B2D849B}" type="datetimeFigureOut">
               <a:rPr lang="zh-TW" altLang="en-US" smtClean="0"/>
-              <a:t>2017/3/7</a:t>
+              <a:t>2017/3/28</a:t>
             </a:fld>
             <a:endParaRPr lang="zh-TW" altLang="en-US"/>
           </a:p>
@@ -2728,7 +2729,7 @@
           <a:p>
             <a:fld id="{B6192DF9-7B65-41DB-B5A4-F73A2B2D849B}" type="datetimeFigureOut">
               <a:rPr lang="zh-TW" altLang="en-US" smtClean="0"/>
-              <a:t>2017/3/7</a:t>
+              <a:t>2017/3/28</a:t>
             </a:fld>
             <a:endParaRPr lang="zh-TW" altLang="en-US"/>
           </a:p>
@@ -2981,7 +2982,7 @@
           <a:p>
             <a:fld id="{B6192DF9-7B65-41DB-B5A4-F73A2B2D849B}" type="datetimeFigureOut">
               <a:rPr lang="zh-TW" altLang="en-US" smtClean="0"/>
-              <a:t>2017/3/7</a:t>
+              <a:t>2017/3/28</a:t>
             </a:fld>
             <a:endParaRPr lang="zh-TW" altLang="en-US"/>
           </a:p>
@@ -3194,7 +3195,7 @@
           <a:p>
             <a:fld id="{B6192DF9-7B65-41DB-B5A4-F73A2B2D849B}" type="datetimeFigureOut">
               <a:rPr lang="zh-TW" altLang="en-US" smtClean="0"/>
-              <a:t>2017/3/7</a:t>
+              <a:t>2017/3/28</a:t>
             </a:fld>
             <a:endParaRPr lang="zh-TW" altLang="en-US"/>
           </a:p>
@@ -3846,6 +3847,408 @@
       </p:grpSpPr>
       <p:sp>
         <p:nvSpPr>
+          <p:cNvPr id="2" name="Rectangle 1"/>
+          <p:cNvSpPr/>
+          <p:nvPr/>
+        </p:nvSpPr>
+        <p:spPr>
+          <a:xfrm>
+            <a:off x="4032000" y="2889000"/>
+            <a:ext cx="1080000" cy="1080000"/>
+          </a:xfrm>
+          <a:prstGeom prst="rect">
+            <a:avLst/>
+          </a:prstGeom>
+          <a:noFill/>
+          <a:ln w="6350">
+            <a:noFill/>
+          </a:ln>
+        </p:spPr>
+        <p:style>
+          <a:lnRef idx="2">
+            <a:schemeClr val="accent1">
+              <a:shade val="50000"/>
+            </a:schemeClr>
+          </a:lnRef>
+          <a:fillRef idx="1">
+            <a:schemeClr val="accent1"/>
+          </a:fillRef>
+          <a:effectRef idx="0">
+            <a:schemeClr val="accent1"/>
+          </a:effectRef>
+          <a:fontRef idx="minor">
+            <a:schemeClr val="lt1"/>
+          </a:fontRef>
+        </p:style>
+        <p:txBody>
+          <a:bodyPr rtlCol="0" anchor="ctr"/>
+          <a:lstStyle/>
+          <a:p>
+            <a:pPr algn="ctr"/>
+            <a:endParaRPr lang="zh-TW" altLang="en-US"/>
+          </a:p>
+        </p:txBody>
+      </p:sp>
+      <p:grpSp>
+        <p:nvGrpSpPr>
+          <p:cNvPr id="14" name="Group 13"/>
+          <p:cNvGrpSpPr>
+            <a:grpSpLocks noChangeAspect="1"/>
+          </p:cNvGrpSpPr>
+          <p:nvPr/>
+        </p:nvGrpSpPr>
+        <p:grpSpPr>
+          <a:xfrm>
+            <a:off x="4090328" y="2947988"/>
+            <a:ext cx="804750" cy="468000"/>
+            <a:chOff x="4096678" y="2960688"/>
+            <a:chExt cx="949206" cy="552008"/>
+          </a:xfrm>
+        </p:grpSpPr>
+        <p:sp>
+          <p:nvSpPr>
+            <p:cNvPr id="7" name="Trapezoid 6"/>
+            <p:cNvSpPr/>
+            <p:nvPr/>
+          </p:nvSpPr>
+          <p:spPr>
+            <a:xfrm rot="16200000">
+              <a:off x="4759785" y="3159472"/>
+              <a:ext cx="417758" cy="154440"/>
+            </a:xfrm>
+            <a:prstGeom prst="trapezoid">
+              <a:avLst>
+                <a:gd name="adj" fmla="val 51211"/>
+              </a:avLst>
+            </a:prstGeom>
+            <a:solidFill>
+              <a:schemeClr val="bg1">
+                <a:lumMod val="75000"/>
+              </a:schemeClr>
+            </a:solidFill>
+            <a:ln w="50800">
+              <a:solidFill>
+                <a:schemeClr val="bg1">
+                  <a:lumMod val="75000"/>
+                </a:schemeClr>
+              </a:solidFill>
+              <a:miter lim="800000"/>
+            </a:ln>
+          </p:spPr>
+          <p:style>
+            <a:lnRef idx="2">
+              <a:schemeClr val="accent1">
+                <a:shade val="50000"/>
+              </a:schemeClr>
+            </a:lnRef>
+            <a:fillRef idx="1">
+              <a:schemeClr val="accent1"/>
+            </a:fillRef>
+            <a:effectRef idx="0">
+              <a:schemeClr val="accent1"/>
+            </a:effectRef>
+            <a:fontRef idx="minor">
+              <a:schemeClr val="lt1"/>
+            </a:fontRef>
+          </p:style>
+          <p:txBody>
+            <a:bodyPr rtlCol="0" anchor="ctr"/>
+            <a:lstStyle/>
+            <a:p>
+              <a:pPr algn="ctr"/>
+              <a:endParaRPr lang="zh-TW" altLang="en-US"/>
+            </a:p>
+          </p:txBody>
+        </p:sp>
+        <p:sp>
+          <p:nvSpPr>
+            <p:cNvPr id="8" name="Rounded Rectangle 7"/>
+            <p:cNvSpPr/>
+            <p:nvPr/>
+          </p:nvSpPr>
+          <p:spPr>
+            <a:xfrm>
+              <a:off x="4096678" y="2960688"/>
+              <a:ext cx="763354" cy="552008"/>
+            </a:xfrm>
+            <a:prstGeom prst="roundRect">
+              <a:avLst>
+                <a:gd name="adj" fmla="val 13601"/>
+              </a:avLst>
+            </a:prstGeom>
+            <a:solidFill>
+              <a:schemeClr val="bg1">
+                <a:lumMod val="75000"/>
+              </a:schemeClr>
+            </a:solidFill>
+            <a:ln w="50800">
+              <a:solidFill>
+                <a:schemeClr val="bg1">
+                  <a:lumMod val="75000"/>
+                </a:schemeClr>
+              </a:solidFill>
+            </a:ln>
+          </p:spPr>
+          <p:style>
+            <a:lnRef idx="2">
+              <a:schemeClr val="accent1">
+                <a:shade val="50000"/>
+              </a:schemeClr>
+            </a:lnRef>
+            <a:fillRef idx="1">
+              <a:schemeClr val="accent1"/>
+            </a:fillRef>
+            <a:effectRef idx="0">
+              <a:schemeClr val="accent1"/>
+            </a:effectRef>
+            <a:fontRef idx="minor">
+              <a:schemeClr val="lt1"/>
+            </a:fontRef>
+          </p:style>
+          <p:txBody>
+            <a:bodyPr rtlCol="0" anchor="ctr"/>
+            <a:lstStyle/>
+            <a:p>
+              <a:pPr algn="ctr"/>
+              <a:endParaRPr lang="zh-TW" altLang="en-US"/>
+            </a:p>
+          </p:txBody>
+        </p:sp>
+      </p:grpSp>
+      <p:grpSp>
+        <p:nvGrpSpPr>
+          <p:cNvPr id="11" name="Group 10"/>
+          <p:cNvGrpSpPr>
+            <a:grpSpLocks noChangeAspect="1"/>
+          </p:cNvGrpSpPr>
+          <p:nvPr/>
+        </p:nvGrpSpPr>
+        <p:grpSpPr>
+          <a:xfrm>
+            <a:off x="4256410" y="3450332"/>
+            <a:ext cx="804750" cy="468000"/>
+            <a:chOff x="5045884" y="4221088"/>
+            <a:chExt cx="949206" cy="552008"/>
+          </a:xfrm>
+        </p:grpSpPr>
+        <p:sp>
+          <p:nvSpPr>
+            <p:cNvPr id="9" name="Trapezoid 8"/>
+            <p:cNvSpPr/>
+            <p:nvPr/>
+          </p:nvSpPr>
+          <p:spPr>
+            <a:xfrm rot="16200000">
+              <a:off x="5708991" y="4419872"/>
+              <a:ext cx="417758" cy="154440"/>
+            </a:xfrm>
+            <a:prstGeom prst="trapezoid">
+              <a:avLst>
+                <a:gd name="adj" fmla="val 51211"/>
+              </a:avLst>
+            </a:prstGeom>
+            <a:solidFill>
+              <a:schemeClr val="tx1">
+                <a:lumMod val="50000"/>
+                <a:lumOff val="50000"/>
+              </a:schemeClr>
+            </a:solidFill>
+            <a:ln w="50800">
+              <a:solidFill>
+                <a:schemeClr val="tx1">
+                  <a:lumMod val="50000"/>
+                  <a:lumOff val="50000"/>
+                </a:schemeClr>
+              </a:solidFill>
+              <a:miter lim="800000"/>
+            </a:ln>
+          </p:spPr>
+          <p:style>
+            <a:lnRef idx="2">
+              <a:schemeClr val="accent1">
+                <a:shade val="50000"/>
+              </a:schemeClr>
+            </a:lnRef>
+            <a:fillRef idx="1">
+              <a:schemeClr val="accent1"/>
+            </a:fillRef>
+            <a:effectRef idx="0">
+              <a:schemeClr val="accent1"/>
+            </a:effectRef>
+            <a:fontRef idx="minor">
+              <a:schemeClr val="lt1"/>
+            </a:fontRef>
+          </p:style>
+          <p:txBody>
+            <a:bodyPr rtlCol="0" anchor="ctr"/>
+            <a:lstStyle/>
+            <a:p>
+              <a:pPr algn="ctr"/>
+              <a:endParaRPr lang="zh-TW" altLang="en-US"/>
+            </a:p>
+          </p:txBody>
+        </p:sp>
+        <p:sp>
+          <p:nvSpPr>
+            <p:cNvPr id="10" name="Rounded Rectangle 9"/>
+            <p:cNvSpPr/>
+            <p:nvPr/>
+          </p:nvSpPr>
+          <p:spPr>
+            <a:xfrm>
+              <a:off x="5045884" y="4221088"/>
+              <a:ext cx="763354" cy="552008"/>
+            </a:xfrm>
+            <a:prstGeom prst="roundRect">
+              <a:avLst>
+                <a:gd name="adj" fmla="val 13601"/>
+              </a:avLst>
+            </a:prstGeom>
+            <a:solidFill>
+              <a:schemeClr val="tx1">
+                <a:lumMod val="50000"/>
+                <a:lumOff val="50000"/>
+              </a:schemeClr>
+            </a:solidFill>
+            <a:ln w="50800">
+              <a:solidFill>
+                <a:schemeClr val="tx1">
+                  <a:lumMod val="50000"/>
+                  <a:lumOff val="50000"/>
+                </a:schemeClr>
+              </a:solidFill>
+            </a:ln>
+          </p:spPr>
+          <p:style>
+            <a:lnRef idx="2">
+              <a:schemeClr val="accent1">
+                <a:shade val="50000"/>
+              </a:schemeClr>
+            </a:lnRef>
+            <a:fillRef idx="1">
+              <a:schemeClr val="accent1"/>
+            </a:fillRef>
+            <a:effectRef idx="0">
+              <a:schemeClr val="accent1"/>
+            </a:effectRef>
+            <a:fontRef idx="minor">
+              <a:schemeClr val="lt1"/>
+            </a:fontRef>
+          </p:style>
+          <p:txBody>
+            <a:bodyPr rtlCol="0" anchor="ctr"/>
+            <a:lstStyle/>
+            <a:p>
+              <a:pPr algn="ctr"/>
+              <a:endParaRPr lang="zh-TW" altLang="en-US"/>
+            </a:p>
+          </p:txBody>
+        </p:sp>
+      </p:grpSp>
+      <p:cxnSp>
+        <p:nvCxnSpPr>
+          <p:cNvPr id="13" name="Straight Arrow Connector 12"/>
+          <p:cNvCxnSpPr/>
+          <p:nvPr/>
+        </p:nvCxnSpPr>
+        <p:spPr>
+          <a:xfrm>
+            <a:off x="4644008" y="3212976"/>
+            <a:ext cx="0" cy="432048"/>
+          </a:xfrm>
+          <a:prstGeom prst="straightConnector1">
+            <a:avLst/>
+          </a:prstGeom>
+          <a:ln w="63500">
+            <a:solidFill>
+              <a:schemeClr val="bg1"/>
+            </a:solidFill>
+            <a:tailEnd type="triangle" w="lg" len="med"/>
+          </a:ln>
+        </p:spPr>
+        <p:style>
+          <a:lnRef idx="1">
+            <a:schemeClr val="accent1"/>
+          </a:lnRef>
+          <a:fillRef idx="0">
+            <a:schemeClr val="accent1"/>
+          </a:fillRef>
+          <a:effectRef idx="0">
+            <a:schemeClr val="accent1"/>
+          </a:effectRef>
+          <a:fontRef idx="minor">
+            <a:schemeClr val="tx1"/>
+          </a:fontRef>
+        </p:style>
+      </p:cxnSp>
+      <p:cxnSp>
+        <p:nvCxnSpPr>
+          <p:cNvPr id="18" name="Straight Arrow Connector 17"/>
+          <p:cNvCxnSpPr/>
+          <p:nvPr/>
+        </p:nvCxnSpPr>
+        <p:spPr>
+          <a:xfrm flipV="1">
+            <a:off x="4385989" y="3201810"/>
+            <a:ext cx="0" cy="432000"/>
+          </a:xfrm>
+          <a:prstGeom prst="straightConnector1">
+            <a:avLst/>
+          </a:prstGeom>
+          <a:ln w="63500">
+            <a:solidFill>
+              <a:schemeClr val="bg1"/>
+            </a:solidFill>
+            <a:tailEnd type="triangle" w="lg" len="med"/>
+          </a:ln>
+        </p:spPr>
+        <p:style>
+          <a:lnRef idx="1">
+            <a:schemeClr val="accent1"/>
+          </a:lnRef>
+          <a:fillRef idx="0">
+            <a:schemeClr val="accent1"/>
+          </a:fillRef>
+          <a:effectRef idx="0">
+            <a:schemeClr val="accent1"/>
+          </a:effectRef>
+          <a:fontRef idx="minor">
+            <a:schemeClr val="tx1"/>
+          </a:fontRef>
+        </p:style>
+      </p:cxnSp>
+    </p:spTree>
+    <p:extLst>
+      <p:ext uri="{BB962C8B-B14F-4D97-AF65-F5344CB8AC3E}">
+        <p14:creationId xmlns:p14="http://schemas.microsoft.com/office/powerpoint/2010/main" val="3669346345"/>
+      </p:ext>
+    </p:extLst>
+  </p:cSld>
+  <p:clrMapOvr>
+    <a:masterClrMapping/>
+  </p:clrMapOvr>
+</p:sld>
+</file>
+
+<file path=ppt/slides/slide11.xml><?xml version="1.0" encoding="utf-8"?>
+<p:sld xmlns:a="http://schemas.openxmlformats.org/drawingml/2006/main" xmlns:r="http://schemas.openxmlformats.org/officeDocument/2006/relationships" xmlns:p="http://schemas.openxmlformats.org/presentationml/2006/main">
+  <p:cSld>
+    <p:spTree>
+      <p:nvGrpSpPr>
+        <p:cNvPr id="1" name=""/>
+        <p:cNvGrpSpPr/>
+        <p:nvPr/>
+      </p:nvGrpSpPr>
+      <p:grpSpPr>
+        <a:xfrm>
+          <a:off x="0" y="0"/>
+          <a:ext cx="0" cy="0"/>
+          <a:chOff x="0" y="0"/>
+          <a:chExt cx="0" cy="0"/>
+        </a:xfrm>
+      </p:grpSpPr>
+      <p:sp>
+        <p:nvSpPr>
           <p:cNvPr id="3" name="Rectangle 2"/>
           <p:cNvSpPr/>
           <p:nvPr/>
@@ -4013,7 +4416,7 @@
 </p:sld>
 </file>
 
-<file path=ppt/slides/slide11.xml><?xml version="1.0" encoding="utf-8"?>
+<file path=ppt/slides/slide12.xml><?xml version="1.0" encoding="utf-8"?>
 <p:sld xmlns:a="http://schemas.openxmlformats.org/drawingml/2006/main" xmlns:r="http://schemas.openxmlformats.org/officeDocument/2006/relationships" xmlns:p="http://schemas.openxmlformats.org/presentationml/2006/main">
   <p:cSld>
     <p:spTree>
@@ -4187,7 +4590,7 @@
 </p:sld>
 </file>
 
-<file path=ppt/slides/slide12.xml><?xml version="1.0" encoding="utf-8"?>
+<file path=ppt/slides/slide13.xml><?xml version="1.0" encoding="utf-8"?>
 <p:sld xmlns:a="http://schemas.openxmlformats.org/drawingml/2006/main" xmlns:r="http://schemas.openxmlformats.org/officeDocument/2006/relationships" xmlns:p="http://schemas.openxmlformats.org/presentationml/2006/main">
   <p:cSld>
     <p:spTree>
@@ -4451,7 +4854,7 @@
 </p:sld>
 </file>
 
-<file path=ppt/slides/slide13.xml><?xml version="1.0" encoding="utf-8"?>
+<file path=ppt/slides/slide14.xml><?xml version="1.0" encoding="utf-8"?>
 <p:sld xmlns:a="http://schemas.openxmlformats.org/drawingml/2006/main" xmlns:r="http://schemas.openxmlformats.org/officeDocument/2006/relationships" xmlns:p="http://schemas.openxmlformats.org/presentationml/2006/main">
   <p:cSld>
     <p:spTree>
@@ -4549,7 +4952,7 @@
 </p:sld>
 </file>
 
-<file path=ppt/slides/slide14.xml><?xml version="1.0" encoding="utf-8"?>
+<file path=ppt/slides/slide15.xml><?xml version="1.0" encoding="utf-8"?>
 <p:sld xmlns:a="http://schemas.openxmlformats.org/drawingml/2006/main" xmlns:r="http://schemas.openxmlformats.org/officeDocument/2006/relationships" xmlns:p="http://schemas.openxmlformats.org/presentationml/2006/main">
   <p:cSld>
     <p:spTree>
@@ -5032,7 +5435,7 @@
 </p:sld>
 </file>
 
-<file path=ppt/slides/slide15.xml><?xml version="1.0" encoding="utf-8"?>
+<file path=ppt/slides/slide16.xml><?xml version="1.0" encoding="utf-8"?>
 <p:sld xmlns:a="http://schemas.openxmlformats.org/drawingml/2006/main" xmlns:r="http://schemas.openxmlformats.org/officeDocument/2006/relationships" xmlns:p="http://schemas.openxmlformats.org/presentationml/2006/main">
   <p:cSld>
     <p:spTree>
@@ -5069,7 +5472,7 @@
 </p:sld>
 </file>
 
-<file path=ppt/slides/slide16.xml><?xml version="1.0" encoding="utf-8"?>
+<file path=ppt/slides/slide17.xml><?xml version="1.0" encoding="utf-8"?>
 <p:sld xmlns:a="http://schemas.openxmlformats.org/drawingml/2006/main" xmlns:r="http://schemas.openxmlformats.org/officeDocument/2006/relationships" xmlns:p="http://schemas.openxmlformats.org/presentationml/2006/main">
   <p:cSld>
     <p:spTree>
@@ -5106,7 +5509,7 @@
 </p:sld>
 </file>
 
-<file path=ppt/slides/slide17.xml><?xml version="1.0" encoding="utf-8"?>
+<file path=ppt/slides/slide18.xml><?xml version="1.0" encoding="utf-8"?>
 <p:sld xmlns:a="http://schemas.openxmlformats.org/drawingml/2006/main" xmlns:r="http://schemas.openxmlformats.org/officeDocument/2006/relationships" xmlns:p="http://schemas.openxmlformats.org/presentationml/2006/main">
   <p:cSld>
     <p:spTree>
@@ -5237,7 +5640,7 @@
 </p:sld>
 </file>
 
-<file path=ppt/slides/slide18.xml><?xml version="1.0" encoding="utf-8"?>
+<file path=ppt/slides/slide19.xml><?xml version="1.0" encoding="utf-8"?>
 <p:sld xmlns:a="http://schemas.openxmlformats.org/drawingml/2006/main" xmlns:r="http://schemas.openxmlformats.org/officeDocument/2006/relationships" xmlns:p="http://schemas.openxmlformats.org/presentationml/2006/main">
   <p:cSld>
     <p:spTree>
@@ -5308,7 +5711,127 @@
 </p:sld>
 </file>
 
-<file path=ppt/slides/slide19.xml><?xml version="1.0" encoding="utf-8"?>
+<file path=ppt/slides/slide2.xml><?xml version="1.0" encoding="utf-8"?>
+<p:sld xmlns:a="http://schemas.openxmlformats.org/drawingml/2006/main" xmlns:r="http://schemas.openxmlformats.org/officeDocument/2006/relationships" xmlns:p="http://schemas.openxmlformats.org/presentationml/2006/main">
+  <p:cSld>
+    <p:spTree>
+      <p:nvGrpSpPr>
+        <p:cNvPr id="1" name=""/>
+        <p:cNvGrpSpPr/>
+        <p:nvPr/>
+      </p:nvGrpSpPr>
+      <p:grpSpPr>
+        <a:xfrm>
+          <a:off x="0" y="0"/>
+          <a:ext cx="0" cy="0"/>
+          <a:chOff x="0" y="0"/>
+          <a:chExt cx="0" cy="0"/>
+        </a:xfrm>
+      </p:grpSpPr>
+      <p:sp>
+        <p:nvSpPr>
+          <p:cNvPr id="3" name="Rectangle 2"/>
+          <p:cNvSpPr/>
+          <p:nvPr/>
+        </p:nvSpPr>
+        <p:spPr>
+          <a:xfrm>
+            <a:off x="4032000" y="2889000"/>
+            <a:ext cx="1080000" cy="1080000"/>
+          </a:xfrm>
+          <a:prstGeom prst="rect">
+            <a:avLst/>
+          </a:prstGeom>
+          <a:noFill/>
+          <a:ln w="6350">
+            <a:noFill/>
+          </a:ln>
+        </p:spPr>
+        <p:style>
+          <a:lnRef idx="2">
+            <a:schemeClr val="accent1">
+              <a:shade val="50000"/>
+            </a:schemeClr>
+          </a:lnRef>
+          <a:fillRef idx="1">
+            <a:schemeClr val="accent1"/>
+          </a:fillRef>
+          <a:effectRef idx="0">
+            <a:schemeClr val="accent1"/>
+          </a:effectRef>
+          <a:fontRef idx="minor">
+            <a:schemeClr val="lt1"/>
+          </a:fontRef>
+        </p:style>
+        <p:txBody>
+          <a:bodyPr rtlCol="0" anchor="ctr"/>
+          <a:lstStyle/>
+          <a:p>
+            <a:pPr algn="ctr"/>
+            <a:endParaRPr lang="zh-TW" altLang="en-US"/>
+          </a:p>
+        </p:txBody>
+      </p:sp>
+      <p:sp>
+        <p:nvSpPr>
+          <p:cNvPr id="4" name="Oval 3"/>
+          <p:cNvSpPr/>
+          <p:nvPr/>
+        </p:nvSpPr>
+        <p:spPr>
+          <a:xfrm>
+            <a:off x="4114800" y="2971800"/>
+            <a:ext cx="914400" cy="914400"/>
+          </a:xfrm>
+          <a:prstGeom prst="ellipse">
+            <a:avLst/>
+          </a:prstGeom>
+          <a:solidFill>
+            <a:srgbClr val="FF0000"/>
+          </a:solidFill>
+          <a:ln>
+            <a:noFill/>
+          </a:ln>
+        </p:spPr>
+        <p:style>
+          <a:lnRef idx="2">
+            <a:schemeClr val="accent1">
+              <a:shade val="50000"/>
+            </a:schemeClr>
+          </a:lnRef>
+          <a:fillRef idx="1">
+            <a:schemeClr val="accent1"/>
+          </a:fillRef>
+          <a:effectRef idx="0">
+            <a:schemeClr val="accent1"/>
+          </a:effectRef>
+          <a:fontRef idx="minor">
+            <a:schemeClr val="lt1"/>
+          </a:fontRef>
+        </p:style>
+        <p:txBody>
+          <a:bodyPr rtlCol="0" anchor="ctr"/>
+          <a:lstStyle/>
+          <a:p>
+            <a:pPr algn="ctr"/>
+            <a:endParaRPr lang="en-US"/>
+          </a:p>
+        </p:txBody>
+      </p:sp>
+    </p:spTree>
+    <p:extLst>
+      <p:ext uri="{BB962C8B-B14F-4D97-AF65-F5344CB8AC3E}">
+        <p14:creationId xmlns:p14="http://schemas.microsoft.com/office/powerpoint/2010/main" val="3834815093"/>
+      </p:ext>
+    </p:extLst>
+  </p:cSld>
+  <p:clrMapOvr>
+    <a:masterClrMapping/>
+  </p:clrMapOvr>
+</p:sld>
+</file>
+
+<file path=ppt/slides/slide20.xml><?xml version="1.0" encoding="utf-8"?>
 <p:sld xmlns:a="http://schemas.openxmlformats.org/drawingml/2006/main" xmlns:r="http://schemas.openxmlformats.org/officeDocument/2006/relationships" xmlns:p="http://schemas.openxmlformats.org/presentationml/2006/main">
   <p:cSld>
     <p:spTree>
@@ -5492,127 +6015,7 @@
 </p:sld>
 </file>
 
-<file path=ppt/slides/slide2.xml><?xml version="1.0" encoding="utf-8"?>
-<p:sld xmlns:a="http://schemas.openxmlformats.org/drawingml/2006/main" xmlns:r="http://schemas.openxmlformats.org/officeDocument/2006/relationships" xmlns:p="http://schemas.openxmlformats.org/presentationml/2006/main">
-  <p:cSld>
-    <p:spTree>
-      <p:nvGrpSpPr>
-        <p:cNvPr id="1" name=""/>
-        <p:cNvGrpSpPr/>
-        <p:nvPr/>
-      </p:nvGrpSpPr>
-      <p:grpSpPr>
-        <a:xfrm>
-          <a:off x="0" y="0"/>
-          <a:ext cx="0" cy="0"/>
-          <a:chOff x="0" y="0"/>
-          <a:chExt cx="0" cy="0"/>
-        </a:xfrm>
-      </p:grpSpPr>
-      <p:sp>
-        <p:nvSpPr>
-          <p:cNvPr id="3" name="Rectangle 2"/>
-          <p:cNvSpPr/>
-          <p:nvPr/>
-        </p:nvSpPr>
-        <p:spPr>
-          <a:xfrm>
-            <a:off x="4032000" y="2889000"/>
-            <a:ext cx="1080000" cy="1080000"/>
-          </a:xfrm>
-          <a:prstGeom prst="rect">
-            <a:avLst/>
-          </a:prstGeom>
-          <a:noFill/>
-          <a:ln w="6350">
-            <a:noFill/>
-          </a:ln>
-        </p:spPr>
-        <p:style>
-          <a:lnRef idx="2">
-            <a:schemeClr val="accent1">
-              <a:shade val="50000"/>
-            </a:schemeClr>
-          </a:lnRef>
-          <a:fillRef idx="1">
-            <a:schemeClr val="accent1"/>
-          </a:fillRef>
-          <a:effectRef idx="0">
-            <a:schemeClr val="accent1"/>
-          </a:effectRef>
-          <a:fontRef idx="minor">
-            <a:schemeClr val="lt1"/>
-          </a:fontRef>
-        </p:style>
-        <p:txBody>
-          <a:bodyPr rtlCol="0" anchor="ctr"/>
-          <a:lstStyle/>
-          <a:p>
-            <a:pPr algn="ctr"/>
-            <a:endParaRPr lang="zh-TW" altLang="en-US"/>
-          </a:p>
-        </p:txBody>
-      </p:sp>
-      <p:sp>
-        <p:nvSpPr>
-          <p:cNvPr id="4" name="Oval 3"/>
-          <p:cNvSpPr/>
-          <p:nvPr/>
-        </p:nvSpPr>
-        <p:spPr>
-          <a:xfrm>
-            <a:off x="4114800" y="2971800"/>
-            <a:ext cx="914400" cy="914400"/>
-          </a:xfrm>
-          <a:prstGeom prst="ellipse">
-            <a:avLst/>
-          </a:prstGeom>
-          <a:solidFill>
-            <a:srgbClr val="FF0000"/>
-          </a:solidFill>
-          <a:ln>
-            <a:noFill/>
-          </a:ln>
-        </p:spPr>
-        <p:style>
-          <a:lnRef idx="2">
-            <a:schemeClr val="accent1">
-              <a:shade val="50000"/>
-            </a:schemeClr>
-          </a:lnRef>
-          <a:fillRef idx="1">
-            <a:schemeClr val="accent1"/>
-          </a:fillRef>
-          <a:effectRef idx="0">
-            <a:schemeClr val="accent1"/>
-          </a:effectRef>
-          <a:fontRef idx="minor">
-            <a:schemeClr val="lt1"/>
-          </a:fontRef>
-        </p:style>
-        <p:txBody>
-          <a:bodyPr rtlCol="0" anchor="ctr"/>
-          <a:lstStyle/>
-          <a:p>
-            <a:pPr algn="ctr"/>
-            <a:endParaRPr lang="en-US"/>
-          </a:p>
-        </p:txBody>
-      </p:sp>
-    </p:spTree>
-    <p:extLst>
-      <p:ext uri="{BB962C8B-B14F-4D97-AF65-F5344CB8AC3E}">
-        <p14:creationId xmlns:p14="http://schemas.microsoft.com/office/powerpoint/2010/main" val="3834815093"/>
-      </p:ext>
-    </p:extLst>
-  </p:cSld>
-  <p:clrMapOvr>
-    <a:masterClrMapping/>
-  </p:clrMapOvr>
-</p:sld>
-</file>
-
-<file path=ppt/slides/slide20.xml><?xml version="1.0" encoding="utf-8"?>
+<file path=ppt/slides/slide21.xml><?xml version="1.0" encoding="utf-8"?>
 <p:sld xmlns:a="http://schemas.openxmlformats.org/drawingml/2006/main" xmlns:r="http://schemas.openxmlformats.org/officeDocument/2006/relationships" xmlns:p="http://schemas.openxmlformats.org/presentationml/2006/main">
   <p:cSld>
     <p:spTree>
@@ -5957,7 +6360,7 @@
 </p:sld>
 </file>
 
-<file path=ppt/slides/slide21.xml><?xml version="1.0" encoding="utf-8"?>
+<file path=ppt/slides/slide22.xml><?xml version="1.0" encoding="utf-8"?>
 <p:sld xmlns:a="http://schemas.openxmlformats.org/drawingml/2006/main" xmlns:r="http://schemas.openxmlformats.org/officeDocument/2006/relationships" xmlns:p="http://schemas.openxmlformats.org/presentationml/2006/main">
   <p:cSld>
     <p:spTree>
@@ -6432,7 +6835,7 @@
 </p:sld>
 </file>
 
-<file path=ppt/slides/slide22.xml><?xml version="1.0" encoding="utf-8"?>
+<file path=ppt/slides/slide23.xml><?xml version="1.0" encoding="utf-8"?>
 <p:sld xmlns:a="http://schemas.openxmlformats.org/drawingml/2006/main" xmlns:r="http://schemas.openxmlformats.org/officeDocument/2006/relationships" xmlns:p="http://schemas.openxmlformats.org/presentationml/2006/main">
   <p:cSld>
     <p:spTree>
@@ -6608,7 +7011,7 @@
 </p:sld>
 </file>
 
-<file path=ppt/slides/slide23.xml><?xml version="1.0" encoding="utf-8"?>
+<file path=ppt/slides/slide24.xml><?xml version="1.0" encoding="utf-8"?>
 <p:sld xmlns:a="http://schemas.openxmlformats.org/drawingml/2006/main" xmlns:r="http://schemas.openxmlformats.org/officeDocument/2006/relationships" xmlns:p="http://schemas.openxmlformats.org/presentationml/2006/main">
   <p:cSld>
     <p:spTree>
@@ -6684,7 +7087,7 @@
 </p:sld>
 </file>
 
-<file path=ppt/slides/slide24.xml><?xml version="1.0" encoding="utf-8"?>
+<file path=ppt/slides/slide25.xml><?xml version="1.0" encoding="utf-8"?>
 <p:sld xmlns:a="http://schemas.openxmlformats.org/drawingml/2006/main" xmlns:r="http://schemas.openxmlformats.org/officeDocument/2006/relationships" xmlns:p="http://schemas.openxmlformats.org/presentationml/2006/main">
   <p:cSld>
     <p:spTree>
@@ -6910,7 +7313,7 @@
 </p:sld>
 </file>
 
-<file path=ppt/slides/slide25.xml><?xml version="1.0" encoding="utf-8"?>
+<file path=ppt/slides/slide26.xml><?xml version="1.0" encoding="utf-8"?>
 <p:sld xmlns:a="http://schemas.openxmlformats.org/drawingml/2006/main" xmlns:r="http://schemas.openxmlformats.org/officeDocument/2006/relationships" xmlns:p="http://schemas.openxmlformats.org/presentationml/2006/main">
   <p:cSld>
     <p:spTree>
@@ -7258,7 +7661,7 @@
 </p:sld>
 </file>
 
-<file path=ppt/slides/slide26.xml><?xml version="1.0" encoding="utf-8"?>
+<file path=ppt/slides/slide27.xml><?xml version="1.0" encoding="utf-8"?>
 <p:sld xmlns:a="http://schemas.openxmlformats.org/drawingml/2006/main" xmlns:r="http://schemas.openxmlformats.org/officeDocument/2006/relationships" xmlns:p="http://schemas.openxmlformats.org/presentationml/2006/main">
   <p:cSld>
     <p:spTree>
@@ -7576,7 +7979,7 @@
 </p:sld>
 </file>
 
-<file path=ppt/slides/slide27.xml><?xml version="1.0" encoding="utf-8"?>
+<file path=ppt/slides/slide28.xml><?xml version="1.0" encoding="utf-8"?>
 <p:sld xmlns:a="http://schemas.openxmlformats.org/drawingml/2006/main" xmlns:r="http://schemas.openxmlformats.org/officeDocument/2006/relationships" xmlns:p="http://schemas.openxmlformats.org/presentationml/2006/main">
   <p:cSld>
     <p:spTree>
@@ -8416,7 +8819,7 @@
 </p:sld>
 </file>
 
-<file path=ppt/slides/slide28.xml><?xml version="1.0" encoding="utf-8"?>
+<file path=ppt/slides/slide29.xml><?xml version="1.0" encoding="utf-8"?>
 <p:sld xmlns:a="http://schemas.openxmlformats.org/drawingml/2006/main" xmlns:r="http://schemas.openxmlformats.org/officeDocument/2006/relationships" xmlns:p="http://schemas.openxmlformats.org/presentationml/2006/main">
   <p:cSld>
     <p:spTree>
@@ -10095,7 +10498,129 @@
 </p:sld>
 </file>
 
-<file path=ppt/slides/slide29.xml><?xml version="1.0" encoding="utf-8"?>
+<file path=ppt/slides/slide3.xml><?xml version="1.0" encoding="utf-8"?>
+<p:sld xmlns:a="http://schemas.openxmlformats.org/drawingml/2006/main" xmlns:r="http://schemas.openxmlformats.org/officeDocument/2006/relationships" xmlns:p="http://schemas.openxmlformats.org/presentationml/2006/main">
+  <p:cSld>
+    <p:spTree>
+      <p:nvGrpSpPr>
+        <p:cNvPr id="1" name=""/>
+        <p:cNvGrpSpPr/>
+        <p:nvPr/>
+      </p:nvGrpSpPr>
+      <p:grpSpPr>
+        <a:xfrm>
+          <a:off x="0" y="0"/>
+          <a:ext cx="0" cy="0"/>
+          <a:chOff x="0" y="0"/>
+          <a:chExt cx="0" cy="0"/>
+        </a:xfrm>
+      </p:grpSpPr>
+      <p:sp>
+        <p:nvSpPr>
+          <p:cNvPr id="5" name="Rounded Rectangle 4"/>
+          <p:cNvSpPr/>
+          <p:nvPr/>
+        </p:nvSpPr>
+        <p:spPr>
+          <a:xfrm>
+            <a:off x="4281016" y="3140968"/>
+            <a:ext cx="576064" cy="576064"/>
+          </a:xfrm>
+          <a:prstGeom prst="roundRect">
+            <a:avLst>
+              <a:gd name="adj" fmla="val 11111"/>
+            </a:avLst>
+          </a:prstGeom>
+          <a:solidFill>
+            <a:srgbClr val="FF0000"/>
+          </a:solidFill>
+          <a:ln>
+            <a:noFill/>
+          </a:ln>
+        </p:spPr>
+        <p:style>
+          <a:lnRef idx="2">
+            <a:schemeClr val="accent1">
+              <a:shade val="50000"/>
+            </a:schemeClr>
+          </a:lnRef>
+          <a:fillRef idx="1">
+            <a:schemeClr val="accent1"/>
+          </a:fillRef>
+          <a:effectRef idx="0">
+            <a:schemeClr val="accent1"/>
+          </a:effectRef>
+          <a:fontRef idx="minor">
+            <a:schemeClr val="lt1"/>
+          </a:fontRef>
+        </p:style>
+        <p:txBody>
+          <a:bodyPr rtlCol="0" anchor="ctr"/>
+          <a:lstStyle/>
+          <a:p>
+            <a:pPr algn="ctr"/>
+            <a:endParaRPr lang="en-US"/>
+          </a:p>
+        </p:txBody>
+      </p:sp>
+      <p:sp>
+        <p:nvSpPr>
+          <p:cNvPr id="3" name="Rectangle 2"/>
+          <p:cNvSpPr/>
+          <p:nvPr/>
+        </p:nvSpPr>
+        <p:spPr>
+          <a:xfrm>
+            <a:off x="4032000" y="2889000"/>
+            <a:ext cx="1080000" cy="1080000"/>
+          </a:xfrm>
+          <a:prstGeom prst="rect">
+            <a:avLst/>
+          </a:prstGeom>
+          <a:noFill/>
+          <a:ln w="6350">
+            <a:noFill/>
+          </a:ln>
+        </p:spPr>
+        <p:style>
+          <a:lnRef idx="2">
+            <a:schemeClr val="accent1">
+              <a:shade val="50000"/>
+            </a:schemeClr>
+          </a:lnRef>
+          <a:fillRef idx="1">
+            <a:schemeClr val="accent1"/>
+          </a:fillRef>
+          <a:effectRef idx="0">
+            <a:schemeClr val="accent1"/>
+          </a:effectRef>
+          <a:fontRef idx="minor">
+            <a:schemeClr val="lt1"/>
+          </a:fontRef>
+        </p:style>
+        <p:txBody>
+          <a:bodyPr rtlCol="0" anchor="ctr"/>
+          <a:lstStyle/>
+          <a:p>
+            <a:pPr algn="ctr"/>
+            <a:endParaRPr lang="zh-TW" altLang="en-US"/>
+          </a:p>
+        </p:txBody>
+      </p:sp>
+    </p:spTree>
+    <p:extLst>
+      <p:ext uri="{BB962C8B-B14F-4D97-AF65-F5344CB8AC3E}">
+        <p14:creationId xmlns:p14="http://schemas.microsoft.com/office/powerpoint/2010/main" val="2760861898"/>
+      </p:ext>
+    </p:extLst>
+  </p:cSld>
+  <p:clrMapOvr>
+    <a:masterClrMapping/>
+  </p:clrMapOvr>
+</p:sld>
+</file>
+
+<file path=ppt/slides/slide30.xml><?xml version="1.0" encoding="utf-8"?>
 <p:sld xmlns:a="http://schemas.openxmlformats.org/drawingml/2006/main" xmlns:r="http://schemas.openxmlformats.org/officeDocument/2006/relationships" xmlns:p="http://schemas.openxmlformats.org/presentationml/2006/main">
   <p:cSld>
     <p:spTree>
@@ -10338,129 +10863,7 @@
 </p:sld>
 </file>
 
-<file path=ppt/slides/slide3.xml><?xml version="1.0" encoding="utf-8"?>
-<p:sld xmlns:a="http://schemas.openxmlformats.org/drawingml/2006/main" xmlns:r="http://schemas.openxmlformats.org/officeDocument/2006/relationships" xmlns:p="http://schemas.openxmlformats.org/presentationml/2006/main">
-  <p:cSld>
-    <p:spTree>
-      <p:nvGrpSpPr>
-        <p:cNvPr id="1" name=""/>
-        <p:cNvGrpSpPr/>
-        <p:nvPr/>
-      </p:nvGrpSpPr>
-      <p:grpSpPr>
-        <a:xfrm>
-          <a:off x="0" y="0"/>
-          <a:ext cx="0" cy="0"/>
-          <a:chOff x="0" y="0"/>
-          <a:chExt cx="0" cy="0"/>
-        </a:xfrm>
-      </p:grpSpPr>
-      <p:sp>
-        <p:nvSpPr>
-          <p:cNvPr id="5" name="Rounded Rectangle 4"/>
-          <p:cNvSpPr/>
-          <p:nvPr/>
-        </p:nvSpPr>
-        <p:spPr>
-          <a:xfrm>
-            <a:off x="4281016" y="3140968"/>
-            <a:ext cx="576064" cy="576064"/>
-          </a:xfrm>
-          <a:prstGeom prst="roundRect">
-            <a:avLst>
-              <a:gd name="adj" fmla="val 11111"/>
-            </a:avLst>
-          </a:prstGeom>
-          <a:solidFill>
-            <a:srgbClr val="FF0000"/>
-          </a:solidFill>
-          <a:ln>
-            <a:noFill/>
-          </a:ln>
-        </p:spPr>
-        <p:style>
-          <a:lnRef idx="2">
-            <a:schemeClr val="accent1">
-              <a:shade val="50000"/>
-            </a:schemeClr>
-          </a:lnRef>
-          <a:fillRef idx="1">
-            <a:schemeClr val="accent1"/>
-          </a:fillRef>
-          <a:effectRef idx="0">
-            <a:schemeClr val="accent1"/>
-          </a:effectRef>
-          <a:fontRef idx="minor">
-            <a:schemeClr val="lt1"/>
-          </a:fontRef>
-        </p:style>
-        <p:txBody>
-          <a:bodyPr rtlCol="0" anchor="ctr"/>
-          <a:lstStyle/>
-          <a:p>
-            <a:pPr algn="ctr"/>
-            <a:endParaRPr lang="en-US"/>
-          </a:p>
-        </p:txBody>
-      </p:sp>
-      <p:sp>
-        <p:nvSpPr>
-          <p:cNvPr id="3" name="Rectangle 2"/>
-          <p:cNvSpPr/>
-          <p:nvPr/>
-        </p:nvSpPr>
-        <p:spPr>
-          <a:xfrm>
-            <a:off x="4032000" y="2889000"/>
-            <a:ext cx="1080000" cy="1080000"/>
-          </a:xfrm>
-          <a:prstGeom prst="rect">
-            <a:avLst/>
-          </a:prstGeom>
-          <a:noFill/>
-          <a:ln w="6350">
-            <a:noFill/>
-          </a:ln>
-        </p:spPr>
-        <p:style>
-          <a:lnRef idx="2">
-            <a:schemeClr val="accent1">
-              <a:shade val="50000"/>
-            </a:schemeClr>
-          </a:lnRef>
-          <a:fillRef idx="1">
-            <a:schemeClr val="accent1"/>
-          </a:fillRef>
-          <a:effectRef idx="0">
-            <a:schemeClr val="accent1"/>
-          </a:effectRef>
-          <a:fontRef idx="minor">
-            <a:schemeClr val="lt1"/>
-          </a:fontRef>
-        </p:style>
-        <p:txBody>
-          <a:bodyPr rtlCol="0" anchor="ctr"/>
-          <a:lstStyle/>
-          <a:p>
-            <a:pPr algn="ctr"/>
-            <a:endParaRPr lang="zh-TW" altLang="en-US"/>
-          </a:p>
-        </p:txBody>
-      </p:sp>
-    </p:spTree>
-    <p:extLst>
-      <p:ext uri="{BB962C8B-B14F-4D97-AF65-F5344CB8AC3E}">
-        <p14:creationId xmlns:p14="http://schemas.microsoft.com/office/powerpoint/2010/main" val="2760861898"/>
-      </p:ext>
-    </p:extLst>
-  </p:cSld>
-  <p:clrMapOvr>
-    <a:masterClrMapping/>
-  </p:clrMapOvr>
-</p:sld>
-</file>
-
-<file path=ppt/slides/slide30.xml><?xml version="1.0" encoding="utf-8"?>
+<file path=ppt/slides/slide31.xml><?xml version="1.0" encoding="utf-8"?>
 <p:sld xmlns:a="http://schemas.openxmlformats.org/drawingml/2006/main" xmlns:r="http://schemas.openxmlformats.org/officeDocument/2006/relationships" xmlns:p="http://schemas.openxmlformats.org/presentationml/2006/main">
   <p:cSld>
     <p:spTree>
@@ -11326,7 +11729,7 @@
 </p:sld>
 </file>
 
-<file path=ppt/slides/slide31.xml><?xml version="1.0" encoding="utf-8"?>
+<file path=ppt/slides/slide32.xml><?xml version="1.0" encoding="utf-8"?>
 <p:sld xmlns:a="http://schemas.openxmlformats.org/drawingml/2006/main" xmlns:r="http://schemas.openxmlformats.org/officeDocument/2006/relationships" xmlns:p="http://schemas.openxmlformats.org/presentationml/2006/main">
   <p:cSld>
     <p:spTree>
@@ -12254,7 +12657,7 @@
 </p:sld>
 </file>
 
-<file path=ppt/slides/slide32.xml><?xml version="1.0" encoding="utf-8"?>
+<file path=ppt/slides/slide33.xml><?xml version="1.0" encoding="utf-8"?>
 <p:sld xmlns:a="http://schemas.openxmlformats.org/drawingml/2006/main" xmlns:r="http://schemas.openxmlformats.org/officeDocument/2006/relationships" xmlns:p="http://schemas.openxmlformats.org/presentationml/2006/main">
   <p:cSld>
     <p:spTree>
@@ -13188,7 +13591,7 @@
 </p:sld>
 </file>
 
-<file path=ppt/slides/slide33.xml><?xml version="1.0" encoding="utf-8"?>
+<file path=ppt/slides/slide34.xml><?xml version="1.0" encoding="utf-8"?>
 <p:sld xmlns:a="http://schemas.openxmlformats.org/drawingml/2006/main" xmlns:r="http://schemas.openxmlformats.org/officeDocument/2006/relationships" xmlns:p="http://schemas.openxmlformats.org/presentationml/2006/main">
   <p:cSld>
     <p:spTree>
@@ -13268,7 +13671,7 @@
 </p:sld>
 </file>
 
-<file path=ppt/slides/slide34.xml><?xml version="1.0" encoding="utf-8"?>
+<file path=ppt/slides/slide35.xml><?xml version="1.0" encoding="utf-8"?>
 <p:sld xmlns:a="http://schemas.openxmlformats.org/drawingml/2006/main" xmlns:r="http://schemas.openxmlformats.org/officeDocument/2006/relationships" xmlns:p="http://schemas.openxmlformats.org/presentationml/2006/main">
   <p:cSld>
     <p:spTree>
@@ -13402,171 +13805,6 @@
     <p:extLst>
       <p:ext uri="{BB962C8B-B14F-4D97-AF65-F5344CB8AC3E}">
         <p14:creationId xmlns:p14="http://schemas.microsoft.com/office/powerpoint/2010/main" val="1337791561"/>
-      </p:ext>
-    </p:extLst>
-  </p:cSld>
-  <p:clrMapOvr>
-    <a:masterClrMapping/>
-  </p:clrMapOvr>
-</p:sld>
-</file>
-
-<file path=ppt/slides/slide35.xml><?xml version="1.0" encoding="utf-8"?>
-<p:sld xmlns:a="http://schemas.openxmlformats.org/drawingml/2006/main" xmlns:r="http://schemas.openxmlformats.org/officeDocument/2006/relationships" xmlns:p="http://schemas.openxmlformats.org/presentationml/2006/main">
-  <p:cSld>
-    <p:spTree>
-      <p:nvGrpSpPr>
-        <p:cNvPr id="1" name=""/>
-        <p:cNvGrpSpPr/>
-        <p:nvPr/>
-      </p:nvGrpSpPr>
-      <p:grpSpPr>
-        <a:xfrm>
-          <a:off x="0" y="0"/>
-          <a:ext cx="0" cy="0"/>
-          <a:chOff x="0" y="0"/>
-          <a:chExt cx="0" cy="0"/>
-        </a:xfrm>
-      </p:grpSpPr>
-      <p:sp>
-        <p:nvSpPr>
-          <p:cNvPr id="2" name="Snip Single Corner Rectangle 1"/>
-          <p:cNvSpPr/>
-          <p:nvPr/>
-        </p:nvSpPr>
-        <p:spPr>
-          <a:xfrm>
-            <a:off x="3776216" y="2710272"/>
-            <a:ext cx="1080000" cy="1080000"/>
-          </a:xfrm>
-          <a:prstGeom prst="snip1Rect">
-            <a:avLst/>
-          </a:prstGeom>
-          <a:noFill/>
-          <a:ln w="50800">
-            <a:solidFill>
-              <a:schemeClr val="tx1">
-                <a:lumMod val="75000"/>
-                <a:lumOff val="25000"/>
-              </a:schemeClr>
-            </a:solidFill>
-          </a:ln>
-        </p:spPr>
-        <p:style>
-          <a:lnRef idx="2">
-            <a:schemeClr val="accent1">
-              <a:shade val="50000"/>
-            </a:schemeClr>
-          </a:lnRef>
-          <a:fillRef idx="1">
-            <a:schemeClr val="accent1"/>
-          </a:fillRef>
-          <a:effectRef idx="0">
-            <a:schemeClr val="accent1"/>
-          </a:effectRef>
-          <a:fontRef idx="minor">
-            <a:schemeClr val="lt1"/>
-          </a:fontRef>
-        </p:style>
-        <p:txBody>
-          <a:bodyPr lIns="0" tIns="36000" rIns="0" bIns="36000" rtlCol="0" anchor="b"/>
-          <a:lstStyle/>
-          <a:p>
-            <a:pPr algn="r"/>
-            <a:r>
-              <a:rPr lang="en-US" altLang="zh-TW" sz="2800" dirty="0">
-                <a:solidFill>
-                  <a:schemeClr val="tx1">
-                    <a:lumMod val="75000"/>
-                    <a:lumOff val="25000"/>
-                  </a:schemeClr>
-                </a:solidFill>
-                <a:latin typeface="Kozuka Gothic Pro H" pitchFamily="34" charset="-128"/>
-                <a:ea typeface="Kozuka Gothic Pro H" pitchFamily="34" charset="-128"/>
-              </a:rPr>
-              <a:t>NPY</a:t>
-            </a:r>
-            <a:endParaRPr lang="zh-TW" altLang="en-US" sz="2800" dirty="0">
-              <a:solidFill>
-                <a:schemeClr val="tx1">
-                  <a:lumMod val="75000"/>
-                  <a:lumOff val="25000"/>
-                </a:schemeClr>
-              </a:solidFill>
-              <a:latin typeface="Kozuka Gothic Pro H" pitchFamily="34" charset="-128"/>
-              <a:ea typeface="Kozuka Gothic Pro H" pitchFamily="34" charset="-128"/>
-            </a:endParaRPr>
-          </a:p>
-        </p:txBody>
-      </p:sp>
-      <p:sp>
-        <p:nvSpPr>
-          <p:cNvPr id="10" name="Rectangle 9"/>
-          <p:cNvSpPr/>
-          <p:nvPr/>
-        </p:nvSpPr>
-        <p:spPr>
-          <a:xfrm>
-            <a:off x="3956216" y="2710272"/>
-            <a:ext cx="540000" cy="358688"/>
-          </a:xfrm>
-          <a:prstGeom prst="rect">
-            <a:avLst/>
-          </a:prstGeom>
-          <a:gradFill flip="none" rotWithShape="1">
-            <a:gsLst>
-              <a:gs pos="50000">
-                <a:srgbClr val="606060"/>
-              </a:gs>
-              <a:gs pos="0">
-                <a:schemeClr val="tx1">
-                  <a:lumMod val="75000"/>
-                  <a:lumOff val="25000"/>
-                </a:schemeClr>
-              </a:gs>
-              <a:gs pos="100000">
-                <a:schemeClr val="tx1">
-                  <a:lumMod val="50000"/>
-                  <a:lumOff val="50000"/>
-                </a:schemeClr>
-              </a:gs>
-            </a:gsLst>
-            <a:lin ang="5400000" scaled="1"/>
-            <a:tileRect/>
-          </a:gradFill>
-          <a:ln w="50800">
-            <a:noFill/>
-          </a:ln>
-        </p:spPr>
-        <p:style>
-          <a:lnRef idx="2">
-            <a:schemeClr val="accent1">
-              <a:shade val="50000"/>
-            </a:schemeClr>
-          </a:lnRef>
-          <a:fillRef idx="1">
-            <a:schemeClr val="accent1"/>
-          </a:fillRef>
-          <a:effectRef idx="0">
-            <a:schemeClr val="accent1"/>
-          </a:effectRef>
-          <a:fontRef idx="minor">
-            <a:schemeClr val="lt1"/>
-          </a:fontRef>
-        </p:style>
-        <p:txBody>
-          <a:bodyPr rtlCol="0" anchor="ctr"/>
-          <a:lstStyle/>
-          <a:p>
-            <a:pPr algn="ctr"/>
-            <a:endParaRPr lang="zh-TW" altLang="en-US"/>
-          </a:p>
-        </p:txBody>
-      </p:sp>
-    </p:spTree>
-    <p:extLst>
-      <p:ext uri="{BB962C8B-B14F-4D97-AF65-F5344CB8AC3E}">
-        <p14:creationId xmlns:p14="http://schemas.microsoft.com/office/powerpoint/2010/main" val="1440644481"/>
       </p:ext>
     </p:extLst>
   </p:cSld>
@@ -13638,6 +13876,171 @@
           <a:lstStyle/>
           <a:p>
             <a:pPr algn="r"/>
+            <a:r>
+              <a:rPr lang="en-US" altLang="zh-TW" sz="2800" dirty="0">
+                <a:solidFill>
+                  <a:schemeClr val="tx1">
+                    <a:lumMod val="75000"/>
+                    <a:lumOff val="25000"/>
+                  </a:schemeClr>
+                </a:solidFill>
+                <a:latin typeface="Kozuka Gothic Pro H" pitchFamily="34" charset="-128"/>
+                <a:ea typeface="Kozuka Gothic Pro H" pitchFamily="34" charset="-128"/>
+              </a:rPr>
+              <a:t>NPY</a:t>
+            </a:r>
+            <a:endParaRPr lang="zh-TW" altLang="en-US" sz="2800" dirty="0">
+              <a:solidFill>
+                <a:schemeClr val="tx1">
+                  <a:lumMod val="75000"/>
+                  <a:lumOff val="25000"/>
+                </a:schemeClr>
+              </a:solidFill>
+              <a:latin typeface="Kozuka Gothic Pro H" pitchFamily="34" charset="-128"/>
+              <a:ea typeface="Kozuka Gothic Pro H" pitchFamily="34" charset="-128"/>
+            </a:endParaRPr>
+          </a:p>
+        </p:txBody>
+      </p:sp>
+      <p:sp>
+        <p:nvSpPr>
+          <p:cNvPr id="10" name="Rectangle 9"/>
+          <p:cNvSpPr/>
+          <p:nvPr/>
+        </p:nvSpPr>
+        <p:spPr>
+          <a:xfrm>
+            <a:off x="3956216" y="2710272"/>
+            <a:ext cx="540000" cy="358688"/>
+          </a:xfrm>
+          <a:prstGeom prst="rect">
+            <a:avLst/>
+          </a:prstGeom>
+          <a:gradFill flip="none" rotWithShape="1">
+            <a:gsLst>
+              <a:gs pos="50000">
+                <a:srgbClr val="606060"/>
+              </a:gs>
+              <a:gs pos="0">
+                <a:schemeClr val="tx1">
+                  <a:lumMod val="75000"/>
+                  <a:lumOff val="25000"/>
+                </a:schemeClr>
+              </a:gs>
+              <a:gs pos="100000">
+                <a:schemeClr val="tx1">
+                  <a:lumMod val="50000"/>
+                  <a:lumOff val="50000"/>
+                </a:schemeClr>
+              </a:gs>
+            </a:gsLst>
+            <a:lin ang="5400000" scaled="1"/>
+            <a:tileRect/>
+          </a:gradFill>
+          <a:ln w="50800">
+            <a:noFill/>
+          </a:ln>
+        </p:spPr>
+        <p:style>
+          <a:lnRef idx="2">
+            <a:schemeClr val="accent1">
+              <a:shade val="50000"/>
+            </a:schemeClr>
+          </a:lnRef>
+          <a:fillRef idx="1">
+            <a:schemeClr val="accent1"/>
+          </a:fillRef>
+          <a:effectRef idx="0">
+            <a:schemeClr val="accent1"/>
+          </a:effectRef>
+          <a:fontRef idx="minor">
+            <a:schemeClr val="lt1"/>
+          </a:fontRef>
+        </p:style>
+        <p:txBody>
+          <a:bodyPr rtlCol="0" anchor="ctr"/>
+          <a:lstStyle/>
+          <a:p>
+            <a:pPr algn="ctr"/>
+            <a:endParaRPr lang="zh-TW" altLang="en-US"/>
+          </a:p>
+        </p:txBody>
+      </p:sp>
+    </p:spTree>
+    <p:extLst>
+      <p:ext uri="{BB962C8B-B14F-4D97-AF65-F5344CB8AC3E}">
+        <p14:creationId xmlns:p14="http://schemas.microsoft.com/office/powerpoint/2010/main" val="1440644481"/>
+      </p:ext>
+    </p:extLst>
+  </p:cSld>
+  <p:clrMapOvr>
+    <a:masterClrMapping/>
+  </p:clrMapOvr>
+</p:sld>
+</file>
+
+<file path=ppt/slides/slide37.xml><?xml version="1.0" encoding="utf-8"?>
+<p:sld xmlns:a="http://schemas.openxmlformats.org/drawingml/2006/main" xmlns:r="http://schemas.openxmlformats.org/officeDocument/2006/relationships" xmlns:p="http://schemas.openxmlformats.org/presentationml/2006/main">
+  <p:cSld>
+    <p:spTree>
+      <p:nvGrpSpPr>
+        <p:cNvPr id="1" name=""/>
+        <p:cNvGrpSpPr/>
+        <p:nvPr/>
+      </p:nvGrpSpPr>
+      <p:grpSpPr>
+        <a:xfrm>
+          <a:off x="0" y="0"/>
+          <a:ext cx="0" cy="0"/>
+          <a:chOff x="0" y="0"/>
+          <a:chExt cx="0" cy="0"/>
+        </a:xfrm>
+      </p:grpSpPr>
+      <p:sp>
+        <p:nvSpPr>
+          <p:cNvPr id="2" name="Snip Single Corner Rectangle 1"/>
+          <p:cNvSpPr/>
+          <p:nvPr/>
+        </p:nvSpPr>
+        <p:spPr>
+          <a:xfrm>
+            <a:off x="3776216" y="2710272"/>
+            <a:ext cx="1080000" cy="1080000"/>
+          </a:xfrm>
+          <a:prstGeom prst="snip1Rect">
+            <a:avLst/>
+          </a:prstGeom>
+          <a:noFill/>
+          <a:ln w="50800">
+            <a:solidFill>
+              <a:schemeClr val="tx1">
+                <a:lumMod val="75000"/>
+                <a:lumOff val="25000"/>
+              </a:schemeClr>
+            </a:solidFill>
+          </a:ln>
+        </p:spPr>
+        <p:style>
+          <a:lnRef idx="2">
+            <a:schemeClr val="accent1">
+              <a:shade val="50000"/>
+            </a:schemeClr>
+          </a:lnRef>
+          <a:fillRef idx="1">
+            <a:schemeClr val="accent1"/>
+          </a:fillRef>
+          <a:effectRef idx="0">
+            <a:schemeClr val="accent1"/>
+          </a:effectRef>
+          <a:fontRef idx="minor">
+            <a:schemeClr val="lt1"/>
+          </a:fontRef>
+        </p:style>
+        <p:txBody>
+          <a:bodyPr lIns="0" tIns="36000" rIns="0" bIns="36000" rtlCol="0" anchor="b"/>
+          <a:lstStyle/>
+          <a:p>
+            <a:pPr algn="r"/>
             <a:endParaRPr lang="zh-TW" altLang="en-US" sz="2800" dirty="0">
               <a:solidFill>
                 <a:schemeClr val="tx1">
@@ -13776,7 +14179,7 @@
 </p:sld>
 </file>
 
-<file path=ppt/slides/slide37.xml><?xml version="1.0" encoding="utf-8"?>
+<file path=ppt/slides/slide38.xml><?xml version="1.0" encoding="utf-8"?>
 <p:sld xmlns:a="http://schemas.openxmlformats.org/drawingml/2006/main" xmlns:r="http://schemas.openxmlformats.org/officeDocument/2006/relationships" xmlns:p="http://schemas.openxmlformats.org/presentationml/2006/main">
   <p:cSld>
     <p:spTree>
@@ -14133,7 +14536,7 @@
 </p:sld>
 </file>
 
-<file path=ppt/slides/slide38.xml><?xml version="1.0" encoding="utf-8"?>
+<file path=ppt/slides/slide39.xml><?xml version="1.0" encoding="utf-8"?>
 <p:sld xmlns:a="http://schemas.openxmlformats.org/drawingml/2006/main" xmlns:r="http://schemas.openxmlformats.org/officeDocument/2006/relationships" xmlns:p="http://schemas.openxmlformats.org/presentationml/2006/main">
   <p:cSld>
     <p:spTree>

</xml_diff>

<commit_message>
Added some information in the readme
</commit_message>
<xml_diff>
--- a/icons/icons.pptx
+++ b/icons/icons.pptx
@@ -5,7 +5,7 @@
     <p:sldMasterId id="2147483648" r:id="rId1"/>
   </p:sldMasterIdLst>
   <p:notesMasterIdLst>
-    <p:notesMasterId r:id="rId22"/>
+    <p:notesMasterId r:id="rId23"/>
   </p:notesMasterIdLst>
   <p:sldIdLst>
     <p:sldId id="286" r:id="rId2"/>
@@ -24,10 +24,11 @@
     <p:sldId id="328" r:id="rId15"/>
     <p:sldId id="313" r:id="rId16"/>
     <p:sldId id="314" r:id="rId17"/>
-    <p:sldId id="315" r:id="rId18"/>
-    <p:sldId id="317" r:id="rId19"/>
-    <p:sldId id="316" r:id="rId20"/>
-    <p:sldId id="320" r:id="rId21"/>
+    <p:sldId id="335" r:id="rId18"/>
+    <p:sldId id="315" r:id="rId19"/>
+    <p:sldId id="317" r:id="rId20"/>
+    <p:sldId id="316" r:id="rId21"/>
+    <p:sldId id="320" r:id="rId22"/>
   </p:sldIdLst>
   <p:sldSz cx="9144000" cy="6858000" type="screen4x3"/>
   <p:notesSz cx="6858000" cy="9144000"/>
@@ -211,7 +212,7 @@
           <a:p>
             <a:fld id="{409A854A-4542-4C46-92B4-B1933D0339ED}" type="datetimeFigureOut">
               <a:rPr lang="en-US" smtClean="0"/>
-              <a:t>4/7/2017</a:t>
+              <a:t>4/20/2017</a:t>
             </a:fld>
             <a:endParaRPr lang="en-US"/>
           </a:p>
@@ -744,7 +745,7 @@
           <a:p>
             <a:fld id="{B6192DF9-7B65-41DB-B5A4-F73A2B2D849B}" type="datetimeFigureOut">
               <a:rPr lang="zh-TW" altLang="en-US" smtClean="0"/>
-              <a:t>2017/4/7</a:t>
+              <a:t>2017/4/20</a:t>
             </a:fld>
             <a:endParaRPr lang="zh-TW" altLang="en-US"/>
           </a:p>
@@ -914,7 +915,7 @@
           <a:p>
             <a:fld id="{B6192DF9-7B65-41DB-B5A4-F73A2B2D849B}" type="datetimeFigureOut">
               <a:rPr lang="zh-TW" altLang="en-US" smtClean="0"/>
-              <a:t>2017/4/7</a:t>
+              <a:t>2017/4/20</a:t>
             </a:fld>
             <a:endParaRPr lang="zh-TW" altLang="en-US"/>
           </a:p>
@@ -1094,7 +1095,7 @@
           <a:p>
             <a:fld id="{B6192DF9-7B65-41DB-B5A4-F73A2B2D849B}" type="datetimeFigureOut">
               <a:rPr lang="zh-TW" altLang="en-US" smtClean="0"/>
-              <a:t>2017/4/7</a:t>
+              <a:t>2017/4/20</a:t>
             </a:fld>
             <a:endParaRPr lang="zh-TW" altLang="en-US"/>
           </a:p>
@@ -1264,7 +1265,7 @@
           <a:p>
             <a:fld id="{B6192DF9-7B65-41DB-B5A4-F73A2B2D849B}" type="datetimeFigureOut">
               <a:rPr lang="zh-TW" altLang="en-US" smtClean="0"/>
-              <a:t>2017/4/7</a:t>
+              <a:t>2017/4/20</a:t>
             </a:fld>
             <a:endParaRPr lang="zh-TW" altLang="en-US"/>
           </a:p>
@@ -1510,7 +1511,7 @@
           <a:p>
             <a:fld id="{B6192DF9-7B65-41DB-B5A4-F73A2B2D849B}" type="datetimeFigureOut">
               <a:rPr lang="zh-TW" altLang="en-US" smtClean="0"/>
-              <a:t>2017/4/7</a:t>
+              <a:t>2017/4/20</a:t>
             </a:fld>
             <a:endParaRPr lang="zh-TW" altLang="en-US"/>
           </a:p>
@@ -1798,7 +1799,7 @@
           <a:p>
             <a:fld id="{B6192DF9-7B65-41DB-B5A4-F73A2B2D849B}" type="datetimeFigureOut">
               <a:rPr lang="zh-TW" altLang="en-US" smtClean="0"/>
-              <a:t>2017/4/7</a:t>
+              <a:t>2017/4/20</a:t>
             </a:fld>
             <a:endParaRPr lang="zh-TW" altLang="en-US"/>
           </a:p>
@@ -2220,7 +2221,7 @@
           <a:p>
             <a:fld id="{B6192DF9-7B65-41DB-B5A4-F73A2B2D849B}" type="datetimeFigureOut">
               <a:rPr lang="zh-TW" altLang="en-US" smtClean="0"/>
-              <a:t>2017/4/7</a:t>
+              <a:t>2017/4/20</a:t>
             </a:fld>
             <a:endParaRPr lang="zh-TW" altLang="en-US"/>
           </a:p>
@@ -2338,7 +2339,7 @@
           <a:p>
             <a:fld id="{B6192DF9-7B65-41DB-B5A4-F73A2B2D849B}" type="datetimeFigureOut">
               <a:rPr lang="zh-TW" altLang="en-US" smtClean="0"/>
-              <a:t>2017/4/7</a:t>
+              <a:t>2017/4/20</a:t>
             </a:fld>
             <a:endParaRPr lang="zh-TW" altLang="en-US"/>
           </a:p>
@@ -2433,7 +2434,7 @@
           <a:p>
             <a:fld id="{B6192DF9-7B65-41DB-B5A4-F73A2B2D849B}" type="datetimeFigureOut">
               <a:rPr lang="zh-TW" altLang="en-US" smtClean="0"/>
-              <a:t>2017/4/7</a:t>
+              <a:t>2017/4/20</a:t>
             </a:fld>
             <a:endParaRPr lang="zh-TW" altLang="en-US"/>
           </a:p>
@@ -2710,7 +2711,7 @@
           <a:p>
             <a:fld id="{B6192DF9-7B65-41DB-B5A4-F73A2B2D849B}" type="datetimeFigureOut">
               <a:rPr lang="zh-TW" altLang="en-US" smtClean="0"/>
-              <a:t>2017/4/7</a:t>
+              <a:t>2017/4/20</a:t>
             </a:fld>
             <a:endParaRPr lang="zh-TW" altLang="en-US"/>
           </a:p>
@@ -2963,7 +2964,7 @@
           <a:p>
             <a:fld id="{B6192DF9-7B65-41DB-B5A4-F73A2B2D849B}" type="datetimeFigureOut">
               <a:rPr lang="zh-TW" altLang="en-US" smtClean="0"/>
-              <a:t>2017/4/7</a:t>
+              <a:t>2017/4/20</a:t>
             </a:fld>
             <a:endParaRPr lang="zh-TW" altLang="en-US"/>
           </a:p>
@@ -3176,7 +3177,7 @@
           <a:p>
             <a:fld id="{B6192DF9-7B65-41DB-B5A4-F73A2B2D849B}" type="datetimeFigureOut">
               <a:rPr lang="zh-TW" altLang="en-US" smtClean="0"/>
-              <a:t>2017/4/7</a:t>
+              <a:t>2017/4/20</a:t>
             </a:fld>
             <a:endParaRPr lang="zh-TW" altLang="en-US"/>
           </a:p>
@@ -3828,64 +3829,14 @@
       </p:grpSpPr>
       <p:sp>
         <p:nvSpPr>
-          <p:cNvPr id="74" name="Rounded Rectangle 73"/>
+          <p:cNvPr id="17" name="Trapezoid 16"/>
           <p:cNvSpPr/>
           <p:nvPr/>
         </p:nvSpPr>
         <p:spPr>
-          <a:xfrm>
-            <a:off x="4096678" y="2960687"/>
-            <a:ext cx="756000" cy="612000"/>
-          </a:xfrm>
-          <a:prstGeom prst="roundRect">
-            <a:avLst>
-              <a:gd name="adj" fmla="val 7326"/>
-            </a:avLst>
-          </a:prstGeom>
-          <a:solidFill>
-            <a:schemeClr val="bg1">
-              <a:lumMod val="65000"/>
-            </a:schemeClr>
-          </a:solidFill>
-          <a:ln w="50800">
-            <a:noFill/>
-          </a:ln>
-        </p:spPr>
-        <p:style>
-          <a:lnRef idx="2">
-            <a:schemeClr val="accent1">
-              <a:shade val="50000"/>
-            </a:schemeClr>
-          </a:lnRef>
-          <a:fillRef idx="1">
-            <a:schemeClr val="accent1"/>
-          </a:fillRef>
-          <a:effectRef idx="0">
-            <a:schemeClr val="accent1"/>
-          </a:effectRef>
-          <a:fontRef idx="minor">
-            <a:schemeClr val="lt1"/>
-          </a:fontRef>
-        </p:style>
-        <p:txBody>
-          <a:bodyPr rtlCol="0" anchor="ctr"/>
-          <a:lstStyle/>
-          <a:p>
-            <a:pPr algn="ctr"/>
-            <a:endParaRPr lang="zh-TW" altLang="en-US"/>
-          </a:p>
-        </p:txBody>
-      </p:sp>
-      <p:sp>
-        <p:nvSpPr>
-          <p:cNvPr id="75" name="Trapezoid 74"/>
-          <p:cNvSpPr/>
-          <p:nvPr/>
-        </p:nvSpPr>
-        <p:spPr>
           <a:xfrm rot="16200000">
-            <a:off x="4642189" y="3158686"/>
-            <a:ext cx="612000" cy="216000"/>
+            <a:off x="4594434" y="3146931"/>
+            <a:ext cx="684000" cy="239511"/>
           </a:xfrm>
           <a:prstGeom prst="trapezoid">
             <a:avLst>
@@ -3900,6 +3851,56 @@
           <a:ln w="50800">
             <a:noFill/>
             <a:miter lim="800000"/>
+          </a:ln>
+        </p:spPr>
+        <p:style>
+          <a:lnRef idx="2">
+            <a:schemeClr val="accent1">
+              <a:shade val="50000"/>
+            </a:schemeClr>
+          </a:lnRef>
+          <a:fillRef idx="1">
+            <a:schemeClr val="accent1"/>
+          </a:fillRef>
+          <a:effectRef idx="0">
+            <a:schemeClr val="accent1"/>
+          </a:effectRef>
+          <a:fontRef idx="minor">
+            <a:schemeClr val="lt1"/>
+          </a:fontRef>
+        </p:style>
+        <p:txBody>
+          <a:bodyPr rtlCol="0" anchor="ctr"/>
+          <a:lstStyle/>
+          <a:p>
+            <a:pPr algn="ctr"/>
+            <a:endParaRPr lang="zh-TW" altLang="en-US"/>
+          </a:p>
+        </p:txBody>
+      </p:sp>
+      <p:sp>
+        <p:nvSpPr>
+          <p:cNvPr id="18" name="Rounded Rectangle 17"/>
+          <p:cNvSpPr/>
+          <p:nvPr/>
+        </p:nvSpPr>
+        <p:spPr>
+          <a:xfrm>
+            <a:off x="4096678" y="2978687"/>
+            <a:ext cx="720000" cy="576000"/>
+          </a:xfrm>
+          <a:prstGeom prst="roundRect">
+            <a:avLst>
+              <a:gd name="adj" fmla="val 7326"/>
+            </a:avLst>
+          </a:prstGeom>
+          <a:solidFill>
+            <a:schemeClr val="bg1">
+              <a:lumMod val="65000"/>
+            </a:schemeClr>
+          </a:solidFill>
+          <a:ln w="50800">
+            <a:noFill/>
           </a:ln>
         </p:spPr>
         <p:style>
@@ -4249,64 +4250,14 @@
       </p:grpSpPr>
       <p:sp>
         <p:nvSpPr>
-          <p:cNvPr id="74" name="Rounded Rectangle 73"/>
+          <p:cNvPr id="14" name="Trapezoid 13"/>
           <p:cNvSpPr/>
           <p:nvPr/>
         </p:nvSpPr>
         <p:spPr>
-          <a:xfrm>
-            <a:off x="4096678" y="2960687"/>
-            <a:ext cx="756000" cy="612000"/>
-          </a:xfrm>
-          <a:prstGeom prst="roundRect">
-            <a:avLst>
-              <a:gd name="adj" fmla="val 7326"/>
-            </a:avLst>
-          </a:prstGeom>
-          <a:solidFill>
-            <a:schemeClr val="bg1">
-              <a:lumMod val="65000"/>
-            </a:schemeClr>
-          </a:solidFill>
-          <a:ln w="50800">
-            <a:noFill/>
-          </a:ln>
-        </p:spPr>
-        <p:style>
-          <a:lnRef idx="2">
-            <a:schemeClr val="accent1">
-              <a:shade val="50000"/>
-            </a:schemeClr>
-          </a:lnRef>
-          <a:fillRef idx="1">
-            <a:schemeClr val="accent1"/>
-          </a:fillRef>
-          <a:effectRef idx="0">
-            <a:schemeClr val="accent1"/>
-          </a:effectRef>
-          <a:fontRef idx="minor">
-            <a:schemeClr val="lt1"/>
-          </a:fontRef>
-        </p:style>
-        <p:txBody>
-          <a:bodyPr rtlCol="0" anchor="ctr"/>
-          <a:lstStyle/>
-          <a:p>
-            <a:pPr algn="ctr"/>
-            <a:endParaRPr lang="zh-TW" altLang="en-US"/>
-          </a:p>
-        </p:txBody>
-      </p:sp>
-      <p:sp>
-        <p:nvSpPr>
-          <p:cNvPr id="75" name="Trapezoid 74"/>
-          <p:cNvSpPr/>
-          <p:nvPr/>
-        </p:nvSpPr>
-        <p:spPr>
           <a:xfrm rot="16200000">
-            <a:off x="4642189" y="3158686"/>
-            <a:ext cx="612000" cy="216000"/>
+            <a:off x="4594434" y="3146931"/>
+            <a:ext cx="684000" cy="239511"/>
           </a:xfrm>
           <a:prstGeom prst="trapezoid">
             <a:avLst>
@@ -4321,6 +4272,56 @@
           <a:ln w="50800">
             <a:noFill/>
             <a:miter lim="800000"/>
+          </a:ln>
+        </p:spPr>
+        <p:style>
+          <a:lnRef idx="2">
+            <a:schemeClr val="accent1">
+              <a:shade val="50000"/>
+            </a:schemeClr>
+          </a:lnRef>
+          <a:fillRef idx="1">
+            <a:schemeClr val="accent1"/>
+          </a:fillRef>
+          <a:effectRef idx="0">
+            <a:schemeClr val="accent1"/>
+          </a:effectRef>
+          <a:fontRef idx="minor">
+            <a:schemeClr val="lt1"/>
+          </a:fontRef>
+        </p:style>
+        <p:txBody>
+          <a:bodyPr rtlCol="0" anchor="ctr"/>
+          <a:lstStyle/>
+          <a:p>
+            <a:pPr algn="ctr"/>
+            <a:endParaRPr lang="zh-TW" altLang="en-US"/>
+          </a:p>
+        </p:txBody>
+      </p:sp>
+      <p:sp>
+        <p:nvSpPr>
+          <p:cNvPr id="15" name="Rounded Rectangle 14"/>
+          <p:cNvSpPr/>
+          <p:nvPr/>
+        </p:nvSpPr>
+        <p:spPr>
+          <a:xfrm>
+            <a:off x="4096678" y="2978687"/>
+            <a:ext cx="720000" cy="576000"/>
+          </a:xfrm>
+          <a:prstGeom prst="roundRect">
+            <a:avLst>
+              <a:gd name="adj" fmla="val 7326"/>
+            </a:avLst>
+          </a:prstGeom>
+          <a:solidFill>
+            <a:schemeClr val="bg1">
+              <a:lumMod val="65000"/>
+            </a:schemeClr>
+          </a:solidFill>
+          <a:ln w="50800">
+            <a:noFill/>
           </a:ln>
         </p:spPr>
         <p:style>
@@ -4670,64 +4671,14 @@
       </p:grpSpPr>
       <p:sp>
         <p:nvSpPr>
-          <p:cNvPr id="74" name="Rounded Rectangle 73"/>
+          <p:cNvPr id="17" name="Trapezoid 16"/>
           <p:cNvSpPr/>
           <p:nvPr/>
         </p:nvSpPr>
         <p:spPr>
-          <a:xfrm>
-            <a:off x="4096678" y="2960687"/>
-            <a:ext cx="756000" cy="612000"/>
-          </a:xfrm>
-          <a:prstGeom prst="roundRect">
-            <a:avLst>
-              <a:gd name="adj" fmla="val 7326"/>
-            </a:avLst>
-          </a:prstGeom>
-          <a:solidFill>
-            <a:schemeClr val="bg1">
-              <a:lumMod val="65000"/>
-            </a:schemeClr>
-          </a:solidFill>
-          <a:ln w="50800">
-            <a:noFill/>
-          </a:ln>
-        </p:spPr>
-        <p:style>
-          <a:lnRef idx="2">
-            <a:schemeClr val="accent1">
-              <a:shade val="50000"/>
-            </a:schemeClr>
-          </a:lnRef>
-          <a:fillRef idx="1">
-            <a:schemeClr val="accent1"/>
-          </a:fillRef>
-          <a:effectRef idx="0">
-            <a:schemeClr val="accent1"/>
-          </a:effectRef>
-          <a:fontRef idx="minor">
-            <a:schemeClr val="lt1"/>
-          </a:fontRef>
-        </p:style>
-        <p:txBody>
-          <a:bodyPr rtlCol="0" anchor="ctr"/>
-          <a:lstStyle/>
-          <a:p>
-            <a:pPr algn="ctr"/>
-            <a:endParaRPr lang="zh-TW" altLang="en-US"/>
-          </a:p>
-        </p:txBody>
-      </p:sp>
-      <p:sp>
-        <p:nvSpPr>
-          <p:cNvPr id="75" name="Trapezoid 74"/>
-          <p:cNvSpPr/>
-          <p:nvPr/>
-        </p:nvSpPr>
-        <p:spPr>
           <a:xfrm rot="16200000">
-            <a:off x="4642189" y="3158686"/>
-            <a:ext cx="612000" cy="216000"/>
+            <a:off x="4594434" y="3146931"/>
+            <a:ext cx="684000" cy="239511"/>
           </a:xfrm>
           <a:prstGeom prst="trapezoid">
             <a:avLst>
@@ -4742,6 +4693,56 @@
           <a:ln w="50800">
             <a:noFill/>
             <a:miter lim="800000"/>
+          </a:ln>
+        </p:spPr>
+        <p:style>
+          <a:lnRef idx="2">
+            <a:schemeClr val="accent1">
+              <a:shade val="50000"/>
+            </a:schemeClr>
+          </a:lnRef>
+          <a:fillRef idx="1">
+            <a:schemeClr val="accent1"/>
+          </a:fillRef>
+          <a:effectRef idx="0">
+            <a:schemeClr val="accent1"/>
+          </a:effectRef>
+          <a:fontRef idx="minor">
+            <a:schemeClr val="lt1"/>
+          </a:fontRef>
+        </p:style>
+        <p:txBody>
+          <a:bodyPr rtlCol="0" anchor="ctr"/>
+          <a:lstStyle/>
+          <a:p>
+            <a:pPr algn="ctr"/>
+            <a:endParaRPr lang="zh-TW" altLang="en-US"/>
+          </a:p>
+        </p:txBody>
+      </p:sp>
+      <p:sp>
+        <p:nvSpPr>
+          <p:cNvPr id="18" name="Rounded Rectangle 17"/>
+          <p:cNvSpPr/>
+          <p:nvPr/>
+        </p:nvSpPr>
+        <p:spPr>
+          <a:xfrm>
+            <a:off x="4096678" y="2978687"/>
+            <a:ext cx="720000" cy="576000"/>
+          </a:xfrm>
+          <a:prstGeom prst="roundRect">
+            <a:avLst>
+              <a:gd name="adj" fmla="val 7326"/>
+            </a:avLst>
+          </a:prstGeom>
+          <a:solidFill>
+            <a:schemeClr val="bg1">
+              <a:lumMod val="65000"/>
+            </a:schemeClr>
+          </a:solidFill>
+          <a:ln w="50800">
+            <a:noFill/>
           </a:ln>
         </p:spPr>
         <p:style>
@@ -5091,64 +5092,14 @@
       </p:grpSpPr>
       <p:sp>
         <p:nvSpPr>
-          <p:cNvPr id="74" name="Rounded Rectangle 73"/>
+          <p:cNvPr id="14" name="Trapezoid 13"/>
           <p:cNvSpPr/>
           <p:nvPr/>
         </p:nvSpPr>
         <p:spPr>
-          <a:xfrm>
-            <a:off x="4096678" y="2960687"/>
-            <a:ext cx="756000" cy="612000"/>
-          </a:xfrm>
-          <a:prstGeom prst="roundRect">
-            <a:avLst>
-              <a:gd name="adj" fmla="val 7326"/>
-            </a:avLst>
-          </a:prstGeom>
-          <a:solidFill>
-            <a:schemeClr val="bg1">
-              <a:lumMod val="65000"/>
-            </a:schemeClr>
-          </a:solidFill>
-          <a:ln w="50800">
-            <a:noFill/>
-          </a:ln>
-        </p:spPr>
-        <p:style>
-          <a:lnRef idx="2">
-            <a:schemeClr val="accent1">
-              <a:shade val="50000"/>
-            </a:schemeClr>
-          </a:lnRef>
-          <a:fillRef idx="1">
-            <a:schemeClr val="accent1"/>
-          </a:fillRef>
-          <a:effectRef idx="0">
-            <a:schemeClr val="accent1"/>
-          </a:effectRef>
-          <a:fontRef idx="minor">
-            <a:schemeClr val="lt1"/>
-          </a:fontRef>
-        </p:style>
-        <p:txBody>
-          <a:bodyPr rtlCol="0" anchor="ctr"/>
-          <a:lstStyle/>
-          <a:p>
-            <a:pPr algn="ctr"/>
-            <a:endParaRPr lang="zh-TW" altLang="en-US"/>
-          </a:p>
-        </p:txBody>
-      </p:sp>
-      <p:sp>
-        <p:nvSpPr>
-          <p:cNvPr id="75" name="Trapezoid 74"/>
-          <p:cNvSpPr/>
-          <p:nvPr/>
-        </p:nvSpPr>
-        <p:spPr>
           <a:xfrm rot="16200000">
-            <a:off x="4642189" y="3158686"/>
-            <a:ext cx="612000" cy="216000"/>
+            <a:off x="4594434" y="3146931"/>
+            <a:ext cx="684000" cy="239511"/>
           </a:xfrm>
           <a:prstGeom prst="trapezoid">
             <a:avLst>
@@ -5163,6 +5114,56 @@
           <a:ln w="50800">
             <a:noFill/>
             <a:miter lim="800000"/>
+          </a:ln>
+        </p:spPr>
+        <p:style>
+          <a:lnRef idx="2">
+            <a:schemeClr val="accent1">
+              <a:shade val="50000"/>
+            </a:schemeClr>
+          </a:lnRef>
+          <a:fillRef idx="1">
+            <a:schemeClr val="accent1"/>
+          </a:fillRef>
+          <a:effectRef idx="0">
+            <a:schemeClr val="accent1"/>
+          </a:effectRef>
+          <a:fontRef idx="minor">
+            <a:schemeClr val="lt1"/>
+          </a:fontRef>
+        </p:style>
+        <p:txBody>
+          <a:bodyPr rtlCol="0" anchor="ctr"/>
+          <a:lstStyle/>
+          <a:p>
+            <a:pPr algn="ctr"/>
+            <a:endParaRPr lang="zh-TW" altLang="en-US"/>
+          </a:p>
+        </p:txBody>
+      </p:sp>
+      <p:sp>
+        <p:nvSpPr>
+          <p:cNvPr id="15" name="Rounded Rectangle 14"/>
+          <p:cNvSpPr/>
+          <p:nvPr/>
+        </p:nvSpPr>
+        <p:spPr>
+          <a:xfrm>
+            <a:off x="4096678" y="2978687"/>
+            <a:ext cx="720000" cy="576000"/>
+          </a:xfrm>
+          <a:prstGeom prst="roundRect">
+            <a:avLst>
+              <a:gd name="adj" fmla="val 7326"/>
+            </a:avLst>
+          </a:prstGeom>
+          <a:solidFill>
+            <a:schemeClr val="bg1">
+              <a:lumMod val="65000"/>
+            </a:schemeClr>
+          </a:solidFill>
+          <a:ln w="50800">
+            <a:noFill/>
           </a:ln>
         </p:spPr>
         <p:style>
@@ -6341,6 +6342,586 @@
           </a:p>
         </p:txBody>
       </p:sp>
+      <p:sp>
+        <p:nvSpPr>
+          <p:cNvPr id="3" name="Rectangle 2"/>
+          <p:cNvSpPr/>
+          <p:nvPr/>
+        </p:nvSpPr>
+        <p:spPr>
+          <a:xfrm>
+            <a:off x="4086000" y="2925000"/>
+            <a:ext cx="972000" cy="1008000"/>
+          </a:xfrm>
+          <a:prstGeom prst="rect">
+            <a:avLst/>
+          </a:prstGeom>
+          <a:noFill/>
+          <a:ln w="50800">
+            <a:solidFill>
+              <a:schemeClr val="tx1">
+                <a:lumMod val="50000"/>
+                <a:lumOff val="50000"/>
+              </a:schemeClr>
+            </a:solidFill>
+            <a:miter lim="800000"/>
+          </a:ln>
+        </p:spPr>
+        <p:style>
+          <a:lnRef idx="2">
+            <a:schemeClr val="accent1">
+              <a:shade val="50000"/>
+            </a:schemeClr>
+          </a:lnRef>
+          <a:fillRef idx="1">
+            <a:schemeClr val="accent1"/>
+          </a:fillRef>
+          <a:effectRef idx="0">
+            <a:schemeClr val="accent1"/>
+          </a:effectRef>
+          <a:fontRef idx="minor">
+            <a:schemeClr val="lt1"/>
+          </a:fontRef>
+        </p:style>
+        <p:txBody>
+          <a:bodyPr rtlCol="0" anchor="ctr"/>
+          <a:lstStyle/>
+          <a:p>
+            <a:pPr algn="ctr"/>
+            <a:endParaRPr lang="zh-TW" altLang="en-US"/>
+          </a:p>
+        </p:txBody>
+      </p:sp>
+      <p:cxnSp>
+        <p:nvCxnSpPr>
+          <p:cNvPr id="4" name="Straight Connector 3"/>
+          <p:cNvCxnSpPr/>
+          <p:nvPr/>
+        </p:nvCxnSpPr>
+        <p:spPr>
+          <a:xfrm flipV="1">
+            <a:off x="4098132" y="3126581"/>
+            <a:ext cx="264318" cy="91728"/>
+          </a:xfrm>
+          <a:prstGeom prst="line">
+            <a:avLst/>
+          </a:prstGeom>
+          <a:ln w="50800" cap="rnd">
+            <a:solidFill>
+              <a:schemeClr val="tx1">
+                <a:lumMod val="50000"/>
+                <a:lumOff val="50000"/>
+              </a:schemeClr>
+            </a:solidFill>
+          </a:ln>
+        </p:spPr>
+        <p:style>
+          <a:lnRef idx="1">
+            <a:schemeClr val="accent1"/>
+          </a:lnRef>
+          <a:fillRef idx="0">
+            <a:schemeClr val="accent1"/>
+          </a:fillRef>
+          <a:effectRef idx="0">
+            <a:schemeClr val="accent1"/>
+          </a:effectRef>
+          <a:fontRef idx="minor">
+            <a:schemeClr val="tx1"/>
+          </a:fontRef>
+        </p:style>
+      </p:cxnSp>
+      <p:cxnSp>
+        <p:nvCxnSpPr>
+          <p:cNvPr id="8" name="Straight Connector 7"/>
+          <p:cNvCxnSpPr/>
+          <p:nvPr/>
+        </p:nvCxnSpPr>
+        <p:spPr>
+          <a:xfrm flipV="1">
+            <a:off x="4379119" y="2921795"/>
+            <a:ext cx="45244" cy="197643"/>
+          </a:xfrm>
+          <a:prstGeom prst="line">
+            <a:avLst/>
+          </a:prstGeom>
+          <a:ln w="50800" cap="rnd">
+            <a:solidFill>
+              <a:schemeClr val="tx1">
+                <a:lumMod val="50000"/>
+                <a:lumOff val="50000"/>
+              </a:schemeClr>
+            </a:solidFill>
+          </a:ln>
+        </p:spPr>
+        <p:style>
+          <a:lnRef idx="1">
+            <a:schemeClr val="accent1"/>
+          </a:lnRef>
+          <a:fillRef idx="0">
+            <a:schemeClr val="accent1"/>
+          </a:fillRef>
+          <a:effectRef idx="0">
+            <a:schemeClr val="accent1"/>
+          </a:effectRef>
+          <a:fontRef idx="minor">
+            <a:schemeClr val="tx1"/>
+          </a:fontRef>
+        </p:style>
+      </p:cxnSp>
+      <p:cxnSp>
+        <p:nvCxnSpPr>
+          <p:cNvPr id="10" name="Straight Connector 9"/>
+          <p:cNvCxnSpPr/>
+          <p:nvPr/>
+        </p:nvCxnSpPr>
+        <p:spPr>
+          <a:xfrm>
+            <a:off x="4364831" y="3126581"/>
+            <a:ext cx="388144" cy="76200"/>
+          </a:xfrm>
+          <a:prstGeom prst="line">
+            <a:avLst/>
+          </a:prstGeom>
+          <a:ln w="50800" cap="rnd">
+            <a:solidFill>
+              <a:schemeClr val="tx1">
+                <a:lumMod val="50000"/>
+                <a:lumOff val="50000"/>
+              </a:schemeClr>
+            </a:solidFill>
+          </a:ln>
+        </p:spPr>
+        <p:style>
+          <a:lnRef idx="1">
+            <a:schemeClr val="accent1"/>
+          </a:lnRef>
+          <a:fillRef idx="0">
+            <a:schemeClr val="accent1"/>
+          </a:fillRef>
+          <a:effectRef idx="0">
+            <a:schemeClr val="accent1"/>
+          </a:effectRef>
+          <a:fontRef idx="minor">
+            <a:schemeClr val="tx1"/>
+          </a:fontRef>
+        </p:style>
+      </p:cxnSp>
+      <p:cxnSp>
+        <p:nvCxnSpPr>
+          <p:cNvPr id="13" name="Straight Connector 12"/>
+          <p:cNvCxnSpPr/>
+          <p:nvPr/>
+        </p:nvCxnSpPr>
+        <p:spPr>
+          <a:xfrm>
+            <a:off x="4743450" y="3202781"/>
+            <a:ext cx="307181" cy="2383"/>
+          </a:xfrm>
+          <a:prstGeom prst="line">
+            <a:avLst/>
+          </a:prstGeom>
+          <a:ln w="50800" cap="rnd">
+            <a:solidFill>
+              <a:schemeClr val="tx1">
+                <a:lumMod val="50000"/>
+                <a:lumOff val="50000"/>
+              </a:schemeClr>
+            </a:solidFill>
+          </a:ln>
+        </p:spPr>
+        <p:style>
+          <a:lnRef idx="1">
+            <a:schemeClr val="accent1"/>
+          </a:lnRef>
+          <a:fillRef idx="0">
+            <a:schemeClr val="accent1"/>
+          </a:fillRef>
+          <a:effectRef idx="0">
+            <a:schemeClr val="accent1"/>
+          </a:effectRef>
+          <a:fontRef idx="minor">
+            <a:schemeClr val="tx1"/>
+          </a:fontRef>
+        </p:style>
+      </p:cxnSp>
+      <p:cxnSp>
+        <p:nvCxnSpPr>
+          <p:cNvPr id="18" name="Straight Connector 17"/>
+          <p:cNvCxnSpPr/>
+          <p:nvPr/>
+        </p:nvCxnSpPr>
+        <p:spPr>
+          <a:xfrm>
+            <a:off x="4789549" y="3522911"/>
+            <a:ext cx="249176" cy="53727"/>
+          </a:xfrm>
+          <a:prstGeom prst="line">
+            <a:avLst/>
+          </a:prstGeom>
+          <a:ln w="50800" cap="rnd">
+            <a:solidFill>
+              <a:schemeClr val="tx1">
+                <a:lumMod val="50000"/>
+                <a:lumOff val="50000"/>
+              </a:schemeClr>
+            </a:solidFill>
+          </a:ln>
+        </p:spPr>
+        <p:style>
+          <a:lnRef idx="1">
+            <a:schemeClr val="accent1"/>
+          </a:lnRef>
+          <a:fillRef idx="0">
+            <a:schemeClr val="accent1"/>
+          </a:fillRef>
+          <a:effectRef idx="0">
+            <a:schemeClr val="accent1"/>
+          </a:effectRef>
+          <a:fontRef idx="minor">
+            <a:schemeClr val="tx1"/>
+          </a:fontRef>
+        </p:style>
+      </p:cxnSp>
+      <p:cxnSp>
+        <p:nvCxnSpPr>
+          <p:cNvPr id="21" name="Straight Connector 20"/>
+          <p:cNvCxnSpPr/>
+          <p:nvPr/>
+        </p:nvCxnSpPr>
+        <p:spPr>
+          <a:xfrm flipV="1">
+            <a:off x="4733925" y="2926557"/>
+            <a:ext cx="48815" cy="269081"/>
+          </a:xfrm>
+          <a:prstGeom prst="line">
+            <a:avLst/>
+          </a:prstGeom>
+          <a:ln w="50800" cap="rnd">
+            <a:solidFill>
+              <a:schemeClr val="tx1">
+                <a:lumMod val="50000"/>
+                <a:lumOff val="50000"/>
+              </a:schemeClr>
+            </a:solidFill>
+          </a:ln>
+        </p:spPr>
+        <p:style>
+          <a:lnRef idx="1">
+            <a:schemeClr val="accent1"/>
+          </a:lnRef>
+          <a:fillRef idx="0">
+            <a:schemeClr val="accent1"/>
+          </a:fillRef>
+          <a:effectRef idx="0">
+            <a:schemeClr val="accent1"/>
+          </a:effectRef>
+          <a:fontRef idx="minor">
+            <a:schemeClr val="tx1"/>
+          </a:fontRef>
+        </p:style>
+      </p:cxnSp>
+      <p:cxnSp>
+        <p:nvCxnSpPr>
+          <p:cNvPr id="24" name="Straight Connector 23"/>
+          <p:cNvCxnSpPr/>
+          <p:nvPr/>
+        </p:nvCxnSpPr>
+        <p:spPr>
+          <a:xfrm flipH="1" flipV="1">
+            <a:off x="4740213" y="3208015"/>
+            <a:ext cx="55625" cy="311473"/>
+          </a:xfrm>
+          <a:prstGeom prst="line">
+            <a:avLst/>
+          </a:prstGeom>
+          <a:ln w="50800" cap="rnd">
+            <a:solidFill>
+              <a:schemeClr val="tx1">
+                <a:lumMod val="50000"/>
+                <a:lumOff val="50000"/>
+              </a:schemeClr>
+            </a:solidFill>
+          </a:ln>
+        </p:spPr>
+        <p:style>
+          <a:lnRef idx="1">
+            <a:schemeClr val="accent1"/>
+          </a:lnRef>
+          <a:fillRef idx="0">
+            <a:schemeClr val="accent1"/>
+          </a:fillRef>
+          <a:effectRef idx="0">
+            <a:schemeClr val="accent1"/>
+          </a:effectRef>
+          <a:fontRef idx="minor">
+            <a:schemeClr val="tx1"/>
+          </a:fontRef>
+        </p:style>
+      </p:cxnSp>
+      <p:cxnSp>
+        <p:nvCxnSpPr>
+          <p:cNvPr id="26" name="Straight Connector 25"/>
+          <p:cNvCxnSpPr/>
+          <p:nvPr/>
+        </p:nvCxnSpPr>
+        <p:spPr>
+          <a:xfrm flipH="1" flipV="1">
+            <a:off x="4794982" y="3522340"/>
+            <a:ext cx="15143" cy="387673"/>
+          </a:xfrm>
+          <a:prstGeom prst="line">
+            <a:avLst/>
+          </a:prstGeom>
+          <a:ln w="50800" cap="rnd">
+            <a:solidFill>
+              <a:schemeClr val="tx1">
+                <a:lumMod val="50000"/>
+                <a:lumOff val="50000"/>
+              </a:schemeClr>
+            </a:solidFill>
+          </a:ln>
+        </p:spPr>
+        <p:style>
+          <a:lnRef idx="1">
+            <a:schemeClr val="accent1"/>
+          </a:lnRef>
+          <a:fillRef idx="0">
+            <a:schemeClr val="accent1"/>
+          </a:fillRef>
+          <a:effectRef idx="0">
+            <a:schemeClr val="accent1"/>
+          </a:effectRef>
+          <a:fontRef idx="minor">
+            <a:schemeClr val="tx1"/>
+          </a:fontRef>
+        </p:style>
+      </p:cxnSp>
+      <p:cxnSp>
+        <p:nvCxnSpPr>
+          <p:cNvPr id="30" name="Straight Connector 29"/>
+          <p:cNvCxnSpPr/>
+          <p:nvPr/>
+        </p:nvCxnSpPr>
+        <p:spPr>
+          <a:xfrm flipH="1" flipV="1">
+            <a:off x="4381500" y="3145631"/>
+            <a:ext cx="64294" cy="466725"/>
+          </a:xfrm>
+          <a:prstGeom prst="line">
+            <a:avLst/>
+          </a:prstGeom>
+          <a:ln w="50800" cap="rnd">
+            <a:solidFill>
+              <a:schemeClr val="tx1">
+                <a:lumMod val="50000"/>
+                <a:lumOff val="50000"/>
+              </a:schemeClr>
+            </a:solidFill>
+          </a:ln>
+        </p:spPr>
+        <p:style>
+          <a:lnRef idx="1">
+            <a:schemeClr val="accent1"/>
+          </a:lnRef>
+          <a:fillRef idx="0">
+            <a:schemeClr val="accent1"/>
+          </a:fillRef>
+          <a:effectRef idx="0">
+            <a:schemeClr val="accent1"/>
+          </a:effectRef>
+          <a:fontRef idx="minor">
+            <a:schemeClr val="tx1"/>
+          </a:fontRef>
+        </p:style>
+      </p:cxnSp>
+      <p:cxnSp>
+        <p:nvCxnSpPr>
+          <p:cNvPr id="33" name="Straight Connector 32"/>
+          <p:cNvCxnSpPr/>
+          <p:nvPr/>
+        </p:nvCxnSpPr>
+        <p:spPr>
+          <a:xfrm flipV="1">
+            <a:off x="4448175" y="3534247"/>
+            <a:ext cx="334900" cy="85253"/>
+          </a:xfrm>
+          <a:prstGeom prst="line">
+            <a:avLst/>
+          </a:prstGeom>
+          <a:ln w="50800" cap="rnd">
+            <a:solidFill>
+              <a:schemeClr val="tx1">
+                <a:lumMod val="50000"/>
+                <a:lumOff val="50000"/>
+              </a:schemeClr>
+            </a:solidFill>
+          </a:ln>
+        </p:spPr>
+        <p:style>
+          <a:lnRef idx="1">
+            <a:schemeClr val="accent1"/>
+          </a:lnRef>
+          <a:fillRef idx="0">
+            <a:schemeClr val="accent1"/>
+          </a:fillRef>
+          <a:effectRef idx="0">
+            <a:schemeClr val="accent1"/>
+          </a:effectRef>
+          <a:fontRef idx="minor">
+            <a:schemeClr val="tx1"/>
+          </a:fontRef>
+        </p:style>
+      </p:cxnSp>
+      <p:cxnSp>
+        <p:nvCxnSpPr>
+          <p:cNvPr id="35" name="Straight Connector 34"/>
+          <p:cNvCxnSpPr/>
+          <p:nvPr/>
+        </p:nvCxnSpPr>
+        <p:spPr>
+          <a:xfrm>
+            <a:off x="4090988" y="3564731"/>
+            <a:ext cx="359568" cy="52389"/>
+          </a:xfrm>
+          <a:prstGeom prst="line">
+            <a:avLst/>
+          </a:prstGeom>
+          <a:ln w="50800" cap="rnd">
+            <a:solidFill>
+              <a:schemeClr val="tx1">
+                <a:lumMod val="50000"/>
+                <a:lumOff val="50000"/>
+              </a:schemeClr>
+            </a:solidFill>
+          </a:ln>
+        </p:spPr>
+        <p:style>
+          <a:lnRef idx="1">
+            <a:schemeClr val="accent1"/>
+          </a:lnRef>
+          <a:fillRef idx="0">
+            <a:schemeClr val="accent1"/>
+          </a:fillRef>
+          <a:effectRef idx="0">
+            <a:schemeClr val="accent1"/>
+          </a:effectRef>
+          <a:fontRef idx="minor">
+            <a:schemeClr val="tx1"/>
+          </a:fontRef>
+        </p:style>
+      </p:cxnSp>
+      <p:cxnSp>
+        <p:nvCxnSpPr>
+          <p:cNvPr id="38" name="Straight Connector 37"/>
+          <p:cNvCxnSpPr/>
+          <p:nvPr/>
+        </p:nvCxnSpPr>
+        <p:spPr>
+          <a:xfrm flipV="1">
+            <a:off x="4400550" y="3612357"/>
+            <a:ext cx="54769" cy="311943"/>
+          </a:xfrm>
+          <a:prstGeom prst="line">
+            <a:avLst/>
+          </a:prstGeom>
+          <a:ln w="50800" cap="rnd">
+            <a:solidFill>
+              <a:schemeClr val="tx1">
+                <a:lumMod val="50000"/>
+                <a:lumOff val="50000"/>
+              </a:schemeClr>
+            </a:solidFill>
+          </a:ln>
+        </p:spPr>
+        <p:style>
+          <a:lnRef idx="1">
+            <a:schemeClr val="accent1"/>
+          </a:lnRef>
+          <a:fillRef idx="0">
+            <a:schemeClr val="accent1"/>
+          </a:fillRef>
+          <a:effectRef idx="0">
+            <a:schemeClr val="accent1"/>
+          </a:effectRef>
+          <a:fontRef idx="minor">
+            <a:schemeClr val="tx1"/>
+          </a:fontRef>
+        </p:style>
+      </p:cxnSp>
+    </p:spTree>
+    <p:extLst>
+      <p:ext uri="{BB962C8B-B14F-4D97-AF65-F5344CB8AC3E}">
+        <p14:creationId xmlns:p14="http://schemas.microsoft.com/office/powerpoint/2010/main" val="634124469"/>
+      </p:ext>
+    </p:extLst>
+  </p:cSld>
+  <p:clrMapOvr>
+    <a:masterClrMapping/>
+  </p:clrMapOvr>
+</p:sld>
+</file>
+
+<file path=ppt/slides/slide18.xml><?xml version="1.0" encoding="utf-8"?>
+<p:sld xmlns:a="http://schemas.openxmlformats.org/drawingml/2006/main" xmlns:r="http://schemas.openxmlformats.org/officeDocument/2006/relationships" xmlns:p="http://schemas.openxmlformats.org/presentationml/2006/main">
+  <p:cSld>
+    <p:spTree>
+      <p:nvGrpSpPr>
+        <p:cNvPr id="1" name=""/>
+        <p:cNvGrpSpPr/>
+        <p:nvPr/>
+      </p:nvGrpSpPr>
+      <p:grpSpPr>
+        <a:xfrm>
+          <a:off x="0" y="0"/>
+          <a:ext cx="0" cy="0"/>
+          <a:chOff x="0" y="0"/>
+          <a:chExt cx="0" cy="0"/>
+        </a:xfrm>
+      </p:grpSpPr>
+      <p:sp>
+        <p:nvSpPr>
+          <p:cNvPr id="2" name="Rectangle 1"/>
+          <p:cNvSpPr/>
+          <p:nvPr/>
+        </p:nvSpPr>
+        <p:spPr>
+          <a:xfrm>
+            <a:off x="4032000" y="2889000"/>
+            <a:ext cx="1080000" cy="1080000"/>
+          </a:xfrm>
+          <a:prstGeom prst="rect">
+            <a:avLst/>
+          </a:prstGeom>
+          <a:noFill/>
+          <a:ln w="6350">
+            <a:noFill/>
+          </a:ln>
+        </p:spPr>
+        <p:style>
+          <a:lnRef idx="2">
+            <a:schemeClr val="accent1">
+              <a:shade val="50000"/>
+            </a:schemeClr>
+          </a:lnRef>
+          <a:fillRef idx="1">
+            <a:schemeClr val="accent1"/>
+          </a:fillRef>
+          <a:effectRef idx="0">
+            <a:schemeClr val="accent1"/>
+          </a:effectRef>
+          <a:fontRef idx="minor">
+            <a:schemeClr val="lt1"/>
+          </a:fontRef>
+        </p:style>
+        <p:txBody>
+          <a:bodyPr rtlCol="0" anchor="ctr"/>
+          <a:lstStyle/>
+          <a:p>
+            <a:pPr algn="ctr"/>
+            <a:endParaRPr lang="zh-TW" altLang="en-US"/>
+          </a:p>
+        </p:txBody>
+      </p:sp>
       <p:cxnSp>
         <p:nvCxnSpPr>
           <p:cNvPr id="4" name="Straight Connector 3"/>
@@ -6553,7 +7134,7 @@
 </p:sld>
 </file>
 
-<file path=ppt/slides/slide18.xml><?xml version="1.0" encoding="utf-8"?>
+<file path=ppt/slides/slide19.xml><?xml version="1.0" encoding="utf-8"?>
 <p:sld xmlns:a="http://schemas.openxmlformats.org/drawingml/2006/main" xmlns:r="http://schemas.openxmlformats.org/officeDocument/2006/relationships" xmlns:p="http://schemas.openxmlformats.org/presentationml/2006/main">
   <p:cSld>
     <p:spTree>
@@ -6651,7 +7232,127 @@
 </p:sld>
 </file>
 
-<file path=ppt/slides/slide19.xml><?xml version="1.0" encoding="utf-8"?>
+<file path=ppt/slides/slide2.xml><?xml version="1.0" encoding="utf-8"?>
+<p:sld xmlns:a="http://schemas.openxmlformats.org/drawingml/2006/main" xmlns:r="http://schemas.openxmlformats.org/officeDocument/2006/relationships" xmlns:p="http://schemas.openxmlformats.org/presentationml/2006/main">
+  <p:cSld>
+    <p:spTree>
+      <p:nvGrpSpPr>
+        <p:cNvPr id="1" name=""/>
+        <p:cNvGrpSpPr/>
+        <p:nvPr/>
+      </p:nvGrpSpPr>
+      <p:grpSpPr>
+        <a:xfrm>
+          <a:off x="0" y="0"/>
+          <a:ext cx="0" cy="0"/>
+          <a:chOff x="0" y="0"/>
+          <a:chExt cx="0" cy="0"/>
+        </a:xfrm>
+      </p:grpSpPr>
+      <p:sp>
+        <p:nvSpPr>
+          <p:cNvPr id="3" name="Rectangle 2"/>
+          <p:cNvSpPr/>
+          <p:nvPr/>
+        </p:nvSpPr>
+        <p:spPr>
+          <a:xfrm>
+            <a:off x="4032000" y="2889000"/>
+            <a:ext cx="1080000" cy="1080000"/>
+          </a:xfrm>
+          <a:prstGeom prst="rect">
+            <a:avLst/>
+          </a:prstGeom>
+          <a:noFill/>
+          <a:ln w="6350">
+            <a:noFill/>
+          </a:ln>
+        </p:spPr>
+        <p:style>
+          <a:lnRef idx="2">
+            <a:schemeClr val="accent1">
+              <a:shade val="50000"/>
+            </a:schemeClr>
+          </a:lnRef>
+          <a:fillRef idx="1">
+            <a:schemeClr val="accent1"/>
+          </a:fillRef>
+          <a:effectRef idx="0">
+            <a:schemeClr val="accent1"/>
+          </a:effectRef>
+          <a:fontRef idx="minor">
+            <a:schemeClr val="lt1"/>
+          </a:fontRef>
+        </p:style>
+        <p:txBody>
+          <a:bodyPr rtlCol="0" anchor="ctr"/>
+          <a:lstStyle/>
+          <a:p>
+            <a:pPr algn="ctr"/>
+            <a:endParaRPr lang="zh-TW" altLang="en-US"/>
+          </a:p>
+        </p:txBody>
+      </p:sp>
+      <p:sp>
+        <p:nvSpPr>
+          <p:cNvPr id="4" name="Oval 3"/>
+          <p:cNvSpPr/>
+          <p:nvPr/>
+        </p:nvSpPr>
+        <p:spPr>
+          <a:xfrm>
+            <a:off x="4114800" y="2971800"/>
+            <a:ext cx="914400" cy="914400"/>
+          </a:xfrm>
+          <a:prstGeom prst="ellipse">
+            <a:avLst/>
+          </a:prstGeom>
+          <a:solidFill>
+            <a:srgbClr val="FF0000"/>
+          </a:solidFill>
+          <a:ln>
+            <a:noFill/>
+          </a:ln>
+        </p:spPr>
+        <p:style>
+          <a:lnRef idx="2">
+            <a:schemeClr val="accent1">
+              <a:shade val="50000"/>
+            </a:schemeClr>
+          </a:lnRef>
+          <a:fillRef idx="1">
+            <a:schemeClr val="accent1"/>
+          </a:fillRef>
+          <a:effectRef idx="0">
+            <a:schemeClr val="accent1"/>
+          </a:effectRef>
+          <a:fontRef idx="minor">
+            <a:schemeClr val="lt1"/>
+          </a:fontRef>
+        </p:style>
+        <p:txBody>
+          <a:bodyPr rtlCol="0" anchor="ctr"/>
+          <a:lstStyle/>
+          <a:p>
+            <a:pPr algn="ctr"/>
+            <a:endParaRPr lang="en-US"/>
+          </a:p>
+        </p:txBody>
+      </p:sp>
+    </p:spTree>
+    <p:extLst>
+      <p:ext uri="{BB962C8B-B14F-4D97-AF65-F5344CB8AC3E}">
+        <p14:creationId xmlns:p14="http://schemas.microsoft.com/office/powerpoint/2010/main" val="3834815093"/>
+      </p:ext>
+    </p:extLst>
+  </p:cSld>
+  <p:clrMapOvr>
+    <a:masterClrMapping/>
+  </p:clrMapOvr>
+</p:sld>
+</file>
+
+<file path=ppt/slides/slide20.xml><?xml version="1.0" encoding="utf-8"?>
 <p:sld xmlns:a="http://schemas.openxmlformats.org/drawingml/2006/main" xmlns:r="http://schemas.openxmlformats.org/officeDocument/2006/relationships" xmlns:p="http://schemas.openxmlformats.org/presentationml/2006/main">
   <p:cSld>
     <p:spTree>
@@ -7846,127 +8547,7 @@
 </p:sld>
 </file>
 
-<file path=ppt/slides/slide2.xml><?xml version="1.0" encoding="utf-8"?>
-<p:sld xmlns:a="http://schemas.openxmlformats.org/drawingml/2006/main" xmlns:r="http://schemas.openxmlformats.org/officeDocument/2006/relationships" xmlns:p="http://schemas.openxmlformats.org/presentationml/2006/main">
-  <p:cSld>
-    <p:spTree>
-      <p:nvGrpSpPr>
-        <p:cNvPr id="1" name=""/>
-        <p:cNvGrpSpPr/>
-        <p:nvPr/>
-      </p:nvGrpSpPr>
-      <p:grpSpPr>
-        <a:xfrm>
-          <a:off x="0" y="0"/>
-          <a:ext cx="0" cy="0"/>
-          <a:chOff x="0" y="0"/>
-          <a:chExt cx="0" cy="0"/>
-        </a:xfrm>
-      </p:grpSpPr>
-      <p:sp>
-        <p:nvSpPr>
-          <p:cNvPr id="3" name="Rectangle 2"/>
-          <p:cNvSpPr/>
-          <p:nvPr/>
-        </p:nvSpPr>
-        <p:spPr>
-          <a:xfrm>
-            <a:off x="4032000" y="2889000"/>
-            <a:ext cx="1080000" cy="1080000"/>
-          </a:xfrm>
-          <a:prstGeom prst="rect">
-            <a:avLst/>
-          </a:prstGeom>
-          <a:noFill/>
-          <a:ln w="6350">
-            <a:noFill/>
-          </a:ln>
-        </p:spPr>
-        <p:style>
-          <a:lnRef idx="2">
-            <a:schemeClr val="accent1">
-              <a:shade val="50000"/>
-            </a:schemeClr>
-          </a:lnRef>
-          <a:fillRef idx="1">
-            <a:schemeClr val="accent1"/>
-          </a:fillRef>
-          <a:effectRef idx="0">
-            <a:schemeClr val="accent1"/>
-          </a:effectRef>
-          <a:fontRef idx="minor">
-            <a:schemeClr val="lt1"/>
-          </a:fontRef>
-        </p:style>
-        <p:txBody>
-          <a:bodyPr rtlCol="0" anchor="ctr"/>
-          <a:lstStyle/>
-          <a:p>
-            <a:pPr algn="ctr"/>
-            <a:endParaRPr lang="zh-TW" altLang="en-US"/>
-          </a:p>
-        </p:txBody>
-      </p:sp>
-      <p:sp>
-        <p:nvSpPr>
-          <p:cNvPr id="4" name="Oval 3"/>
-          <p:cNvSpPr/>
-          <p:nvPr/>
-        </p:nvSpPr>
-        <p:spPr>
-          <a:xfrm>
-            <a:off x="4114800" y="2971800"/>
-            <a:ext cx="914400" cy="914400"/>
-          </a:xfrm>
-          <a:prstGeom prst="ellipse">
-            <a:avLst/>
-          </a:prstGeom>
-          <a:solidFill>
-            <a:srgbClr val="FF0000"/>
-          </a:solidFill>
-          <a:ln>
-            <a:noFill/>
-          </a:ln>
-        </p:spPr>
-        <p:style>
-          <a:lnRef idx="2">
-            <a:schemeClr val="accent1">
-              <a:shade val="50000"/>
-            </a:schemeClr>
-          </a:lnRef>
-          <a:fillRef idx="1">
-            <a:schemeClr val="accent1"/>
-          </a:fillRef>
-          <a:effectRef idx="0">
-            <a:schemeClr val="accent1"/>
-          </a:effectRef>
-          <a:fontRef idx="minor">
-            <a:schemeClr val="lt1"/>
-          </a:fontRef>
-        </p:style>
-        <p:txBody>
-          <a:bodyPr rtlCol="0" anchor="ctr"/>
-          <a:lstStyle/>
-          <a:p>
-            <a:pPr algn="ctr"/>
-            <a:endParaRPr lang="en-US"/>
-          </a:p>
-        </p:txBody>
-      </p:sp>
-    </p:spTree>
-    <p:extLst>
-      <p:ext uri="{BB962C8B-B14F-4D97-AF65-F5344CB8AC3E}">
-        <p14:creationId xmlns:p14="http://schemas.microsoft.com/office/powerpoint/2010/main" val="3834815093"/>
-      </p:ext>
-    </p:extLst>
-  </p:cSld>
-  <p:clrMapOvr>
-    <a:masterClrMapping/>
-  </p:clrMapOvr>
-</p:sld>
-</file>
-
-<file path=ppt/slides/slide20.xml><?xml version="1.0" encoding="utf-8"?>
+<file path=ppt/slides/slide21.xml><?xml version="1.0" encoding="utf-8"?>
 <p:sld xmlns:a="http://schemas.openxmlformats.org/drawingml/2006/main" xmlns:r="http://schemas.openxmlformats.org/officeDocument/2006/relationships" xmlns:p="http://schemas.openxmlformats.org/presentationml/2006/main">
   <p:cSld>
     <p:spTree>
@@ -8641,6 +9222,57 @@
       </p:grpSpPr>
       <p:sp>
         <p:nvSpPr>
+          <p:cNvPr id="7" name="Trapezoid 6"/>
+          <p:cNvSpPr/>
+          <p:nvPr/>
+        </p:nvSpPr>
+        <p:spPr>
+          <a:xfrm rot="16200000">
+            <a:off x="4594434" y="3146931"/>
+            <a:ext cx="684000" cy="239511"/>
+          </a:xfrm>
+          <a:prstGeom prst="trapezoid">
+            <a:avLst>
+              <a:gd name="adj" fmla="val 112099"/>
+            </a:avLst>
+          </a:prstGeom>
+          <a:solidFill>
+            <a:schemeClr val="bg1">
+              <a:lumMod val="65000"/>
+            </a:schemeClr>
+          </a:solidFill>
+          <a:ln w="50800">
+            <a:noFill/>
+            <a:miter lim="800000"/>
+          </a:ln>
+        </p:spPr>
+        <p:style>
+          <a:lnRef idx="2">
+            <a:schemeClr val="accent1">
+              <a:shade val="50000"/>
+            </a:schemeClr>
+          </a:lnRef>
+          <a:fillRef idx="1">
+            <a:schemeClr val="accent1"/>
+          </a:fillRef>
+          <a:effectRef idx="0">
+            <a:schemeClr val="accent1"/>
+          </a:effectRef>
+          <a:fontRef idx="minor">
+            <a:schemeClr val="lt1"/>
+          </a:fontRef>
+        </p:style>
+        <p:txBody>
+          <a:bodyPr rtlCol="0" anchor="ctr"/>
+          <a:lstStyle/>
+          <a:p>
+            <a:pPr algn="ctr"/>
+            <a:endParaRPr lang="zh-TW" altLang="en-US"/>
+          </a:p>
+        </p:txBody>
+      </p:sp>
+      <p:sp>
+        <p:nvSpPr>
           <p:cNvPr id="3" name="Rectangle 2"/>
           <p:cNvSpPr/>
           <p:nvPr/>
@@ -8691,8 +9323,8 @@
         </p:nvSpPr>
         <p:spPr>
           <a:xfrm>
-            <a:off x="4096678" y="2960687"/>
-            <a:ext cx="756000" cy="612000"/>
+            <a:off x="4096678" y="2978687"/>
+            <a:ext cx="720000" cy="576000"/>
           </a:xfrm>
           <a:prstGeom prst="roundRect">
             <a:avLst>
@@ -8775,57 +9407,6 @@
           </a:extLst>
         </p:spPr>
       </p:pic>
-      <p:sp>
-        <p:nvSpPr>
-          <p:cNvPr id="7" name="Trapezoid 6"/>
-          <p:cNvSpPr/>
-          <p:nvPr/>
-        </p:nvSpPr>
-        <p:spPr>
-          <a:xfrm rot="16200000">
-            <a:off x="4642189" y="3158686"/>
-            <a:ext cx="612000" cy="216000"/>
-          </a:xfrm>
-          <a:prstGeom prst="trapezoid">
-            <a:avLst>
-              <a:gd name="adj" fmla="val 112099"/>
-            </a:avLst>
-          </a:prstGeom>
-          <a:solidFill>
-            <a:schemeClr val="bg1">
-              <a:lumMod val="65000"/>
-            </a:schemeClr>
-          </a:solidFill>
-          <a:ln w="50800">
-            <a:noFill/>
-            <a:miter lim="800000"/>
-          </a:ln>
-        </p:spPr>
-        <p:style>
-          <a:lnRef idx="2">
-            <a:schemeClr val="accent1">
-              <a:shade val="50000"/>
-            </a:schemeClr>
-          </a:lnRef>
-          <a:fillRef idx="1">
-            <a:schemeClr val="accent1"/>
-          </a:fillRef>
-          <a:effectRef idx="0">
-            <a:schemeClr val="accent1"/>
-          </a:effectRef>
-          <a:fontRef idx="minor">
-            <a:schemeClr val="lt1"/>
-          </a:fontRef>
-        </p:style>
-        <p:txBody>
-          <a:bodyPr rtlCol="0" anchor="ctr"/>
-          <a:lstStyle/>
-          <a:p>
-            <a:pPr algn="ctr"/>
-            <a:endParaRPr lang="zh-TW" altLang="en-US"/>
-          </a:p>
-        </p:txBody>
-      </p:sp>
     </p:spTree>
     <p:extLst>
       <p:ext uri="{BB962C8B-B14F-4D97-AF65-F5344CB8AC3E}">
@@ -9422,64 +10003,14 @@
       </p:grpSpPr>
       <p:sp>
         <p:nvSpPr>
-          <p:cNvPr id="74" name="Rounded Rectangle 73"/>
+          <p:cNvPr id="65" name="Trapezoid 64"/>
           <p:cNvSpPr/>
           <p:nvPr/>
         </p:nvSpPr>
         <p:spPr>
-          <a:xfrm>
-            <a:off x="4096678" y="2960687"/>
-            <a:ext cx="756000" cy="612000"/>
-          </a:xfrm>
-          <a:prstGeom prst="roundRect">
-            <a:avLst>
-              <a:gd name="adj" fmla="val 7326"/>
-            </a:avLst>
-          </a:prstGeom>
-          <a:solidFill>
-            <a:schemeClr val="bg1">
-              <a:lumMod val="65000"/>
-            </a:schemeClr>
-          </a:solidFill>
-          <a:ln w="50800">
-            <a:noFill/>
-          </a:ln>
-        </p:spPr>
-        <p:style>
-          <a:lnRef idx="2">
-            <a:schemeClr val="accent1">
-              <a:shade val="50000"/>
-            </a:schemeClr>
-          </a:lnRef>
-          <a:fillRef idx="1">
-            <a:schemeClr val="accent1"/>
-          </a:fillRef>
-          <a:effectRef idx="0">
-            <a:schemeClr val="accent1"/>
-          </a:effectRef>
-          <a:fontRef idx="minor">
-            <a:schemeClr val="lt1"/>
-          </a:fontRef>
-        </p:style>
-        <p:txBody>
-          <a:bodyPr rtlCol="0" anchor="ctr"/>
-          <a:lstStyle/>
-          <a:p>
-            <a:pPr algn="ctr"/>
-            <a:endParaRPr lang="zh-TW" altLang="en-US"/>
-          </a:p>
-        </p:txBody>
-      </p:sp>
-      <p:sp>
-        <p:nvSpPr>
-          <p:cNvPr id="75" name="Trapezoid 74"/>
-          <p:cNvSpPr/>
-          <p:nvPr/>
-        </p:nvSpPr>
-        <p:spPr>
           <a:xfrm rot="16200000">
-            <a:off x="4642189" y="3158686"/>
-            <a:ext cx="612000" cy="216000"/>
+            <a:off x="4594434" y="3146931"/>
+            <a:ext cx="684000" cy="239511"/>
           </a:xfrm>
           <a:prstGeom prst="trapezoid">
             <a:avLst>
@@ -9523,20 +10054,26 @@
       </p:sp>
       <p:sp>
         <p:nvSpPr>
-          <p:cNvPr id="12" name="Rectangle 11"/>
+          <p:cNvPr id="66" name="Rounded Rectangle 65"/>
           <p:cNvSpPr/>
           <p:nvPr/>
         </p:nvSpPr>
         <p:spPr>
           <a:xfrm>
-            <a:off x="4032000" y="2889000"/>
-            <a:ext cx="1080000" cy="1080000"/>
-          </a:xfrm>
-          <a:prstGeom prst="rect">
-            <a:avLst/>
+            <a:off x="4096678" y="2978687"/>
+            <a:ext cx="720000" cy="576000"/>
+          </a:xfrm>
+          <a:prstGeom prst="roundRect">
+            <a:avLst>
+              <a:gd name="adj" fmla="val 7326"/>
+            </a:avLst>
           </a:prstGeom>
-          <a:noFill/>
-          <a:ln w="6350">
+          <a:solidFill>
+            <a:schemeClr val="bg1">
+              <a:lumMod val="65000"/>
+            </a:schemeClr>
+          </a:solidFill>
+          <a:ln w="50800">
             <a:noFill/>
           </a:ln>
         </p:spPr>
@@ -10531,6 +11068,50 @@
           </p:sp>
         </p:grpSp>
       </p:grpSp>
+      <p:sp>
+        <p:nvSpPr>
+          <p:cNvPr id="38" name="Rectangle 37"/>
+          <p:cNvSpPr/>
+          <p:nvPr/>
+        </p:nvSpPr>
+        <p:spPr>
+          <a:xfrm>
+            <a:off x="4032000" y="2889000"/>
+            <a:ext cx="1080000" cy="1080000"/>
+          </a:xfrm>
+          <a:prstGeom prst="rect">
+            <a:avLst/>
+          </a:prstGeom>
+          <a:noFill/>
+          <a:ln w="6350">
+            <a:noFill/>
+          </a:ln>
+        </p:spPr>
+        <p:style>
+          <a:lnRef idx="2">
+            <a:schemeClr val="accent1">
+              <a:shade val="50000"/>
+            </a:schemeClr>
+          </a:lnRef>
+          <a:fillRef idx="1">
+            <a:schemeClr val="accent1"/>
+          </a:fillRef>
+          <a:effectRef idx="0">
+            <a:schemeClr val="accent1"/>
+          </a:effectRef>
+          <a:fontRef idx="minor">
+            <a:schemeClr val="lt1"/>
+          </a:fontRef>
+        </p:style>
+        <p:txBody>
+          <a:bodyPr rtlCol="0" anchor="ctr"/>
+          <a:lstStyle/>
+          <a:p>
+            <a:pPr algn="ctr"/>
+            <a:endParaRPr lang="zh-TW" altLang="en-US"/>
+          </a:p>
+        </p:txBody>
+      </p:sp>
     </p:spTree>
     <p:extLst>
       <p:ext uri="{BB962C8B-B14F-4D97-AF65-F5344CB8AC3E}">
@@ -10563,64 +11144,14 @@
       </p:grpSpPr>
       <p:sp>
         <p:nvSpPr>
-          <p:cNvPr id="74" name="Rounded Rectangle 73"/>
+          <p:cNvPr id="17" name="Trapezoid 16"/>
           <p:cNvSpPr/>
           <p:nvPr/>
         </p:nvSpPr>
         <p:spPr>
-          <a:xfrm>
-            <a:off x="4096678" y="2960687"/>
-            <a:ext cx="756000" cy="612000"/>
-          </a:xfrm>
-          <a:prstGeom prst="roundRect">
-            <a:avLst>
-              <a:gd name="adj" fmla="val 7326"/>
-            </a:avLst>
-          </a:prstGeom>
-          <a:solidFill>
-            <a:schemeClr val="bg1">
-              <a:lumMod val="65000"/>
-            </a:schemeClr>
-          </a:solidFill>
-          <a:ln w="50800">
-            <a:noFill/>
-          </a:ln>
-        </p:spPr>
-        <p:style>
-          <a:lnRef idx="2">
-            <a:schemeClr val="accent1">
-              <a:shade val="50000"/>
-            </a:schemeClr>
-          </a:lnRef>
-          <a:fillRef idx="1">
-            <a:schemeClr val="accent1"/>
-          </a:fillRef>
-          <a:effectRef idx="0">
-            <a:schemeClr val="accent1"/>
-          </a:effectRef>
-          <a:fontRef idx="minor">
-            <a:schemeClr val="lt1"/>
-          </a:fontRef>
-        </p:style>
-        <p:txBody>
-          <a:bodyPr rtlCol="0" anchor="ctr"/>
-          <a:lstStyle/>
-          <a:p>
-            <a:pPr algn="ctr"/>
-            <a:endParaRPr lang="zh-TW" altLang="en-US"/>
-          </a:p>
-        </p:txBody>
-      </p:sp>
-      <p:sp>
-        <p:nvSpPr>
-          <p:cNvPr id="75" name="Trapezoid 74"/>
-          <p:cNvSpPr/>
-          <p:nvPr/>
-        </p:nvSpPr>
-        <p:spPr>
           <a:xfrm rot="16200000">
-            <a:off x="4642189" y="3158686"/>
-            <a:ext cx="612000" cy="216000"/>
+            <a:off x="4594434" y="3146931"/>
+            <a:ext cx="684000" cy="239511"/>
           </a:xfrm>
           <a:prstGeom prst="trapezoid">
             <a:avLst>
@@ -10635,6 +11166,56 @@
           <a:ln w="50800">
             <a:noFill/>
             <a:miter lim="800000"/>
+          </a:ln>
+        </p:spPr>
+        <p:style>
+          <a:lnRef idx="2">
+            <a:schemeClr val="accent1">
+              <a:shade val="50000"/>
+            </a:schemeClr>
+          </a:lnRef>
+          <a:fillRef idx="1">
+            <a:schemeClr val="accent1"/>
+          </a:fillRef>
+          <a:effectRef idx="0">
+            <a:schemeClr val="accent1"/>
+          </a:effectRef>
+          <a:fontRef idx="minor">
+            <a:schemeClr val="lt1"/>
+          </a:fontRef>
+        </p:style>
+        <p:txBody>
+          <a:bodyPr rtlCol="0" anchor="ctr"/>
+          <a:lstStyle/>
+          <a:p>
+            <a:pPr algn="ctr"/>
+            <a:endParaRPr lang="zh-TW" altLang="en-US"/>
+          </a:p>
+        </p:txBody>
+      </p:sp>
+      <p:sp>
+        <p:nvSpPr>
+          <p:cNvPr id="18" name="Rounded Rectangle 17"/>
+          <p:cNvSpPr/>
+          <p:nvPr/>
+        </p:nvSpPr>
+        <p:spPr>
+          <a:xfrm>
+            <a:off x="4096678" y="2978687"/>
+            <a:ext cx="720000" cy="576000"/>
+          </a:xfrm>
+          <a:prstGeom prst="roundRect">
+            <a:avLst>
+              <a:gd name="adj" fmla="val 7326"/>
+            </a:avLst>
+          </a:prstGeom>
+          <a:solidFill>
+            <a:schemeClr val="bg1">
+              <a:lumMod val="65000"/>
+            </a:schemeClr>
+          </a:solidFill>
+          <a:ln w="50800">
+            <a:noFill/>
           </a:ln>
         </p:spPr>
         <p:style>

</xml_diff>